<commit_message>
Updated .docx and .pptx files
</commit_message>
<xml_diff>
--- a/documentation/МАНУ2020.pptx
+++ b/documentation/МАНУ2020.pptx
@@ -3,30 +3,32 @@
 <p:presentation xmlns:a="http://schemas.openxmlformats.org/drawingml/2006/main" xmlns:r="http://schemas.openxmlformats.org/officeDocument/2006/relationships" xmlns:p="http://schemas.openxmlformats.org/presentationml/2006/main">
   <p:sldMasterIdLst>
     <p:sldMasterId id="2147483648" r:id="rId1"/>
-    <p:sldMasterId id="2147483660" r:id="rId3"/>
+    <p:sldMasterId id="2147483660" r:id="rId2"/>
   </p:sldMasterIdLst>
   <p:sldIdLst>
-    <p:sldId id="256" r:id="rId4"/>
-    <p:sldId id="257" r:id="rId5"/>
-    <p:sldId id="261" r:id="rId6"/>
-    <p:sldId id="262" r:id="rId7"/>
-    <p:sldId id="263" r:id="rId8"/>
-    <p:sldId id="275" r:id="rId9"/>
-    <p:sldId id="264" r:id="rId10"/>
-    <p:sldId id="279" r:id="rId11"/>
-    <p:sldId id="280" r:id="rId12"/>
-    <p:sldId id="281" r:id="rId13"/>
-    <p:sldId id="259" r:id="rId14"/>
-    <p:sldId id="266" r:id="rId15"/>
-    <p:sldId id="267" r:id="rId16"/>
-    <p:sldId id="270" r:id="rId17"/>
-    <p:sldId id="271" r:id="rId18"/>
+    <p:sldId id="256" r:id="rId3"/>
+    <p:sldId id="257" r:id="rId4"/>
+    <p:sldId id="261" r:id="rId5"/>
+    <p:sldId id="262" r:id="rId6"/>
+    <p:sldId id="263" r:id="rId7"/>
+    <p:sldId id="275" r:id="rId8"/>
+    <p:sldId id="264" r:id="rId9"/>
+    <p:sldId id="279" r:id="rId10"/>
+    <p:sldId id="280" r:id="rId11"/>
+    <p:sldId id="281" r:id="rId12"/>
+    <p:sldId id="259" r:id="rId13"/>
+    <p:sldId id="266" r:id="rId14"/>
+    <p:sldId id="267" r:id="rId15"/>
+    <p:sldId id="270" r:id="rId16"/>
+    <p:sldId id="271" r:id="rId17"/>
+    <p:sldId id="273" r:id="rId18"/>
     <p:sldId id="272" r:id="rId19"/>
-    <p:sldId id="273" r:id="rId20"/>
+    <p:sldId id="283" r:id="rId20"/>
     <p:sldId id="274" r:id="rId21"/>
-    <p:sldId id="268" r:id="rId22"/>
-    <p:sldId id="269" r:id="rId23"/>
-    <p:sldId id="258" r:id="rId24"/>
+    <p:sldId id="282" r:id="rId22"/>
+    <p:sldId id="268" r:id="rId23"/>
+    <p:sldId id="269" r:id="rId24"/>
+    <p:sldId id="258" r:id="rId25"/>
   </p:sldIdLst>
   <p:sldSz cx="12192000" cy="6858000"/>
   <p:notesSz cx="6858000" cy="9144000"/>
@@ -125,6 +127,11 @@
       </a:defRPr>
     </a:lvl9pPr>
   </p:defaultTextStyle>
+  <p:extLst>
+    <p:ext uri="{EFAFB233-063F-42B5-8137-9DF3F51BA10A}">
+      <p15:sldGuideLst xmlns:p15="http://schemas.microsoft.com/office/powerpoint/2012/main"/>
+    </p:ext>
+  </p:extLst>
 </p:presentation>
 </file>
 
@@ -259,6 +266,7 @@
           <a:p>
             <a:fld id="{F3B1270B-825F-4A6F-BFBD-8E5D97593686}" type="datetimeFigureOut">
               <a:rPr lang="uk-UA" smtClean="0"/>
+              <a:t>03.03.2020</a:t>
             </a:fld>
             <a:endParaRPr lang="uk-UA"/>
           </a:p>
@@ -300,6 +308,7 @@
           <a:p>
             <a:fld id="{A205741A-6C99-45B0-8A04-C4D0F9F7160F}" type="slidenum">
               <a:rPr lang="uk-UA" smtClean="0"/>
+              <a:t>‹#›</a:t>
             </a:fld>
             <a:endParaRPr lang="uk-UA"/>
           </a:p>
@@ -373,7 +382,6 @@
               <a:rPr lang="ru-RU"/>
               <a:t>Образец текста</a:t>
             </a:r>
-            <a:endParaRPr lang="ru-RU"/>
           </a:p>
           <a:p>
             <a:pPr lvl="1"/>
@@ -381,7 +389,6 @@
               <a:rPr lang="ru-RU"/>
               <a:t>Второй уровень</a:t>
             </a:r>
-            <a:endParaRPr lang="ru-RU"/>
           </a:p>
           <a:p>
             <a:pPr lvl="2"/>
@@ -389,7 +396,6 @@
               <a:rPr lang="ru-RU"/>
               <a:t>Третий уровень</a:t>
             </a:r>
-            <a:endParaRPr lang="ru-RU"/>
           </a:p>
           <a:p>
             <a:pPr lvl="3"/>
@@ -397,7 +403,6 @@
               <a:rPr lang="ru-RU"/>
               <a:t>Четвертый уровень</a:t>
             </a:r>
-            <a:endParaRPr lang="ru-RU"/>
           </a:p>
           <a:p>
             <a:pPr lvl="4"/>
@@ -426,6 +431,7 @@
           <a:p>
             <a:fld id="{F3B1270B-825F-4A6F-BFBD-8E5D97593686}" type="datetimeFigureOut">
               <a:rPr lang="uk-UA" smtClean="0"/>
+              <a:t>03.03.2020</a:t>
             </a:fld>
             <a:endParaRPr lang="uk-UA"/>
           </a:p>
@@ -467,6 +473,7 @@
           <a:p>
             <a:fld id="{A205741A-6C99-45B0-8A04-C4D0F9F7160F}" type="slidenum">
               <a:rPr lang="uk-UA" smtClean="0"/>
+              <a:t>‹#›</a:t>
             </a:fld>
             <a:endParaRPr lang="uk-UA"/>
           </a:p>
@@ -550,7 +557,6 @@
               <a:rPr lang="ru-RU"/>
               <a:t>Образец текста</a:t>
             </a:r>
-            <a:endParaRPr lang="ru-RU"/>
           </a:p>
           <a:p>
             <a:pPr lvl="1"/>
@@ -558,7 +564,6 @@
               <a:rPr lang="ru-RU"/>
               <a:t>Второй уровень</a:t>
             </a:r>
-            <a:endParaRPr lang="ru-RU"/>
           </a:p>
           <a:p>
             <a:pPr lvl="2"/>
@@ -566,7 +571,6 @@
               <a:rPr lang="ru-RU"/>
               <a:t>Третий уровень</a:t>
             </a:r>
-            <a:endParaRPr lang="ru-RU"/>
           </a:p>
           <a:p>
             <a:pPr lvl="3"/>
@@ -574,7 +578,6 @@
               <a:rPr lang="ru-RU"/>
               <a:t>Четвертый уровень</a:t>
             </a:r>
-            <a:endParaRPr lang="ru-RU"/>
           </a:p>
           <a:p>
             <a:pPr lvl="4"/>
@@ -603,6 +606,7 @@
           <a:p>
             <a:fld id="{F3B1270B-825F-4A6F-BFBD-8E5D97593686}" type="datetimeFigureOut">
               <a:rPr lang="uk-UA" smtClean="0"/>
+              <a:t>03.03.2020</a:t>
             </a:fld>
             <a:endParaRPr lang="uk-UA"/>
           </a:p>
@@ -644,6 +648,7 @@
           <a:p>
             <a:fld id="{A205741A-6C99-45B0-8A04-C4D0F9F7160F}" type="slidenum">
               <a:rPr lang="uk-UA" smtClean="0"/>
+              <a:t>‹#›</a:t>
             </a:fld>
             <a:endParaRPr lang="uk-UA"/>
           </a:p>
@@ -788,6 +793,7 @@
           <a:p>
             <a:fld id="{F3B1270B-825F-4A6F-BFBD-8E5D97593686}" type="datetimeFigureOut">
               <a:rPr lang="uk-UA" smtClean="0"/>
+              <a:t>03.03.2020</a:t>
             </a:fld>
             <a:endParaRPr lang="uk-UA"/>
           </a:p>
@@ -829,6 +835,7 @@
           <a:p>
             <a:fld id="{A205741A-6C99-45B0-8A04-C4D0F9F7160F}" type="slidenum">
               <a:rPr lang="uk-UA" smtClean="0"/>
+              <a:t>‹#›</a:t>
             </a:fld>
             <a:endParaRPr lang="uk-UA"/>
           </a:p>
@@ -902,7 +909,6 @@
               <a:rPr lang="ru-RU"/>
               <a:t>Образец текста</a:t>
             </a:r>
-            <a:endParaRPr lang="ru-RU"/>
           </a:p>
           <a:p>
             <a:pPr lvl="1"/>
@@ -910,7 +916,6 @@
               <a:rPr lang="ru-RU"/>
               <a:t>Второй уровень</a:t>
             </a:r>
-            <a:endParaRPr lang="ru-RU"/>
           </a:p>
           <a:p>
             <a:pPr lvl="2"/>
@@ -918,7 +923,6 @@
               <a:rPr lang="ru-RU"/>
               <a:t>Третий уровень</a:t>
             </a:r>
-            <a:endParaRPr lang="ru-RU"/>
           </a:p>
           <a:p>
             <a:pPr lvl="3"/>
@@ -926,7 +930,6 @@
               <a:rPr lang="ru-RU"/>
               <a:t>Четвертый уровень</a:t>
             </a:r>
-            <a:endParaRPr lang="ru-RU"/>
           </a:p>
           <a:p>
             <a:pPr lvl="4"/>
@@ -955,6 +958,7 @@
           <a:p>
             <a:fld id="{F3B1270B-825F-4A6F-BFBD-8E5D97593686}" type="datetimeFigureOut">
               <a:rPr lang="uk-UA" smtClean="0"/>
+              <a:t>03.03.2020</a:t>
             </a:fld>
             <a:endParaRPr lang="uk-UA"/>
           </a:p>
@@ -996,6 +1000,7 @@
           <a:p>
             <a:fld id="{A205741A-6C99-45B0-8A04-C4D0F9F7160F}" type="slidenum">
               <a:rPr lang="uk-UA" smtClean="0"/>
+              <a:t>‹#›</a:t>
             </a:fld>
             <a:endParaRPr lang="uk-UA"/>
           </a:p>
@@ -1174,7 +1179,6 @@
               <a:rPr lang="ru-RU"/>
               <a:t>Образец текста</a:t>
             </a:r>
-            <a:endParaRPr lang="ru-RU"/>
           </a:p>
         </p:txBody>
       </p:sp>
@@ -1195,6 +1199,7 @@
           <a:p>
             <a:fld id="{F3B1270B-825F-4A6F-BFBD-8E5D97593686}" type="datetimeFigureOut">
               <a:rPr lang="uk-UA" smtClean="0"/>
+              <a:t>03.03.2020</a:t>
             </a:fld>
             <a:endParaRPr lang="uk-UA"/>
           </a:p>
@@ -1236,6 +1241,7 @@
           <a:p>
             <a:fld id="{A205741A-6C99-45B0-8A04-C4D0F9F7160F}" type="slidenum">
               <a:rPr lang="uk-UA" smtClean="0"/>
+              <a:t>‹#›</a:t>
             </a:fld>
             <a:endParaRPr lang="uk-UA"/>
           </a:p>
@@ -1314,7 +1320,6 @@
               <a:rPr lang="ru-RU"/>
               <a:t>Образец текста</a:t>
             </a:r>
-            <a:endParaRPr lang="ru-RU"/>
           </a:p>
           <a:p>
             <a:pPr lvl="1"/>
@@ -1322,7 +1327,6 @@
               <a:rPr lang="ru-RU"/>
               <a:t>Второй уровень</a:t>
             </a:r>
-            <a:endParaRPr lang="ru-RU"/>
           </a:p>
           <a:p>
             <a:pPr lvl="2"/>
@@ -1330,7 +1334,6 @@
               <a:rPr lang="ru-RU"/>
               <a:t>Третий уровень</a:t>
             </a:r>
-            <a:endParaRPr lang="ru-RU"/>
           </a:p>
           <a:p>
             <a:pPr lvl="3"/>
@@ -1338,7 +1341,6 @@
               <a:rPr lang="ru-RU"/>
               <a:t>Четвертый уровень</a:t>
             </a:r>
-            <a:endParaRPr lang="ru-RU"/>
           </a:p>
           <a:p>
             <a:pPr lvl="4"/>
@@ -1375,7 +1377,6 @@
               <a:rPr lang="ru-RU"/>
               <a:t>Образец текста</a:t>
             </a:r>
-            <a:endParaRPr lang="ru-RU"/>
           </a:p>
           <a:p>
             <a:pPr lvl="1"/>
@@ -1383,7 +1384,6 @@
               <a:rPr lang="ru-RU"/>
               <a:t>Второй уровень</a:t>
             </a:r>
-            <a:endParaRPr lang="ru-RU"/>
           </a:p>
           <a:p>
             <a:pPr lvl="2"/>
@@ -1391,7 +1391,6 @@
               <a:rPr lang="ru-RU"/>
               <a:t>Третий уровень</a:t>
             </a:r>
-            <a:endParaRPr lang="ru-RU"/>
           </a:p>
           <a:p>
             <a:pPr lvl="3"/>
@@ -1399,7 +1398,6 @@
               <a:rPr lang="ru-RU"/>
               <a:t>Четвертый уровень</a:t>
             </a:r>
-            <a:endParaRPr lang="ru-RU"/>
           </a:p>
           <a:p>
             <a:pPr lvl="4"/>
@@ -1428,6 +1426,7 @@
           <a:p>
             <a:fld id="{F3B1270B-825F-4A6F-BFBD-8E5D97593686}" type="datetimeFigureOut">
               <a:rPr lang="uk-UA" smtClean="0"/>
+              <a:t>03.03.2020</a:t>
             </a:fld>
             <a:endParaRPr lang="uk-UA"/>
           </a:p>
@@ -1469,6 +1468,7 @@
           <a:p>
             <a:fld id="{A205741A-6C99-45B0-8A04-C4D0F9F7160F}" type="slidenum">
               <a:rPr lang="uk-UA" smtClean="0"/>
+              <a:t>‹#›</a:t>
             </a:fld>
             <a:endParaRPr lang="uk-UA"/>
           </a:p>
@@ -1589,7 +1589,6 @@
               <a:rPr lang="ru-RU"/>
               <a:t>Образец текста</a:t>
             </a:r>
-            <a:endParaRPr lang="ru-RU"/>
           </a:p>
         </p:txBody>
       </p:sp>
@@ -1618,7 +1617,6 @@
               <a:rPr lang="ru-RU"/>
               <a:t>Образец текста</a:t>
             </a:r>
-            <a:endParaRPr lang="ru-RU"/>
           </a:p>
           <a:p>
             <a:pPr lvl="1"/>
@@ -1626,7 +1624,6 @@
               <a:rPr lang="ru-RU"/>
               <a:t>Второй уровень</a:t>
             </a:r>
-            <a:endParaRPr lang="ru-RU"/>
           </a:p>
           <a:p>
             <a:pPr lvl="2"/>
@@ -1634,7 +1631,6 @@
               <a:rPr lang="ru-RU"/>
               <a:t>Третий уровень</a:t>
             </a:r>
-            <a:endParaRPr lang="ru-RU"/>
           </a:p>
           <a:p>
             <a:pPr lvl="3"/>
@@ -1642,7 +1638,6 @@
               <a:rPr lang="ru-RU"/>
               <a:t>Четвертый уровень</a:t>
             </a:r>
-            <a:endParaRPr lang="ru-RU"/>
           </a:p>
           <a:p>
             <a:pPr lvl="4"/>
@@ -1716,7 +1711,6 @@
               <a:rPr lang="ru-RU"/>
               <a:t>Образец текста</a:t>
             </a:r>
-            <a:endParaRPr lang="ru-RU"/>
           </a:p>
         </p:txBody>
       </p:sp>
@@ -1745,7 +1739,6 @@
               <a:rPr lang="ru-RU"/>
               <a:t>Образец текста</a:t>
             </a:r>
-            <a:endParaRPr lang="ru-RU"/>
           </a:p>
           <a:p>
             <a:pPr lvl="1"/>
@@ -1753,7 +1746,6 @@
               <a:rPr lang="ru-RU"/>
               <a:t>Второй уровень</a:t>
             </a:r>
-            <a:endParaRPr lang="ru-RU"/>
           </a:p>
           <a:p>
             <a:pPr lvl="2"/>
@@ -1761,7 +1753,6 @@
               <a:rPr lang="ru-RU"/>
               <a:t>Третий уровень</a:t>
             </a:r>
-            <a:endParaRPr lang="ru-RU"/>
           </a:p>
           <a:p>
             <a:pPr lvl="3"/>
@@ -1769,7 +1760,6 @@
               <a:rPr lang="ru-RU"/>
               <a:t>Четвертый уровень</a:t>
             </a:r>
-            <a:endParaRPr lang="ru-RU"/>
           </a:p>
           <a:p>
             <a:pPr lvl="4"/>
@@ -1798,6 +1788,7 @@
           <a:p>
             <a:fld id="{F3B1270B-825F-4A6F-BFBD-8E5D97593686}" type="datetimeFigureOut">
               <a:rPr lang="uk-UA" smtClean="0"/>
+              <a:t>03.03.2020</a:t>
             </a:fld>
             <a:endParaRPr lang="uk-UA"/>
           </a:p>
@@ -1839,6 +1830,7 @@
           <a:p>
             <a:fld id="{A205741A-6C99-45B0-8A04-C4D0F9F7160F}" type="slidenum">
               <a:rPr lang="uk-UA" smtClean="0"/>
+              <a:t>‹#›</a:t>
             </a:fld>
             <a:endParaRPr lang="uk-UA"/>
           </a:p>
@@ -1909,6 +1901,7 @@
           <a:p>
             <a:fld id="{F3B1270B-825F-4A6F-BFBD-8E5D97593686}" type="datetimeFigureOut">
               <a:rPr lang="uk-UA" smtClean="0"/>
+              <a:t>03.03.2020</a:t>
             </a:fld>
             <a:endParaRPr lang="uk-UA"/>
           </a:p>
@@ -1950,6 +1943,7 @@
           <a:p>
             <a:fld id="{A205741A-6C99-45B0-8A04-C4D0F9F7160F}" type="slidenum">
               <a:rPr lang="uk-UA" smtClean="0"/>
+              <a:t>‹#›</a:t>
             </a:fld>
             <a:endParaRPr lang="uk-UA"/>
           </a:p>
@@ -1997,6 +1991,7 @@
           <a:p>
             <a:fld id="{F3B1270B-825F-4A6F-BFBD-8E5D97593686}" type="datetimeFigureOut">
               <a:rPr lang="uk-UA" smtClean="0"/>
+              <a:t>03.03.2020</a:t>
             </a:fld>
             <a:endParaRPr lang="uk-UA"/>
           </a:p>
@@ -2038,6 +2033,7 @@
           <a:p>
             <a:fld id="{A205741A-6C99-45B0-8A04-C4D0F9F7160F}" type="slidenum">
               <a:rPr lang="uk-UA" smtClean="0"/>
+              <a:t>‹#›</a:t>
             </a:fld>
             <a:endParaRPr lang="uk-UA"/>
           </a:p>
@@ -2153,7 +2149,6 @@
               <a:rPr lang="ru-RU"/>
               <a:t>Образец текста</a:t>
             </a:r>
-            <a:endParaRPr lang="ru-RU"/>
           </a:p>
           <a:p>
             <a:pPr lvl="1"/>
@@ -2161,7 +2156,6 @@
               <a:rPr lang="ru-RU"/>
               <a:t>Второй уровень</a:t>
             </a:r>
-            <a:endParaRPr lang="ru-RU"/>
           </a:p>
           <a:p>
             <a:pPr lvl="2"/>
@@ -2169,7 +2163,6 @@
               <a:rPr lang="ru-RU"/>
               <a:t>Третий уровень</a:t>
             </a:r>
-            <a:endParaRPr lang="ru-RU"/>
           </a:p>
           <a:p>
             <a:pPr lvl="3"/>
@@ -2177,7 +2170,6 @@
               <a:rPr lang="ru-RU"/>
               <a:t>Четвертый уровень</a:t>
             </a:r>
-            <a:endParaRPr lang="ru-RU"/>
           </a:p>
           <a:p>
             <a:pPr lvl="4"/>
@@ -2251,7 +2243,6 @@
               <a:rPr lang="ru-RU"/>
               <a:t>Образец текста</a:t>
             </a:r>
-            <a:endParaRPr lang="ru-RU"/>
           </a:p>
         </p:txBody>
       </p:sp>
@@ -2272,6 +2263,7 @@
           <a:p>
             <a:fld id="{F3B1270B-825F-4A6F-BFBD-8E5D97593686}" type="datetimeFigureOut">
               <a:rPr lang="uk-UA" smtClean="0"/>
+              <a:t>03.03.2020</a:t>
             </a:fld>
             <a:endParaRPr lang="uk-UA"/>
           </a:p>
@@ -2313,6 +2305,7 @@
           <a:p>
             <a:fld id="{A205741A-6C99-45B0-8A04-C4D0F9F7160F}" type="slidenum">
               <a:rPr lang="uk-UA" smtClean="0"/>
+              <a:t>‹#›</a:t>
             </a:fld>
             <a:endParaRPr lang="uk-UA"/>
           </a:p>
@@ -2386,7 +2379,6 @@
               <a:rPr lang="ru-RU"/>
               <a:t>Образец текста</a:t>
             </a:r>
-            <a:endParaRPr lang="ru-RU"/>
           </a:p>
           <a:p>
             <a:pPr lvl="1"/>
@@ -2394,7 +2386,6 @@
               <a:rPr lang="ru-RU"/>
               <a:t>Второй уровень</a:t>
             </a:r>
-            <a:endParaRPr lang="ru-RU"/>
           </a:p>
           <a:p>
             <a:pPr lvl="2"/>
@@ -2402,7 +2393,6 @@
               <a:rPr lang="ru-RU"/>
               <a:t>Третий уровень</a:t>
             </a:r>
-            <a:endParaRPr lang="ru-RU"/>
           </a:p>
           <a:p>
             <a:pPr lvl="3"/>
@@ -2410,7 +2400,6 @@
               <a:rPr lang="ru-RU"/>
               <a:t>Четвертый уровень</a:t>
             </a:r>
-            <a:endParaRPr lang="ru-RU"/>
           </a:p>
           <a:p>
             <a:pPr lvl="4"/>
@@ -2439,6 +2428,7 @@
           <a:p>
             <a:fld id="{F3B1270B-825F-4A6F-BFBD-8E5D97593686}" type="datetimeFigureOut">
               <a:rPr lang="uk-UA" smtClean="0"/>
+              <a:t>03.03.2020</a:t>
             </a:fld>
             <a:endParaRPr lang="uk-UA"/>
           </a:p>
@@ -2480,6 +2470,7 @@
           <a:p>
             <a:fld id="{A205741A-6C99-45B0-8A04-C4D0F9F7160F}" type="slidenum">
               <a:rPr lang="uk-UA" smtClean="0"/>
+              <a:t>‹#›</a:t>
             </a:fld>
             <a:endParaRPr lang="uk-UA"/>
           </a:p>
@@ -2665,7 +2656,6 @@
               <a:rPr lang="ru-RU"/>
               <a:t>Образец текста</a:t>
             </a:r>
-            <a:endParaRPr lang="ru-RU"/>
           </a:p>
         </p:txBody>
       </p:sp>
@@ -2686,6 +2676,7 @@
           <a:p>
             <a:fld id="{F3B1270B-825F-4A6F-BFBD-8E5D97593686}" type="datetimeFigureOut">
               <a:rPr lang="uk-UA" smtClean="0"/>
+              <a:t>03.03.2020</a:t>
             </a:fld>
             <a:endParaRPr lang="uk-UA"/>
           </a:p>
@@ -2727,6 +2718,7 @@
           <a:p>
             <a:fld id="{A205741A-6C99-45B0-8A04-C4D0F9F7160F}" type="slidenum">
               <a:rPr lang="uk-UA" smtClean="0"/>
+              <a:t>‹#›</a:t>
             </a:fld>
             <a:endParaRPr lang="uk-UA"/>
           </a:p>
@@ -2800,7 +2792,6 @@
               <a:rPr lang="ru-RU"/>
               <a:t>Образец текста</a:t>
             </a:r>
-            <a:endParaRPr lang="ru-RU"/>
           </a:p>
           <a:p>
             <a:pPr lvl="1"/>
@@ -2808,7 +2799,6 @@
               <a:rPr lang="ru-RU"/>
               <a:t>Второй уровень</a:t>
             </a:r>
-            <a:endParaRPr lang="ru-RU"/>
           </a:p>
           <a:p>
             <a:pPr lvl="2"/>
@@ -2816,7 +2806,6 @@
               <a:rPr lang="ru-RU"/>
               <a:t>Третий уровень</a:t>
             </a:r>
-            <a:endParaRPr lang="ru-RU"/>
           </a:p>
           <a:p>
             <a:pPr lvl="3"/>
@@ -2824,7 +2813,6 @@
               <a:rPr lang="ru-RU"/>
               <a:t>Четвертый уровень</a:t>
             </a:r>
-            <a:endParaRPr lang="ru-RU"/>
           </a:p>
           <a:p>
             <a:pPr lvl="4"/>
@@ -2853,6 +2841,7 @@
           <a:p>
             <a:fld id="{F3B1270B-825F-4A6F-BFBD-8E5D97593686}" type="datetimeFigureOut">
               <a:rPr lang="uk-UA" smtClean="0"/>
+              <a:t>03.03.2020</a:t>
             </a:fld>
             <a:endParaRPr lang="uk-UA"/>
           </a:p>
@@ -2894,6 +2883,7 @@
           <a:p>
             <a:fld id="{A205741A-6C99-45B0-8A04-C4D0F9F7160F}" type="slidenum">
               <a:rPr lang="uk-UA" smtClean="0"/>
+              <a:t>‹#›</a:t>
             </a:fld>
             <a:endParaRPr lang="uk-UA"/>
           </a:p>
@@ -2977,7 +2967,6 @@
               <a:rPr lang="ru-RU"/>
               <a:t>Образец текста</a:t>
             </a:r>
-            <a:endParaRPr lang="ru-RU"/>
           </a:p>
           <a:p>
             <a:pPr lvl="1"/>
@@ -2985,7 +2974,6 @@
               <a:rPr lang="ru-RU"/>
               <a:t>Второй уровень</a:t>
             </a:r>
-            <a:endParaRPr lang="ru-RU"/>
           </a:p>
           <a:p>
             <a:pPr lvl="2"/>
@@ -2993,7 +2981,6 @@
               <a:rPr lang="ru-RU"/>
               <a:t>Третий уровень</a:t>
             </a:r>
-            <a:endParaRPr lang="ru-RU"/>
           </a:p>
           <a:p>
             <a:pPr lvl="3"/>
@@ -3001,7 +2988,6 @@
               <a:rPr lang="ru-RU"/>
               <a:t>Четвертый уровень</a:t>
             </a:r>
-            <a:endParaRPr lang="ru-RU"/>
           </a:p>
           <a:p>
             <a:pPr lvl="4"/>
@@ -3030,6 +3016,7 @@
           <a:p>
             <a:fld id="{F3B1270B-825F-4A6F-BFBD-8E5D97593686}" type="datetimeFigureOut">
               <a:rPr lang="uk-UA" smtClean="0"/>
+              <a:t>03.03.2020</a:t>
             </a:fld>
             <a:endParaRPr lang="uk-UA"/>
           </a:p>
@@ -3071,6 +3058,7 @@
           <a:p>
             <a:fld id="{A205741A-6C99-45B0-8A04-C4D0F9F7160F}" type="slidenum">
               <a:rPr lang="uk-UA" smtClean="0"/>
+              <a:t>‹#›</a:t>
             </a:fld>
             <a:endParaRPr lang="uk-UA"/>
           </a:p>
@@ -3249,7 +3237,6 @@
               <a:rPr lang="ru-RU"/>
               <a:t>Образец текста</a:t>
             </a:r>
-            <a:endParaRPr lang="ru-RU"/>
           </a:p>
         </p:txBody>
       </p:sp>
@@ -3270,6 +3257,7 @@
           <a:p>
             <a:fld id="{F3B1270B-825F-4A6F-BFBD-8E5D97593686}" type="datetimeFigureOut">
               <a:rPr lang="uk-UA" smtClean="0"/>
+              <a:t>03.03.2020</a:t>
             </a:fld>
             <a:endParaRPr lang="uk-UA"/>
           </a:p>
@@ -3311,6 +3299,7 @@
           <a:p>
             <a:fld id="{A205741A-6C99-45B0-8A04-C4D0F9F7160F}" type="slidenum">
               <a:rPr lang="uk-UA" smtClean="0"/>
+              <a:t>‹#›</a:t>
             </a:fld>
             <a:endParaRPr lang="uk-UA"/>
           </a:p>
@@ -3389,7 +3378,6 @@
               <a:rPr lang="ru-RU"/>
               <a:t>Образец текста</a:t>
             </a:r>
-            <a:endParaRPr lang="ru-RU"/>
           </a:p>
           <a:p>
             <a:pPr lvl="1"/>
@@ -3397,7 +3385,6 @@
               <a:rPr lang="ru-RU"/>
               <a:t>Второй уровень</a:t>
             </a:r>
-            <a:endParaRPr lang="ru-RU"/>
           </a:p>
           <a:p>
             <a:pPr lvl="2"/>
@@ -3405,7 +3392,6 @@
               <a:rPr lang="ru-RU"/>
               <a:t>Третий уровень</a:t>
             </a:r>
-            <a:endParaRPr lang="ru-RU"/>
           </a:p>
           <a:p>
             <a:pPr lvl="3"/>
@@ -3413,7 +3399,6 @@
               <a:rPr lang="ru-RU"/>
               <a:t>Четвертый уровень</a:t>
             </a:r>
-            <a:endParaRPr lang="ru-RU"/>
           </a:p>
           <a:p>
             <a:pPr lvl="4"/>
@@ -3450,7 +3435,6 @@
               <a:rPr lang="ru-RU"/>
               <a:t>Образец текста</a:t>
             </a:r>
-            <a:endParaRPr lang="ru-RU"/>
           </a:p>
           <a:p>
             <a:pPr lvl="1"/>
@@ -3458,7 +3442,6 @@
               <a:rPr lang="ru-RU"/>
               <a:t>Второй уровень</a:t>
             </a:r>
-            <a:endParaRPr lang="ru-RU"/>
           </a:p>
           <a:p>
             <a:pPr lvl="2"/>
@@ -3466,7 +3449,6 @@
               <a:rPr lang="ru-RU"/>
               <a:t>Третий уровень</a:t>
             </a:r>
-            <a:endParaRPr lang="ru-RU"/>
           </a:p>
           <a:p>
             <a:pPr lvl="3"/>
@@ -3474,7 +3456,6 @@
               <a:rPr lang="ru-RU"/>
               <a:t>Четвертый уровень</a:t>
             </a:r>
-            <a:endParaRPr lang="ru-RU"/>
           </a:p>
           <a:p>
             <a:pPr lvl="4"/>
@@ -3503,6 +3484,7 @@
           <a:p>
             <a:fld id="{F3B1270B-825F-4A6F-BFBD-8E5D97593686}" type="datetimeFigureOut">
               <a:rPr lang="uk-UA" smtClean="0"/>
+              <a:t>03.03.2020</a:t>
             </a:fld>
             <a:endParaRPr lang="uk-UA"/>
           </a:p>
@@ -3544,6 +3526,7 @@
           <a:p>
             <a:fld id="{A205741A-6C99-45B0-8A04-C4D0F9F7160F}" type="slidenum">
               <a:rPr lang="uk-UA" smtClean="0"/>
+              <a:t>‹#›</a:t>
             </a:fld>
             <a:endParaRPr lang="uk-UA"/>
           </a:p>
@@ -3664,7 +3647,6 @@
               <a:rPr lang="ru-RU"/>
               <a:t>Образец текста</a:t>
             </a:r>
-            <a:endParaRPr lang="ru-RU"/>
           </a:p>
         </p:txBody>
       </p:sp>
@@ -3693,7 +3675,6 @@
               <a:rPr lang="ru-RU"/>
               <a:t>Образец текста</a:t>
             </a:r>
-            <a:endParaRPr lang="ru-RU"/>
           </a:p>
           <a:p>
             <a:pPr lvl="1"/>
@@ -3701,7 +3682,6 @@
               <a:rPr lang="ru-RU"/>
               <a:t>Второй уровень</a:t>
             </a:r>
-            <a:endParaRPr lang="ru-RU"/>
           </a:p>
           <a:p>
             <a:pPr lvl="2"/>
@@ -3709,7 +3689,6 @@
               <a:rPr lang="ru-RU"/>
               <a:t>Третий уровень</a:t>
             </a:r>
-            <a:endParaRPr lang="ru-RU"/>
           </a:p>
           <a:p>
             <a:pPr lvl="3"/>
@@ -3717,7 +3696,6 @@
               <a:rPr lang="ru-RU"/>
               <a:t>Четвертый уровень</a:t>
             </a:r>
-            <a:endParaRPr lang="ru-RU"/>
           </a:p>
           <a:p>
             <a:pPr lvl="4"/>
@@ -3791,7 +3769,6 @@
               <a:rPr lang="ru-RU"/>
               <a:t>Образец текста</a:t>
             </a:r>
-            <a:endParaRPr lang="ru-RU"/>
           </a:p>
         </p:txBody>
       </p:sp>
@@ -3820,7 +3797,6 @@
               <a:rPr lang="ru-RU"/>
               <a:t>Образец текста</a:t>
             </a:r>
-            <a:endParaRPr lang="ru-RU"/>
           </a:p>
           <a:p>
             <a:pPr lvl="1"/>
@@ -3828,7 +3804,6 @@
               <a:rPr lang="ru-RU"/>
               <a:t>Второй уровень</a:t>
             </a:r>
-            <a:endParaRPr lang="ru-RU"/>
           </a:p>
           <a:p>
             <a:pPr lvl="2"/>
@@ -3836,7 +3811,6 @@
               <a:rPr lang="ru-RU"/>
               <a:t>Третий уровень</a:t>
             </a:r>
-            <a:endParaRPr lang="ru-RU"/>
           </a:p>
           <a:p>
             <a:pPr lvl="3"/>
@@ -3844,7 +3818,6 @@
               <a:rPr lang="ru-RU"/>
               <a:t>Четвертый уровень</a:t>
             </a:r>
-            <a:endParaRPr lang="ru-RU"/>
           </a:p>
           <a:p>
             <a:pPr lvl="4"/>
@@ -3873,6 +3846,7 @@
           <a:p>
             <a:fld id="{F3B1270B-825F-4A6F-BFBD-8E5D97593686}" type="datetimeFigureOut">
               <a:rPr lang="uk-UA" smtClean="0"/>
+              <a:t>03.03.2020</a:t>
             </a:fld>
             <a:endParaRPr lang="uk-UA"/>
           </a:p>
@@ -3914,6 +3888,7 @@
           <a:p>
             <a:fld id="{A205741A-6C99-45B0-8A04-C4D0F9F7160F}" type="slidenum">
               <a:rPr lang="uk-UA" smtClean="0"/>
+              <a:t>‹#›</a:t>
             </a:fld>
             <a:endParaRPr lang="uk-UA"/>
           </a:p>
@@ -3984,6 +3959,7 @@
           <a:p>
             <a:fld id="{F3B1270B-825F-4A6F-BFBD-8E5D97593686}" type="datetimeFigureOut">
               <a:rPr lang="uk-UA" smtClean="0"/>
+              <a:t>03.03.2020</a:t>
             </a:fld>
             <a:endParaRPr lang="uk-UA"/>
           </a:p>
@@ -4025,6 +4001,7 @@
           <a:p>
             <a:fld id="{A205741A-6C99-45B0-8A04-C4D0F9F7160F}" type="slidenum">
               <a:rPr lang="uk-UA" smtClean="0"/>
+              <a:t>‹#›</a:t>
             </a:fld>
             <a:endParaRPr lang="uk-UA"/>
           </a:p>
@@ -4072,6 +4049,7 @@
           <a:p>
             <a:fld id="{F3B1270B-825F-4A6F-BFBD-8E5D97593686}" type="datetimeFigureOut">
               <a:rPr lang="uk-UA" smtClean="0"/>
+              <a:t>03.03.2020</a:t>
             </a:fld>
             <a:endParaRPr lang="uk-UA"/>
           </a:p>
@@ -4113,6 +4091,7 @@
           <a:p>
             <a:fld id="{A205741A-6C99-45B0-8A04-C4D0F9F7160F}" type="slidenum">
               <a:rPr lang="uk-UA" smtClean="0"/>
+              <a:t>‹#›</a:t>
             </a:fld>
             <a:endParaRPr lang="uk-UA"/>
           </a:p>
@@ -4228,7 +4207,6 @@
               <a:rPr lang="ru-RU"/>
               <a:t>Образец текста</a:t>
             </a:r>
-            <a:endParaRPr lang="ru-RU"/>
           </a:p>
           <a:p>
             <a:pPr lvl="1"/>
@@ -4236,7 +4214,6 @@
               <a:rPr lang="ru-RU"/>
               <a:t>Второй уровень</a:t>
             </a:r>
-            <a:endParaRPr lang="ru-RU"/>
           </a:p>
           <a:p>
             <a:pPr lvl="2"/>
@@ -4244,7 +4221,6 @@
               <a:rPr lang="ru-RU"/>
               <a:t>Третий уровень</a:t>
             </a:r>
-            <a:endParaRPr lang="ru-RU"/>
           </a:p>
           <a:p>
             <a:pPr lvl="3"/>
@@ -4252,7 +4228,6 @@
               <a:rPr lang="ru-RU"/>
               <a:t>Четвертый уровень</a:t>
             </a:r>
-            <a:endParaRPr lang="ru-RU"/>
           </a:p>
           <a:p>
             <a:pPr lvl="4"/>
@@ -4326,7 +4301,6 @@
               <a:rPr lang="ru-RU"/>
               <a:t>Образец текста</a:t>
             </a:r>
-            <a:endParaRPr lang="ru-RU"/>
           </a:p>
         </p:txBody>
       </p:sp>
@@ -4347,6 +4321,7 @@
           <a:p>
             <a:fld id="{F3B1270B-825F-4A6F-BFBD-8E5D97593686}" type="datetimeFigureOut">
               <a:rPr lang="uk-UA" smtClean="0"/>
+              <a:t>03.03.2020</a:t>
             </a:fld>
             <a:endParaRPr lang="uk-UA"/>
           </a:p>
@@ -4388,6 +4363,7 @@
           <a:p>
             <a:fld id="{A205741A-6C99-45B0-8A04-C4D0F9F7160F}" type="slidenum">
               <a:rPr lang="uk-UA" smtClean="0"/>
+              <a:t>‹#›</a:t>
             </a:fld>
             <a:endParaRPr lang="uk-UA"/>
           </a:p>
@@ -4573,7 +4549,6 @@
               <a:rPr lang="ru-RU"/>
               <a:t>Образец текста</a:t>
             </a:r>
-            <a:endParaRPr lang="ru-RU"/>
           </a:p>
         </p:txBody>
       </p:sp>
@@ -4594,6 +4569,7 @@
           <a:p>
             <a:fld id="{F3B1270B-825F-4A6F-BFBD-8E5D97593686}" type="datetimeFigureOut">
               <a:rPr lang="uk-UA" smtClean="0"/>
+              <a:t>03.03.2020</a:t>
             </a:fld>
             <a:endParaRPr lang="uk-UA"/>
           </a:p>
@@ -4635,6 +4611,7 @@
           <a:p>
             <a:fld id="{A205741A-6C99-45B0-8A04-C4D0F9F7160F}" type="slidenum">
               <a:rPr lang="uk-UA" smtClean="0"/>
+              <a:t>‹#›</a:t>
             </a:fld>
             <a:endParaRPr lang="uk-UA"/>
           </a:p>
@@ -4733,7 +4710,6 @@
               <a:rPr lang="ru-RU"/>
               <a:t>Образец текста</a:t>
             </a:r>
-            <a:endParaRPr lang="ru-RU"/>
           </a:p>
           <a:p>
             <a:pPr lvl="1"/>
@@ -4741,7 +4717,6 @@
               <a:rPr lang="ru-RU"/>
               <a:t>Второй уровень</a:t>
             </a:r>
-            <a:endParaRPr lang="ru-RU"/>
           </a:p>
           <a:p>
             <a:pPr lvl="2"/>
@@ -4749,7 +4724,6 @@
               <a:rPr lang="ru-RU"/>
               <a:t>Третий уровень</a:t>
             </a:r>
-            <a:endParaRPr lang="ru-RU"/>
           </a:p>
           <a:p>
             <a:pPr lvl="3"/>
@@ -4757,7 +4731,6 @@
               <a:rPr lang="ru-RU"/>
               <a:t>Четвертый уровень</a:t>
             </a:r>
-            <a:endParaRPr lang="ru-RU"/>
           </a:p>
           <a:p>
             <a:pPr lvl="4"/>
@@ -4804,6 +4777,7 @@
           <a:p>
             <a:fld id="{F3B1270B-825F-4A6F-BFBD-8E5D97593686}" type="datetimeFigureOut">
               <a:rPr lang="uk-UA" smtClean="0"/>
+              <a:t>03.03.2020</a:t>
             </a:fld>
             <a:endParaRPr lang="uk-UA"/>
           </a:p>
@@ -4881,6 +4855,7 @@
           <a:p>
             <a:fld id="{A205741A-6C99-45B0-8A04-C4D0F9F7160F}" type="slidenum">
               <a:rPr lang="uk-UA" smtClean="0"/>
+              <a:t>‹#›</a:t>
             </a:fld>
             <a:endParaRPr lang="uk-UA"/>
           </a:p>
@@ -5270,7 +5245,6 @@
               <a:rPr lang="ru-RU"/>
               <a:t>Образец текста</a:t>
             </a:r>
-            <a:endParaRPr lang="ru-RU"/>
           </a:p>
           <a:p>
             <a:pPr lvl="1"/>
@@ -5278,7 +5252,6 @@
               <a:rPr lang="ru-RU"/>
               <a:t>Второй уровень</a:t>
             </a:r>
-            <a:endParaRPr lang="ru-RU"/>
           </a:p>
           <a:p>
             <a:pPr lvl="2"/>
@@ -5286,7 +5259,6 @@
               <a:rPr lang="ru-RU"/>
               <a:t>Третий уровень</a:t>
             </a:r>
-            <a:endParaRPr lang="ru-RU"/>
           </a:p>
           <a:p>
             <a:pPr lvl="3"/>
@@ -5294,7 +5266,6 @@
               <a:rPr lang="ru-RU"/>
               <a:t>Четвертый уровень</a:t>
             </a:r>
-            <a:endParaRPr lang="ru-RU"/>
           </a:p>
           <a:p>
             <a:pPr lvl="4"/>
@@ -5341,6 +5312,7 @@
           <a:p>
             <a:fld id="{F3B1270B-825F-4A6F-BFBD-8E5D97593686}" type="datetimeFigureOut">
               <a:rPr lang="uk-UA" smtClean="0"/>
+              <a:t>03.03.2020</a:t>
             </a:fld>
             <a:endParaRPr lang="uk-UA"/>
           </a:p>
@@ -5418,6 +5390,7 @@
           <a:p>
             <a:fld id="{A205741A-6C99-45B0-8A04-C4D0F9F7160F}" type="slidenum">
               <a:rPr lang="uk-UA" smtClean="0"/>
+              <a:t>‹#›</a:t>
             </a:fld>
             <a:endParaRPr lang="uk-UA"/>
           </a:p>
@@ -5819,7 +5792,6 @@
               <a:rPr lang="uk-UA" dirty="0"/>
               <a:t>Мальований Денис Олегович</a:t>
             </a:r>
-            <a:endParaRPr lang="uk-UA" dirty="0"/>
           </a:p>
         </p:txBody>
       </p:sp>
@@ -5828,13 +5800,13 @@
   <p:clrMapOvr>
     <a:masterClrMapping/>
   </p:clrMapOvr>
-  <mc:AlternateContent xmlns:mc="http://schemas.openxmlformats.org/markup-compatibility/2006">
-    <mc:Choice xmlns:p14="http://schemas.microsoft.com/office/powerpoint/2010/main" Requires="p14">
+  <mc:AlternateContent xmlns:mc="http://schemas.openxmlformats.org/markup-compatibility/2006" xmlns:p14="http://schemas.microsoft.com/office/powerpoint/2010/main">
+    <mc:Choice Requires="p14">
       <p:transition spd="slow" p14:dur="1500">
         <p:split orient="vert"/>
       </p:transition>
     </mc:Choice>
-    <mc:Fallback>
+    <mc:Fallback xmlns="">
       <p:transition spd="slow">
         <p:split orient="vert"/>
       </p:transition>
@@ -5849,7 +5821,7 @@
     <p:bg>
       <p:bgPr>
         <a:blipFill>
-          <a:blip r:embed="rId1"/>
+          <a:blip r:embed="rId2"/>
           <a:tile tx="0" ty="0" sx="100000" sy="100000" flip="none" algn="tl"/>
         </a:blipFill>
         <a:effectLst/>
@@ -5944,7 +5916,6 @@
               <a:rPr lang="uk-UA" dirty="0"/>
               <a:t>.</a:t>
             </a:r>
-            <a:endParaRPr lang="uk-UA" dirty="0"/>
           </a:p>
         </p:txBody>
       </p:sp>
@@ -5985,15 +5956,15 @@
           <p:nvPr/>
         </p:nvPicPr>
         <p:blipFill>
-          <a:blip r:embed="rId1"/>
+          <a:blip r:embed="rId2"/>
           <a:stretch>
             <a:fillRect/>
           </a:stretch>
         </p:blipFill>
         <p:spPr>
           <a:xfrm>
-            <a:off x="2946718" y="1922463"/>
-            <a:ext cx="6298565" cy="3013075"/>
+            <a:off x="0" y="508819"/>
+            <a:ext cx="12196916" cy="5840361"/>
           </a:xfrm>
           <a:prstGeom prst="rect">
             <a:avLst/>
@@ -6021,7 +5992,7 @@
     <p:bg>
       <p:bgPr>
         <a:blipFill>
-          <a:blip r:embed="rId1"/>
+          <a:blip r:embed="rId2"/>
           <a:tile tx="0" ty="0" sx="100000" sy="100000" flip="none" algn="tl"/>
         </a:blipFill>
         <a:effectLst/>
@@ -6076,7 +6047,6 @@
               <a:rPr lang="uk-UA" dirty="0"/>
               <a:t>-файлах ієрархічно. Тобто між тегами одного небесного тіла розташовується інформація про його супутники.</a:t>
             </a:r>
-            <a:endParaRPr lang="uk-UA" dirty="0"/>
           </a:p>
         </p:txBody>
       </p:sp>
@@ -6115,7 +6085,7 @@
           <p:nvPr/>
         </p:nvPicPr>
         <p:blipFill>
-          <a:blip r:embed="rId1">
+          <a:blip r:embed="rId2">
             <a:extLst>
               <a:ext uri="{28A0092B-C50C-407E-A947-70E740481C1C}">
                 <a14:useLocalDpi xmlns:a14="http://schemas.microsoft.com/office/drawing/2010/main" val="0"/>
@@ -6148,7 +6118,7 @@
           <p:nvPr/>
         </p:nvPicPr>
         <p:blipFill>
-          <a:blip r:embed="rId2">
+          <a:blip r:embed="rId3">
             <a:extLst>
               <a:ext uri="{28A0092B-C50C-407E-A947-70E740481C1C}">
                 <a14:useLocalDpi xmlns:a14="http://schemas.microsoft.com/office/drawing/2010/main" val="0"/>
@@ -6181,7 +6151,7 @@
           <p:nvPr/>
         </p:nvPicPr>
         <p:blipFill>
-          <a:blip r:embed="rId3">
+          <a:blip r:embed="rId4">
             <a:extLst>
               <a:ext uri="{28A0092B-C50C-407E-A947-70E740481C1C}">
                 <a14:useLocalDpi xmlns:a14="http://schemas.microsoft.com/office/drawing/2010/main" val="0"/>
@@ -6224,7 +6194,7 @@
     <p:bg>
       <p:bgPr>
         <a:blipFill>
-          <a:blip r:embed="rId1"/>
+          <a:blip r:embed="rId2"/>
           <a:tile tx="0" ty="0" sx="100000" sy="100000" flip="none" algn="tl"/>
         </a:blipFill>
         <a:effectLst/>
@@ -6279,7 +6249,6 @@
               <a:rPr lang="uk-UA" dirty="0"/>
               <a:t>для гри або редагування, а також титрів. Ви можете обрати режим поодинокої або багатокористувацької гри.</a:t>
             </a:r>
-            <a:endParaRPr lang="uk-UA" dirty="0"/>
           </a:p>
         </p:txBody>
       </p:sp>
@@ -6313,24 +6282,25 @@
       </p:grpSpPr>
       <p:pic>
         <p:nvPicPr>
-          <p:cNvPr id="6" name="Рисунок 5"/>
-          <p:cNvPicPr/>
+          <p:cNvPr id="2" name="Рисунок 1">
+            <a:extLst>
+              <a:ext uri="{FF2B5EF4-FFF2-40B4-BE49-F238E27FC236}">
+                <a16:creationId xmlns:a16="http://schemas.microsoft.com/office/drawing/2014/main" id="{9B4C3133-D895-4404-A850-5B411FD2454B}"/>
+              </a:ext>
+            </a:extLst>
+          </p:cNvPr>
+          <p:cNvPicPr>
+            <a:picLocks noChangeAspect="1"/>
+          </p:cNvPicPr>
           <p:nvPr/>
         </p:nvPicPr>
         <p:blipFill>
-          <a:blip r:embed="rId1">
-            <a:extLst>
-              <a:ext uri="{28A0092B-C50C-407E-A947-70E740481C1C}">
-                <a14:useLocalDpi xmlns:a14="http://schemas.microsoft.com/office/drawing/2010/main" val="0"/>
-              </a:ext>
-            </a:extLst>
-          </a:blip>
-          <a:srcRect/>
+          <a:blip r:embed="rId2"/>
           <a:stretch>
             <a:fillRect/>
           </a:stretch>
         </p:blipFill>
-        <p:spPr bwMode="auto">
+        <p:spPr>
           <a:xfrm>
             <a:off x="0" y="0"/>
             <a:ext cx="12192000" cy="6858000"/>
@@ -6338,10 +6308,6 @@
           <a:prstGeom prst="rect">
             <a:avLst/>
           </a:prstGeom>
-          <a:noFill/>
-          <a:ln>
-            <a:noFill/>
-          </a:ln>
         </p:spPr>
       </p:pic>
     </p:spTree>
@@ -6374,12 +6340,12 @@
       </p:grpSpPr>
       <p:pic>
         <p:nvPicPr>
-          <p:cNvPr id="3" name="Рисунок 2"/>
+          <p:cNvPr id="4" name="Рисунок 3"/>
           <p:cNvPicPr/>
           <p:nvPr/>
         </p:nvPicPr>
         <p:blipFill>
-          <a:blip r:embed="rId1">
+          <a:blip r:embed="rId2">
             <a:extLst>
               <a:ext uri="{28A0092B-C50C-407E-A947-70E740481C1C}">
                 <a14:useLocalDpi xmlns:a14="http://schemas.microsoft.com/office/drawing/2010/main" val="0"/>
@@ -6435,12 +6401,12 @@
       </p:grpSpPr>
       <p:pic>
         <p:nvPicPr>
-          <p:cNvPr id="4" name="Рисунок 3"/>
+          <p:cNvPr id="3" name="Рисунок 2"/>
           <p:cNvPicPr/>
           <p:nvPr/>
         </p:nvPicPr>
         <p:blipFill>
-          <a:blip r:embed="rId1">
+          <a:blip r:embed="rId2">
             <a:extLst>
               <a:ext uri="{28A0092B-C50C-407E-A947-70E740481C1C}">
                 <a14:useLocalDpi xmlns:a14="http://schemas.microsoft.com/office/drawing/2010/main" val="0"/>
@@ -6496,12 +6462,75 @@
       </p:grpSpPr>
       <p:pic>
         <p:nvPicPr>
+          <p:cNvPr id="2" name="Рисунок 1">
+            <a:extLst>
+              <a:ext uri="{FF2B5EF4-FFF2-40B4-BE49-F238E27FC236}">
+                <a16:creationId xmlns:a16="http://schemas.microsoft.com/office/drawing/2014/main" id="{811D4669-B89F-4C10-AA42-A13E0E6170D5}"/>
+              </a:ext>
+            </a:extLst>
+          </p:cNvPr>
+          <p:cNvPicPr>
+            <a:picLocks noChangeAspect="1"/>
+          </p:cNvPicPr>
+          <p:nvPr/>
+        </p:nvPicPr>
+        <p:blipFill>
+          <a:blip r:embed="rId2"/>
+          <a:stretch>
+            <a:fillRect/>
+          </a:stretch>
+        </p:blipFill>
+        <p:spPr>
+          <a:xfrm>
+            <a:off x="0" y="0"/>
+            <a:ext cx="12192000" cy="6858000"/>
+          </a:xfrm>
+          <a:prstGeom prst="rect">
+            <a:avLst/>
+          </a:prstGeom>
+        </p:spPr>
+      </p:pic>
+    </p:spTree>
+    <p:extLst>
+      <p:ext uri="{BB962C8B-B14F-4D97-AF65-F5344CB8AC3E}">
+        <p14:creationId xmlns:p14="http://schemas.microsoft.com/office/powerpoint/2010/main" val="3665701942"/>
+      </p:ext>
+    </p:extLst>
+  </p:cSld>
+  <p:clrMapOvr>
+    <a:masterClrMapping/>
+  </p:clrMapOvr>
+  <p:transition spd="slow">
+    <p:push dir="u"/>
+  </p:transition>
+</p:sld>
+</file>
+
+<file path=ppt/slides/slide19.xml><?xml version="1.0" encoding="utf-8"?>
+<p:sld xmlns:a="http://schemas.openxmlformats.org/drawingml/2006/main" xmlns:r="http://schemas.openxmlformats.org/officeDocument/2006/relationships" xmlns:p="http://schemas.openxmlformats.org/presentationml/2006/main">
+  <p:cSld>
+    <p:spTree>
+      <p:nvGrpSpPr>
+        <p:cNvPr id="1" name=""/>
+        <p:cNvGrpSpPr/>
+        <p:nvPr/>
+      </p:nvGrpSpPr>
+      <p:grpSpPr>
+        <a:xfrm>
+          <a:off x="0" y="0"/>
+          <a:ext cx="0" cy="0"/>
+          <a:chOff x="0" y="0"/>
+          <a:chExt cx="0" cy="0"/>
+        </a:xfrm>
+      </p:grpSpPr>
+      <p:pic>
+        <p:nvPicPr>
           <p:cNvPr id="3" name="Рисунок 2"/>
           <p:cNvPicPr/>
           <p:nvPr/>
         </p:nvPicPr>
         <p:blipFill>
-          <a:blip r:embed="rId1">
+          <a:blip r:embed="rId2">
             <a:extLst>
               <a:ext uri="{28A0092B-C50C-407E-A947-70E740481C1C}">
                 <a14:useLocalDpi xmlns:a14="http://schemas.microsoft.com/office/drawing/2010/main" val="0"/>
@@ -6538,13 +6567,13 @@
 </p:sld>
 </file>
 
-<file path=ppt/slides/slide19.xml><?xml version="1.0" encoding="utf-8"?>
+<file path=ppt/slides/slide2.xml><?xml version="1.0" encoding="utf-8"?>
 <p:sld xmlns:a="http://schemas.openxmlformats.org/drawingml/2006/main" xmlns:r="http://schemas.openxmlformats.org/officeDocument/2006/relationships" xmlns:p="http://schemas.openxmlformats.org/presentationml/2006/main">
   <p:cSld>
     <p:bg>
       <p:bgPr>
         <a:blipFill>
-          <a:blip r:embed="rId1"/>
+          <a:blip r:embed="rId2"/>
           <a:tile tx="0" ty="0" sx="100000" sy="100000" flip="none" algn="tl"/>
         </a:blipFill>
         <a:effectLst/>
@@ -6586,21 +6615,209 @@
           </a:bodyPr>
           <a:lstStyle/>
           <a:p>
-            <a:pPr indent="450850" algn="just"/>
-            <a:r>
-              <a:rPr lang="uk-UA" b="1" dirty="0"/>
-              <a:t>Висновки: </a:t>
-            </a:r>
-            <a:r>
-              <a:rPr lang="uk-UA" dirty="0"/>
-              <a:t>була ретельно досліджена та програмно реалізована модель зоряних систем. Створено інтерфейс для взаємодії з симуляцією, з можливістю завантаження, генерації й редагування власної зоряної системи, керування власним космічним телескопом та гри у режимі </a:t>
-            </a:r>
-            <a:r>
-              <a:rPr lang="uk-UA" dirty="0" err="1"/>
-              <a:t>мультиплеєру</a:t>
-            </a:r>
-            <a:r>
-              <a:rPr lang="uk-UA" dirty="0"/>
+            <a:pPr indent="443230" algn="just"/>
+            <a:r>
+              <a:rPr lang="ru-RU" dirty="0" err="1"/>
+              <a:t>Науково-дослідна</a:t>
+            </a:r>
+            <a:r>
+              <a:rPr lang="ru-RU" dirty="0"/>
+              <a:t> робота </a:t>
+            </a:r>
+            <a:r>
+              <a:rPr lang="ru-RU" dirty="0" err="1"/>
+              <a:t>присвячена</a:t>
+            </a:r>
+            <a:r>
+              <a:rPr lang="ru-RU" dirty="0"/>
+              <a:t> </a:t>
+            </a:r>
+            <a:r>
+              <a:rPr lang="ru-RU" b="1" dirty="0" err="1"/>
+              <a:t>створенню</a:t>
+            </a:r>
+            <a:r>
+              <a:rPr lang="ru-RU" b="1" dirty="0"/>
+              <a:t> </a:t>
+            </a:r>
+            <a:r>
+              <a:rPr lang="ru-RU" b="1" dirty="0" err="1"/>
+              <a:t>мультимедійного</a:t>
+            </a:r>
+            <a:r>
+              <a:rPr lang="ru-RU" b="1" dirty="0"/>
+              <a:t> </a:t>
+            </a:r>
+            <a:r>
+              <a:rPr lang="ru-RU" b="1" dirty="0" err="1"/>
+              <a:t>кросплатформного</a:t>
+            </a:r>
+            <a:r>
+              <a:rPr lang="ru-RU" b="1" dirty="0"/>
+              <a:t> прикладного </a:t>
+            </a:r>
+            <a:r>
+              <a:rPr lang="ru-RU" b="1" dirty="0" err="1"/>
+              <a:t>додатку</a:t>
+            </a:r>
+            <a:r>
+              <a:rPr lang="ru-RU" b="1" dirty="0"/>
+              <a:t> для </a:t>
+            </a:r>
+            <a:r>
+              <a:rPr lang="ru-RU" b="1" dirty="0" err="1"/>
+              <a:t>емулювання</a:t>
+            </a:r>
+            <a:r>
+              <a:rPr lang="ru-RU" b="1" dirty="0"/>
+              <a:t> </a:t>
+            </a:r>
+            <a:r>
+              <a:rPr lang="ru-RU" b="1" dirty="0" err="1"/>
+              <a:t>зоряних</a:t>
+            </a:r>
+            <a:r>
+              <a:rPr lang="ru-RU" b="1" dirty="0"/>
+              <a:t> систем </a:t>
+            </a:r>
+            <a:r>
+              <a:rPr lang="ru-RU" dirty="0"/>
+              <a:t>та </a:t>
+            </a:r>
+            <a:r>
+              <a:rPr lang="ru-RU" dirty="0" err="1"/>
+              <a:t>популяризації</a:t>
+            </a:r>
+            <a:r>
+              <a:rPr lang="ru-RU" dirty="0"/>
+              <a:t> </a:t>
+            </a:r>
+            <a:r>
+              <a:rPr lang="ru-RU" dirty="0" err="1"/>
+              <a:t>технічних</a:t>
+            </a:r>
+            <a:r>
+              <a:rPr lang="ru-RU" dirty="0"/>
+              <a:t> наук, </a:t>
+            </a:r>
+            <a:r>
+              <a:rPr lang="ru-RU" dirty="0" err="1"/>
+              <a:t>зокрема</a:t>
+            </a:r>
+            <a:r>
+              <a:rPr lang="ru-RU" dirty="0"/>
+              <a:t> </a:t>
+            </a:r>
+            <a:r>
+              <a:rPr lang="ru-RU" dirty="0" err="1"/>
+              <a:t>астрономії</a:t>
+            </a:r>
+            <a:r>
+              <a:rPr lang="ru-RU" dirty="0"/>
+              <a:t>, </a:t>
+            </a:r>
+            <a:r>
+              <a:rPr lang="ru-RU" dirty="0" err="1"/>
+              <a:t>фізики</a:t>
+            </a:r>
+            <a:r>
+              <a:rPr lang="ru-RU" dirty="0"/>
+              <a:t>, математики та </a:t>
+            </a:r>
+            <a:r>
+              <a:rPr lang="ru-RU" dirty="0" err="1"/>
+              <a:t>інформатики</a:t>
+            </a:r>
+            <a:r>
+              <a:rPr lang="ru-RU" dirty="0"/>
+              <a:t>. </a:t>
+            </a:r>
+            <a:r>
+              <a:rPr lang="ru-RU" dirty="0" err="1"/>
+              <a:t>Програму</a:t>
+            </a:r>
+            <a:r>
+              <a:rPr lang="ru-RU" dirty="0"/>
+              <a:t> </a:t>
+            </a:r>
+            <a:r>
+              <a:rPr lang="ru-RU" dirty="0" err="1"/>
+              <a:t>можна</a:t>
+            </a:r>
+            <a:r>
+              <a:rPr lang="ru-RU" dirty="0"/>
+              <a:t> </a:t>
+            </a:r>
+            <a:r>
+              <a:rPr lang="ru-RU" dirty="0" err="1"/>
+              <a:t>використовувати</a:t>
+            </a:r>
+            <a:r>
+              <a:rPr lang="ru-RU" dirty="0"/>
+              <a:t> як для </a:t>
+            </a:r>
+            <a:r>
+              <a:rPr lang="ru-RU" dirty="0" err="1"/>
+              <a:t>гри</a:t>
+            </a:r>
+            <a:r>
+              <a:rPr lang="ru-RU" dirty="0"/>
+              <a:t> та </a:t>
+            </a:r>
+            <a:r>
+              <a:rPr lang="ru-RU" dirty="0" err="1"/>
+              <a:t>дослідження</a:t>
+            </a:r>
+            <a:r>
+              <a:rPr lang="ru-RU" dirty="0"/>
+              <a:t> </a:t>
+            </a:r>
+            <a:r>
+              <a:rPr lang="ru-RU" dirty="0" err="1"/>
+              <a:t>Всесвіту</a:t>
+            </a:r>
+            <a:r>
+              <a:rPr lang="ru-RU" dirty="0"/>
+              <a:t>, так і для </a:t>
+            </a:r>
+            <a:r>
+              <a:rPr lang="ru-RU" dirty="0" err="1"/>
+              <a:t>наукових</a:t>
+            </a:r>
+            <a:r>
+              <a:rPr lang="ru-RU" dirty="0"/>
+              <a:t> </a:t>
+            </a:r>
+            <a:r>
+              <a:rPr lang="ru-RU" dirty="0" err="1"/>
+              <a:t>симуляцій</a:t>
+            </a:r>
+            <a:r>
+              <a:rPr lang="ru-RU" dirty="0"/>
+              <a:t>. ПЗ </a:t>
+            </a:r>
+            <a:r>
+              <a:rPr lang="ru-RU" dirty="0" err="1"/>
+              <a:t>позиціюється</a:t>
+            </a:r>
+            <a:r>
+              <a:rPr lang="ru-RU" dirty="0"/>
+              <a:t> як одно- та </a:t>
+            </a:r>
+            <a:r>
+              <a:rPr lang="ru-RU" dirty="0" err="1"/>
+              <a:t>багатокористувацька</a:t>
+            </a:r>
+            <a:r>
+              <a:rPr lang="ru-RU" dirty="0"/>
+              <a:t> </a:t>
+            </a:r>
+            <a:r>
+              <a:rPr lang="ru-RU" dirty="0" err="1"/>
+              <a:t>гра</a:t>
+            </a:r>
+            <a:r>
+              <a:rPr lang="ru-RU" dirty="0"/>
               <a:t>.</a:t>
             </a:r>
             <a:endParaRPr lang="uk-UA" dirty="0"/>
@@ -6618,13 +6835,76 @@
 </p:sld>
 </file>
 
-<file path=ppt/slides/slide2.xml><?xml version="1.0" encoding="utf-8"?>
+<file path=ppt/slides/slide20.xml><?xml version="1.0" encoding="utf-8"?>
+<p:sld xmlns:a="http://schemas.openxmlformats.org/drawingml/2006/main" xmlns:r="http://schemas.openxmlformats.org/officeDocument/2006/relationships" xmlns:p="http://schemas.openxmlformats.org/presentationml/2006/main">
+  <p:cSld>
+    <p:spTree>
+      <p:nvGrpSpPr>
+        <p:cNvPr id="1" name=""/>
+        <p:cNvGrpSpPr/>
+        <p:nvPr/>
+      </p:nvGrpSpPr>
+      <p:grpSpPr>
+        <a:xfrm>
+          <a:off x="0" y="0"/>
+          <a:ext cx="0" cy="0"/>
+          <a:chOff x="0" y="0"/>
+          <a:chExt cx="0" cy="0"/>
+        </a:xfrm>
+      </p:grpSpPr>
+      <p:pic>
+        <p:nvPicPr>
+          <p:cNvPr id="2" name="Рисунок 1">
+            <a:extLst>
+              <a:ext uri="{FF2B5EF4-FFF2-40B4-BE49-F238E27FC236}">
+                <a16:creationId xmlns:a16="http://schemas.microsoft.com/office/drawing/2014/main" id="{F2F477EE-D58C-473A-9B97-CD0282A4B769}"/>
+              </a:ext>
+            </a:extLst>
+          </p:cNvPr>
+          <p:cNvPicPr>
+            <a:picLocks noChangeAspect="1"/>
+          </p:cNvPicPr>
+          <p:nvPr/>
+        </p:nvPicPr>
+        <p:blipFill>
+          <a:blip r:embed="rId2"/>
+          <a:stretch>
+            <a:fillRect/>
+          </a:stretch>
+        </p:blipFill>
+        <p:spPr>
+          <a:xfrm>
+            <a:off x="0" y="0"/>
+            <a:ext cx="12192000" cy="6858000"/>
+          </a:xfrm>
+          <a:prstGeom prst="rect">
+            <a:avLst/>
+          </a:prstGeom>
+        </p:spPr>
+      </p:pic>
+    </p:spTree>
+    <p:extLst>
+      <p:ext uri="{BB962C8B-B14F-4D97-AF65-F5344CB8AC3E}">
+        <p14:creationId xmlns:p14="http://schemas.microsoft.com/office/powerpoint/2010/main" val="1031322645"/>
+      </p:ext>
+    </p:extLst>
+  </p:cSld>
+  <p:clrMapOvr>
+    <a:masterClrMapping/>
+  </p:clrMapOvr>
+  <p:transition spd="slow">
+    <p:push dir="u"/>
+  </p:transition>
+</p:sld>
+</file>
+
+<file path=ppt/slides/slide21.xml><?xml version="1.0" encoding="utf-8"?>
 <p:sld xmlns:a="http://schemas.openxmlformats.org/drawingml/2006/main" xmlns:r="http://schemas.openxmlformats.org/officeDocument/2006/relationships" xmlns:p="http://schemas.openxmlformats.org/presentationml/2006/main">
   <p:cSld>
     <p:bg>
       <p:bgPr>
         <a:blipFill>
-          <a:blip r:embed="rId1"/>
+          <a:blip r:embed="rId2"/>
           <a:tile tx="0" ty="0" sx="100000" sy="100000" flip="none" algn="tl"/>
         </a:blipFill>
         <a:effectLst/>
@@ -6666,212 +6946,23 @@
           </a:bodyPr>
           <a:lstStyle/>
           <a:p>
-            <a:pPr indent="443230" algn="just"/>
-            <a:r>
-              <a:rPr lang="ru-RU" dirty="0" err="1"/>
-              <a:t>Науково-дослідна</a:t>
-            </a:r>
-            <a:r>
-              <a:rPr lang="ru-RU" dirty="0"/>
-              <a:t> робота </a:t>
-            </a:r>
-            <a:r>
-              <a:rPr lang="ru-RU" dirty="0" err="1"/>
-              <a:t>присвячена</a:t>
-            </a:r>
-            <a:r>
-              <a:rPr lang="ru-RU" dirty="0"/>
-              <a:t> </a:t>
-            </a:r>
-            <a:r>
-              <a:rPr lang="ru-RU" b="1" dirty="0" err="1"/>
-              <a:t>створенню</a:t>
-            </a:r>
-            <a:r>
-              <a:rPr lang="ru-RU" b="1" dirty="0"/>
-              <a:t> </a:t>
-            </a:r>
-            <a:r>
-              <a:rPr lang="ru-RU" b="1" dirty="0" err="1"/>
-              <a:t>мультимедійного</a:t>
-            </a:r>
-            <a:r>
-              <a:rPr lang="ru-RU" b="1" dirty="0"/>
-              <a:t> </a:t>
-            </a:r>
-            <a:r>
-              <a:rPr lang="ru-RU" b="1" dirty="0" err="1"/>
-              <a:t>кросплатформного</a:t>
-            </a:r>
-            <a:r>
-              <a:rPr lang="ru-RU" b="1" dirty="0"/>
-              <a:t> прикладного </a:t>
-            </a:r>
-            <a:r>
-              <a:rPr lang="ru-RU" b="1" dirty="0" err="1"/>
-              <a:t>додатку</a:t>
-            </a:r>
-            <a:r>
-              <a:rPr lang="ru-RU" b="1" dirty="0"/>
-              <a:t> для </a:t>
-            </a:r>
-            <a:r>
-              <a:rPr lang="ru-RU" b="1" dirty="0" err="1"/>
-              <a:t>емулювання</a:t>
-            </a:r>
-            <a:r>
-              <a:rPr lang="ru-RU" b="1" dirty="0"/>
-              <a:t> </a:t>
-            </a:r>
-            <a:r>
-              <a:rPr lang="ru-RU" b="1" dirty="0" err="1"/>
-              <a:t>зоряних</a:t>
-            </a:r>
-            <a:r>
-              <a:rPr lang="ru-RU" b="1" dirty="0"/>
-              <a:t> систем </a:t>
-            </a:r>
-            <a:r>
-              <a:rPr lang="ru-RU" dirty="0"/>
-              <a:t>та </a:t>
-            </a:r>
-            <a:r>
-              <a:rPr lang="ru-RU" dirty="0" err="1"/>
-              <a:t>популяризації</a:t>
-            </a:r>
-            <a:r>
-              <a:rPr lang="ru-RU" dirty="0"/>
-              <a:t> </a:t>
-            </a:r>
-            <a:r>
-              <a:rPr lang="ru-RU" dirty="0" err="1"/>
-              <a:t>технічних</a:t>
-            </a:r>
-            <a:r>
-              <a:rPr lang="ru-RU" dirty="0"/>
-              <a:t> наук, </a:t>
-            </a:r>
-            <a:r>
-              <a:rPr lang="ru-RU" dirty="0" err="1"/>
-              <a:t>зокрема</a:t>
-            </a:r>
-            <a:r>
-              <a:rPr lang="ru-RU" dirty="0"/>
-              <a:t> </a:t>
-            </a:r>
-            <a:r>
-              <a:rPr lang="ru-RU" dirty="0" err="1"/>
-              <a:t>астрономії</a:t>
-            </a:r>
-            <a:r>
-              <a:rPr lang="ru-RU" dirty="0"/>
-              <a:t>, </a:t>
-            </a:r>
-            <a:r>
-              <a:rPr lang="ru-RU" dirty="0" err="1"/>
-              <a:t>фізики</a:t>
-            </a:r>
-            <a:r>
-              <a:rPr lang="ru-RU" dirty="0"/>
-              <a:t>, математики та </a:t>
-            </a:r>
-            <a:r>
-              <a:rPr lang="ru-RU" dirty="0" err="1"/>
-              <a:t>інформатики</a:t>
-            </a:r>
-            <a:r>
-              <a:rPr lang="ru-RU" dirty="0"/>
-              <a:t>. </a:t>
-            </a:r>
-            <a:r>
-              <a:rPr lang="ru-RU" dirty="0" err="1"/>
-              <a:t>Програму</a:t>
-            </a:r>
-            <a:r>
-              <a:rPr lang="ru-RU" dirty="0"/>
-              <a:t> </a:t>
-            </a:r>
-            <a:r>
-              <a:rPr lang="ru-RU" dirty="0" err="1"/>
-              <a:t>можна</a:t>
-            </a:r>
-            <a:r>
-              <a:rPr lang="ru-RU" dirty="0"/>
-              <a:t> </a:t>
-            </a:r>
-            <a:r>
-              <a:rPr lang="ru-RU" dirty="0" err="1"/>
-              <a:t>використовувати</a:t>
-            </a:r>
-            <a:r>
-              <a:rPr lang="ru-RU" dirty="0"/>
-              <a:t> як для </a:t>
-            </a:r>
-            <a:r>
-              <a:rPr lang="ru-RU" dirty="0" err="1"/>
-              <a:t>гри</a:t>
-            </a:r>
-            <a:r>
-              <a:rPr lang="ru-RU" dirty="0"/>
-              <a:t> та </a:t>
-            </a:r>
-            <a:r>
-              <a:rPr lang="ru-RU" dirty="0" err="1"/>
-              <a:t>дослідження</a:t>
-            </a:r>
-            <a:r>
-              <a:rPr lang="ru-RU" dirty="0"/>
-              <a:t> </a:t>
-            </a:r>
-            <a:r>
-              <a:rPr lang="ru-RU" dirty="0" err="1"/>
-              <a:t>Всесвіту</a:t>
-            </a:r>
-            <a:r>
-              <a:rPr lang="ru-RU" dirty="0"/>
-              <a:t>, так і для </a:t>
-            </a:r>
-            <a:r>
-              <a:rPr lang="ru-RU" dirty="0" err="1"/>
-              <a:t>наукових</a:t>
-            </a:r>
-            <a:r>
-              <a:rPr lang="ru-RU" dirty="0"/>
-              <a:t> </a:t>
-            </a:r>
-            <a:r>
-              <a:rPr lang="ru-RU" dirty="0" err="1"/>
-              <a:t>симуляцій</a:t>
-            </a:r>
-            <a:r>
-              <a:rPr lang="ru-RU" dirty="0"/>
-              <a:t>. ПЗ </a:t>
-            </a:r>
-            <a:r>
-              <a:rPr lang="ru-RU" dirty="0" err="1"/>
-              <a:t>позиціюється</a:t>
-            </a:r>
-            <a:r>
-              <a:rPr lang="ru-RU" dirty="0"/>
-              <a:t> як одно- та </a:t>
-            </a:r>
-            <a:r>
-              <a:rPr lang="ru-RU" dirty="0" err="1"/>
-              <a:t>багатокористувацька</a:t>
-            </a:r>
-            <a:r>
-              <a:rPr lang="ru-RU" dirty="0"/>
-              <a:t> </a:t>
-            </a:r>
-            <a:r>
-              <a:rPr lang="ru-RU" dirty="0" err="1"/>
-              <a:t>гра</a:t>
-            </a:r>
-            <a:r>
-              <a:rPr lang="ru-RU" dirty="0"/>
+            <a:pPr indent="450850" algn="just"/>
+            <a:r>
+              <a:rPr lang="uk-UA" b="1" dirty="0"/>
+              <a:t>Висновки: </a:t>
+            </a:r>
+            <a:r>
+              <a:rPr lang="uk-UA" dirty="0"/>
+              <a:t>була ретельно досліджена та програмно реалізована модель зоряних систем. Створено інтерфейс для взаємодії з симуляцією, з можливістю завантаження, генерації й редагування власної зоряної системи, керування власним космічним телескопом та гри у режимі </a:t>
+            </a:r>
+            <a:r>
+              <a:rPr lang="uk-UA" dirty="0" err="1"/>
+              <a:t>мультиплеєру</a:t>
+            </a:r>
+            <a:r>
+              <a:rPr lang="uk-UA" dirty="0"/>
               <a:t>.</a:t>
             </a:r>
-            <a:endParaRPr lang="uk-UA" dirty="0"/>
           </a:p>
         </p:txBody>
       </p:sp>
@@ -6886,13 +6977,13 @@
 </p:sld>
 </file>
 
-<file path=ppt/slides/slide20.xml><?xml version="1.0" encoding="utf-8"?>
+<file path=ppt/slides/slide22.xml><?xml version="1.0" encoding="utf-8"?>
 <p:sld xmlns:a="http://schemas.openxmlformats.org/drawingml/2006/main" xmlns:r="http://schemas.openxmlformats.org/officeDocument/2006/relationships" xmlns:p="http://schemas.openxmlformats.org/presentationml/2006/main">
   <p:cSld>
     <p:bg>
       <p:bgPr>
         <a:blipFill>
-          <a:blip r:embed="rId1"/>
+          <a:blip r:embed="rId2"/>
           <a:tile tx="0" ty="0" sx="100000" sy="100000" flip="none" algn="tl"/>
         </a:blipFill>
         <a:effectLst/>
@@ -6939,7 +7030,6 @@
               <a:rPr lang="uk-UA" dirty="0"/>
               <a:t>Використовуючи розроблену програму люди навчаються, експериментують, набувають знань у сфері астрономії й фізики. Крім того, ПЗ можна використовувати для науково точної симуляції зоряних систем.</a:t>
             </a:r>
-            <a:endParaRPr lang="uk-UA" dirty="0"/>
           </a:p>
         </p:txBody>
       </p:sp>
@@ -6954,7 +7044,7 @@
 </p:sld>
 </file>
 
-<file path=ppt/slides/slide21.xml><?xml version="1.0" encoding="utf-8"?>
+<file path=ppt/slides/slide23.xml><?xml version="1.0" encoding="utf-8"?>
 <p:sld xmlns:a="http://schemas.openxmlformats.org/drawingml/2006/main" xmlns:r="http://schemas.openxmlformats.org/officeDocument/2006/relationships" xmlns:p="http://schemas.openxmlformats.org/presentationml/2006/main">
   <p:cSld>
     <p:bg>
@@ -7018,9 +7108,6 @@
               </a:rPr>
               <a:t>Дякую за увагу!</a:t>
             </a:r>
-            <a:endParaRPr lang="uk-UA" sz="7200" b="1" dirty="0">
-              <a:latin typeface="+mn-lt"/>
-            </a:endParaRPr>
           </a:p>
         </p:txBody>
       </p:sp>
@@ -7063,7 +7150,7 @@
             </a:r>
             <a:r>
               <a:rPr lang="en-US" sz="3200" dirty="0">
-                <a:hlinkClick r:id="rId1"/>
+                <a:hlinkClick r:id="rId2"/>
               </a:rPr>
               <a:t>https://gitlab.com/maldenol/spacepioneers/</a:t>
             </a:r>
@@ -7087,13 +7174,13 @@
   <p:clrMapOvr>
     <a:masterClrMapping/>
   </p:clrMapOvr>
-  <mc:AlternateContent xmlns:mc="http://schemas.openxmlformats.org/markup-compatibility/2006">
-    <mc:Choice xmlns:p14="http://schemas.microsoft.com/office/powerpoint/2010/main" Requires="p14">
+  <mc:AlternateContent xmlns:mc="http://schemas.openxmlformats.org/markup-compatibility/2006" xmlns:p14="http://schemas.microsoft.com/office/powerpoint/2010/main">
+    <mc:Choice Requires="p14">
       <p:transition spd="slow">
         <p14:flash/>
       </p:transition>
     </mc:Choice>
-    <mc:Fallback>
+    <mc:Fallback xmlns="">
       <p:transition spd="slow">
         <p:fade/>
       </p:transition>
@@ -7108,7 +7195,7 @@
     <p:bg>
       <p:bgPr>
         <a:blipFill>
-          <a:blip r:embed="rId1"/>
+          <a:blip r:embed="rId2"/>
           <a:tile tx="0" ty="0" sx="100000" sy="100000" flip="none" algn="tl"/>
         </a:blipFill>
         <a:effectLst/>
@@ -7220,7 +7307,6 @@
               <a:rPr lang="uk-UA" dirty="0"/>
               <a:t>.</a:t>
             </a:r>
-            <a:endParaRPr lang="uk-UA" dirty="0"/>
           </a:p>
         </p:txBody>
       </p:sp>
@@ -7241,7 +7327,7 @@
     <p:bg>
       <p:bgPr>
         <a:blipFill>
-          <a:blip r:embed="rId1"/>
+          <a:blip r:embed="rId2"/>
           <a:tile tx="0" ty="0" sx="100000" sy="100000" flip="none" algn="tl"/>
         </a:blipFill>
         <a:effectLst/>
@@ -7320,7 +7406,6 @@
               <a:rPr lang="uk-UA" dirty="0"/>
               <a:t>. Вона надає багато можливостей при роботі з графікою, а багата документація й різноманіття функцій робить процес розробки значно легшим.</a:t>
             </a:r>
-            <a:endParaRPr lang="uk-UA" dirty="0"/>
           </a:p>
         </p:txBody>
       </p:sp>
@@ -7341,7 +7426,7 @@
     <p:bg>
       <p:bgPr>
         <a:blipFill>
-          <a:blip r:embed="rId1"/>
+          <a:blip r:embed="rId2"/>
           <a:tile tx="0" ty="0" sx="100000" sy="100000" flip="none" algn="tl"/>
         </a:blipFill>
         <a:effectLst/>
@@ -7416,7 +7501,6 @@
               <a:rPr lang="uk-UA" dirty="0"/>
               <a:t>яті, має в рази більшу швидкодію, а також графічні покращення.</a:t>
             </a:r>
-            <a:endParaRPr lang="uk-UA" dirty="0"/>
           </a:p>
         </p:txBody>
       </p:sp>
@@ -7437,7 +7521,7 @@
     <p:bg>
       <p:bgPr>
         <a:blipFill>
-          <a:blip r:embed="rId1"/>
+          <a:blip r:embed="rId2"/>
           <a:tile tx="0" ty="0" sx="100000" sy="100000" flip="none" algn="tl"/>
         </a:blipFill>
         <a:effectLst/>
@@ -7492,7 +7576,6 @@
               <a:rPr lang="uk-UA" dirty="0"/>
               <a:t> взаємодію компонентів зоряних систем. Тобто всі розрахунки між будь-якими космічними тілами відбуваються у кожен такт виконання за законами всесвітнього тяжіння та Ньютона.</a:t>
             </a:r>
-            <a:endParaRPr lang="uk-UA" dirty="0"/>
           </a:p>
         </p:txBody>
       </p:sp>
@@ -7513,7 +7596,7 @@
     <p:bg>
       <p:bgPr>
         <a:blipFill>
-          <a:blip r:embed="rId1"/>
+          <a:blip r:embed="rId2"/>
           <a:tile tx="0" ty="0" sx="100000" sy="100000" flip="none" algn="tl"/>
         </a:blipFill>
         <a:effectLst/>
@@ -7561,51 +7644,63 @@
               <a:t>Архітектура ПЗ складається з таких класів: </a:t>
             </a:r>
             <a:r>
-              <a:rPr lang="en-US" b="1" dirty="0"/>
+              <a:rPr lang="uk-UA" b="1" dirty="0" err="1"/>
               <a:t>Interface</a:t>
+            </a:r>
+            <a:r>
+              <a:rPr lang="uk-UA" dirty="0"/>
+              <a:t> (</a:t>
+            </a:r>
+            <a:r>
+              <a:rPr lang="uk-UA" b="1" dirty="0" err="1"/>
+              <a:t>Camera</a:t>
             </a:r>
             <a:r>
               <a:rPr lang="uk-UA" dirty="0"/>
               <a:t>, </a:t>
             </a:r>
             <a:r>
-              <a:rPr lang="en-US" b="1" dirty="0"/>
+              <a:rPr lang="uk-UA" b="1" dirty="0" err="1"/>
               <a:t>Button</a:t>
-            </a:r>
-            <a:r>
-              <a:rPr lang="en-US" dirty="0"/>
-              <a:t> (in </a:t>
-            </a:r>
-            <a:r>
-              <a:rPr lang="en-US" b="1" dirty="0"/>
-              <a:t>Interface</a:t>
-            </a:r>
-            <a:r>
-              <a:rPr lang="en-US" dirty="0"/>
-              <a:t>), </a:t>
-            </a:r>
-            <a:r>
-              <a:rPr lang="en-US" b="1" dirty="0"/>
-              <a:t>Space</a:t>
             </a:r>
             <a:r>
               <a:rPr lang="uk-UA" dirty="0"/>
               <a:t>, </a:t>
             </a:r>
             <a:r>
-              <a:rPr lang="en-US" b="1" dirty="0"/>
+              <a:rPr lang="uk-UA" b="1" dirty="0" err="1"/>
+              <a:t>SoundtrackThread</a:t>
+            </a:r>
+            <a:r>
+              <a:rPr lang="uk-UA" dirty="0"/>
+              <a:t> та </a:t>
+            </a:r>
+            <a:r>
+              <a:rPr lang="uk-UA" b="1" dirty="0" err="1"/>
+              <a:t>TextureLoaderThread</a:t>
+            </a:r>
+            <a:r>
+              <a:rPr lang="uk-UA" dirty="0"/>
+              <a:t> всередині), </a:t>
+            </a:r>
+            <a:r>
+              <a:rPr lang="uk-UA" b="1" dirty="0" err="1"/>
+              <a:t>Space</a:t>
+            </a:r>
+            <a:r>
+              <a:rPr lang="uk-UA" dirty="0"/>
+              <a:t> (</a:t>
+            </a:r>
+            <a:r>
+              <a:rPr lang="uk-UA" b="1" dirty="0" err="1"/>
               <a:t>Body</a:t>
             </a:r>
             <a:r>
-              <a:rPr lang="en-US" dirty="0"/>
-              <a:t> (in </a:t>
-            </a:r>
-            <a:r>
-              <a:rPr lang="en-US" b="1" dirty="0"/>
-              <a:t>Body</a:t>
-            </a:r>
-            <a:r>
-              <a:rPr lang="en-US" dirty="0"/>
+              <a:rPr lang="uk-UA" dirty="0"/>
+              <a:t> всередині</a:t>
+            </a:r>
+            <a:r>
+              <a:rPr lang="uk-UA" b="1" dirty="0"/>
               <a:t>)</a:t>
             </a:r>
             <a:r>
@@ -7613,22 +7708,21 @@
               <a:t>, </a:t>
             </a:r>
             <a:r>
-              <a:rPr lang="en-US" b="1" dirty="0"/>
-              <a:t>Server</a:t>
+              <a:rPr lang="uk-UA" b="1" dirty="0" err="1"/>
+              <a:t>Client</a:t>
             </a:r>
             <a:r>
               <a:rPr lang="uk-UA" dirty="0"/>
               <a:t> та </a:t>
             </a:r>
             <a:r>
-              <a:rPr lang="en-US" b="1" dirty="0"/>
-              <a:t>Client</a:t>
+              <a:rPr lang="uk-UA" b="1" dirty="0"/>
+              <a:t>Server</a:t>
             </a:r>
             <a:r>
               <a:rPr lang="uk-UA" dirty="0"/>
               <a:t>.</a:t>
             </a:r>
-            <a:endParaRPr lang="uk-UA" dirty="0"/>
           </a:p>
         </p:txBody>
       </p:sp>
@@ -7649,7 +7743,7 @@
     <p:bg>
       <p:bgPr>
         <a:blipFill>
-          <a:blip r:embed="rId1"/>
+          <a:blip r:embed="rId2"/>
           <a:tile tx="0" ty="0" sx="100000" sy="100000" flip="none" algn="tl"/>
         </a:blipFill>
         <a:effectLst/>
@@ -7720,7 +7814,6 @@
               <a:rPr lang="uk-UA" dirty="0"/>
               <a:t>– модель небесного тіла.</a:t>
             </a:r>
-            <a:endParaRPr lang="uk-UA" dirty="0"/>
           </a:p>
         </p:txBody>
       </p:sp>
@@ -7741,7 +7834,7 @@
     <p:bg>
       <p:bgPr>
         <a:blipFill>
-          <a:blip r:embed="rId1"/>
+          <a:blip r:embed="rId2"/>
           <a:tile tx="0" ty="0" sx="100000" sy="100000" flip="none" algn="tl"/>
         </a:blipFill>
         <a:effectLst/>
@@ -7900,7 +7993,6 @@
               <a:rPr lang="uk-UA" dirty="0"/>
               <a:t>.</a:t>
             </a:r>
-            <a:endParaRPr lang="uk-UA" dirty="0"/>
           </a:p>
         </p:txBody>
       </p:sp>
@@ -8166,6 +8258,8 @@
       </a:bgFillStyleLst>
     </a:fmtScheme>
   </a:themeElements>
+  <a:objectDefaults/>
+  <a:extraClrSchemeLst/>
   <a:extLst>
     <a:ext uri="{05A4C25C-085E-4340-85A3-A5531E510DB2}">
       <thm15:themeFamily xmlns:thm15="http://schemas.microsoft.com/office/thememl/2012/main" name="Office Theme" id="{62F939B6-93AF-4DB8-9C6B-D6C7DFDC589F}" vid="{4A3C46E8-61CC-4603-A589-7422A47A8E4A}"/>
@@ -8425,6 +8519,8 @@
       </a:bgFillStyleLst>
     </a:fmtScheme>
   </a:themeElements>
+  <a:objectDefaults/>
+  <a:extraClrSchemeLst/>
   <a:extLst>
     <a:ext uri="{05A4C25C-085E-4340-85A3-A5531E510DB2}">
       <thm15:themeFamily xmlns:thm15="http://schemas.microsoft.com/office/thememl/2012/main" name="Office Theme" id="{62F939B6-93AF-4DB8-9C6B-D6C7DFDC589F}" vid="{4A3C46E8-61CC-4603-A589-7422A47A8E4A}"/>

</xml_diff>

<commit_message>
Updated .xmi, .docx and .pptx files
</commit_message>
<xml_diff>
--- a/documentation/МАНУ2020.pptx
+++ b/documentation/МАНУ2020.pptx
@@ -3,32 +3,32 @@
 <p:presentation xmlns:a="http://schemas.openxmlformats.org/drawingml/2006/main" xmlns:r="http://schemas.openxmlformats.org/officeDocument/2006/relationships" xmlns:p="http://schemas.openxmlformats.org/presentationml/2006/main">
   <p:sldMasterIdLst>
     <p:sldMasterId id="2147483648" r:id="rId1"/>
-    <p:sldMasterId id="2147483660" r:id="rId2"/>
+    <p:sldMasterId id="2147483660" r:id="rId3"/>
   </p:sldMasterIdLst>
   <p:sldIdLst>
-    <p:sldId id="256" r:id="rId3"/>
-    <p:sldId id="257" r:id="rId4"/>
-    <p:sldId id="261" r:id="rId5"/>
-    <p:sldId id="262" r:id="rId6"/>
-    <p:sldId id="263" r:id="rId7"/>
-    <p:sldId id="275" r:id="rId8"/>
-    <p:sldId id="264" r:id="rId9"/>
-    <p:sldId id="279" r:id="rId10"/>
-    <p:sldId id="280" r:id="rId11"/>
-    <p:sldId id="281" r:id="rId12"/>
-    <p:sldId id="259" r:id="rId13"/>
-    <p:sldId id="266" r:id="rId14"/>
-    <p:sldId id="267" r:id="rId15"/>
-    <p:sldId id="270" r:id="rId16"/>
-    <p:sldId id="271" r:id="rId17"/>
-    <p:sldId id="273" r:id="rId18"/>
-    <p:sldId id="272" r:id="rId19"/>
-    <p:sldId id="283" r:id="rId20"/>
-    <p:sldId id="274" r:id="rId21"/>
-    <p:sldId id="282" r:id="rId22"/>
-    <p:sldId id="268" r:id="rId23"/>
-    <p:sldId id="269" r:id="rId24"/>
-    <p:sldId id="258" r:id="rId25"/>
+    <p:sldId id="256" r:id="rId4"/>
+    <p:sldId id="257" r:id="rId5"/>
+    <p:sldId id="261" r:id="rId6"/>
+    <p:sldId id="262" r:id="rId7"/>
+    <p:sldId id="263" r:id="rId8"/>
+    <p:sldId id="275" r:id="rId9"/>
+    <p:sldId id="264" r:id="rId10"/>
+    <p:sldId id="279" r:id="rId11"/>
+    <p:sldId id="280" r:id="rId12"/>
+    <p:sldId id="281" r:id="rId13"/>
+    <p:sldId id="259" r:id="rId14"/>
+    <p:sldId id="266" r:id="rId15"/>
+    <p:sldId id="267" r:id="rId16"/>
+    <p:sldId id="270" r:id="rId17"/>
+    <p:sldId id="271" r:id="rId18"/>
+    <p:sldId id="273" r:id="rId19"/>
+    <p:sldId id="272" r:id="rId20"/>
+    <p:sldId id="283" r:id="rId21"/>
+    <p:sldId id="274" r:id="rId22"/>
+    <p:sldId id="282" r:id="rId23"/>
+    <p:sldId id="268" r:id="rId24"/>
+    <p:sldId id="269" r:id="rId25"/>
+    <p:sldId id="258" r:id="rId26"/>
   </p:sldIdLst>
   <p:sldSz cx="12192000" cy="6858000"/>
   <p:notesSz cx="6858000" cy="9144000"/>
@@ -127,11 +127,6 @@
       </a:defRPr>
     </a:lvl9pPr>
   </p:defaultTextStyle>
-  <p:extLst>
-    <p:ext uri="{EFAFB233-063F-42B5-8137-9DF3F51BA10A}">
-      <p15:sldGuideLst xmlns:p15="http://schemas.microsoft.com/office/powerpoint/2012/main"/>
-    </p:ext>
-  </p:extLst>
 </p:presentation>
 </file>
 
@@ -266,7 +261,6 @@
           <a:p>
             <a:fld id="{F3B1270B-825F-4A6F-BFBD-8E5D97593686}" type="datetimeFigureOut">
               <a:rPr lang="uk-UA" smtClean="0"/>
-              <a:t>03.03.2020</a:t>
             </a:fld>
             <a:endParaRPr lang="uk-UA"/>
           </a:p>
@@ -308,7 +302,6 @@
           <a:p>
             <a:fld id="{A205741A-6C99-45B0-8A04-C4D0F9F7160F}" type="slidenum">
               <a:rPr lang="uk-UA" smtClean="0"/>
-              <a:t>‹#›</a:t>
             </a:fld>
             <a:endParaRPr lang="uk-UA"/>
           </a:p>
@@ -382,6 +375,7 @@
               <a:rPr lang="ru-RU"/>
               <a:t>Образец текста</a:t>
             </a:r>
+            <a:endParaRPr lang="ru-RU"/>
           </a:p>
           <a:p>
             <a:pPr lvl="1"/>
@@ -389,6 +383,7 @@
               <a:rPr lang="ru-RU"/>
               <a:t>Второй уровень</a:t>
             </a:r>
+            <a:endParaRPr lang="ru-RU"/>
           </a:p>
           <a:p>
             <a:pPr lvl="2"/>
@@ -396,6 +391,7 @@
               <a:rPr lang="ru-RU"/>
               <a:t>Третий уровень</a:t>
             </a:r>
+            <a:endParaRPr lang="ru-RU"/>
           </a:p>
           <a:p>
             <a:pPr lvl="3"/>
@@ -403,6 +399,7 @@
               <a:rPr lang="ru-RU"/>
               <a:t>Четвертый уровень</a:t>
             </a:r>
+            <a:endParaRPr lang="ru-RU"/>
           </a:p>
           <a:p>
             <a:pPr lvl="4"/>
@@ -431,7 +428,6 @@
           <a:p>
             <a:fld id="{F3B1270B-825F-4A6F-BFBD-8E5D97593686}" type="datetimeFigureOut">
               <a:rPr lang="uk-UA" smtClean="0"/>
-              <a:t>03.03.2020</a:t>
             </a:fld>
             <a:endParaRPr lang="uk-UA"/>
           </a:p>
@@ -473,7 +469,6 @@
           <a:p>
             <a:fld id="{A205741A-6C99-45B0-8A04-C4D0F9F7160F}" type="slidenum">
               <a:rPr lang="uk-UA" smtClean="0"/>
-              <a:t>‹#›</a:t>
             </a:fld>
             <a:endParaRPr lang="uk-UA"/>
           </a:p>
@@ -557,6 +552,7 @@
               <a:rPr lang="ru-RU"/>
               <a:t>Образец текста</a:t>
             </a:r>
+            <a:endParaRPr lang="ru-RU"/>
           </a:p>
           <a:p>
             <a:pPr lvl="1"/>
@@ -564,6 +560,7 @@
               <a:rPr lang="ru-RU"/>
               <a:t>Второй уровень</a:t>
             </a:r>
+            <a:endParaRPr lang="ru-RU"/>
           </a:p>
           <a:p>
             <a:pPr lvl="2"/>
@@ -571,6 +568,7 @@
               <a:rPr lang="ru-RU"/>
               <a:t>Третий уровень</a:t>
             </a:r>
+            <a:endParaRPr lang="ru-RU"/>
           </a:p>
           <a:p>
             <a:pPr lvl="3"/>
@@ -578,6 +576,7 @@
               <a:rPr lang="ru-RU"/>
               <a:t>Четвертый уровень</a:t>
             </a:r>
+            <a:endParaRPr lang="ru-RU"/>
           </a:p>
           <a:p>
             <a:pPr lvl="4"/>
@@ -606,7 +605,6 @@
           <a:p>
             <a:fld id="{F3B1270B-825F-4A6F-BFBD-8E5D97593686}" type="datetimeFigureOut">
               <a:rPr lang="uk-UA" smtClean="0"/>
-              <a:t>03.03.2020</a:t>
             </a:fld>
             <a:endParaRPr lang="uk-UA"/>
           </a:p>
@@ -648,7 +646,6 @@
           <a:p>
             <a:fld id="{A205741A-6C99-45B0-8A04-C4D0F9F7160F}" type="slidenum">
               <a:rPr lang="uk-UA" smtClean="0"/>
-              <a:t>‹#›</a:t>
             </a:fld>
             <a:endParaRPr lang="uk-UA"/>
           </a:p>
@@ -793,7 +790,6 @@
           <a:p>
             <a:fld id="{F3B1270B-825F-4A6F-BFBD-8E5D97593686}" type="datetimeFigureOut">
               <a:rPr lang="uk-UA" smtClean="0"/>
-              <a:t>03.03.2020</a:t>
             </a:fld>
             <a:endParaRPr lang="uk-UA"/>
           </a:p>
@@ -835,7 +831,6 @@
           <a:p>
             <a:fld id="{A205741A-6C99-45B0-8A04-C4D0F9F7160F}" type="slidenum">
               <a:rPr lang="uk-UA" smtClean="0"/>
-              <a:t>‹#›</a:t>
             </a:fld>
             <a:endParaRPr lang="uk-UA"/>
           </a:p>
@@ -909,6 +904,7 @@
               <a:rPr lang="ru-RU"/>
               <a:t>Образец текста</a:t>
             </a:r>
+            <a:endParaRPr lang="ru-RU"/>
           </a:p>
           <a:p>
             <a:pPr lvl="1"/>
@@ -916,6 +912,7 @@
               <a:rPr lang="ru-RU"/>
               <a:t>Второй уровень</a:t>
             </a:r>
+            <a:endParaRPr lang="ru-RU"/>
           </a:p>
           <a:p>
             <a:pPr lvl="2"/>
@@ -923,6 +920,7 @@
               <a:rPr lang="ru-RU"/>
               <a:t>Третий уровень</a:t>
             </a:r>
+            <a:endParaRPr lang="ru-RU"/>
           </a:p>
           <a:p>
             <a:pPr lvl="3"/>
@@ -930,6 +928,7 @@
               <a:rPr lang="ru-RU"/>
               <a:t>Четвертый уровень</a:t>
             </a:r>
+            <a:endParaRPr lang="ru-RU"/>
           </a:p>
           <a:p>
             <a:pPr lvl="4"/>
@@ -958,7 +957,6 @@
           <a:p>
             <a:fld id="{F3B1270B-825F-4A6F-BFBD-8E5D97593686}" type="datetimeFigureOut">
               <a:rPr lang="uk-UA" smtClean="0"/>
-              <a:t>03.03.2020</a:t>
             </a:fld>
             <a:endParaRPr lang="uk-UA"/>
           </a:p>
@@ -1000,7 +998,6 @@
           <a:p>
             <a:fld id="{A205741A-6C99-45B0-8A04-C4D0F9F7160F}" type="slidenum">
               <a:rPr lang="uk-UA" smtClean="0"/>
-              <a:t>‹#›</a:t>
             </a:fld>
             <a:endParaRPr lang="uk-UA"/>
           </a:p>
@@ -1179,6 +1176,7 @@
               <a:rPr lang="ru-RU"/>
               <a:t>Образец текста</a:t>
             </a:r>
+            <a:endParaRPr lang="ru-RU"/>
           </a:p>
         </p:txBody>
       </p:sp>
@@ -1199,7 +1197,6 @@
           <a:p>
             <a:fld id="{F3B1270B-825F-4A6F-BFBD-8E5D97593686}" type="datetimeFigureOut">
               <a:rPr lang="uk-UA" smtClean="0"/>
-              <a:t>03.03.2020</a:t>
             </a:fld>
             <a:endParaRPr lang="uk-UA"/>
           </a:p>
@@ -1241,7 +1238,6 @@
           <a:p>
             <a:fld id="{A205741A-6C99-45B0-8A04-C4D0F9F7160F}" type="slidenum">
               <a:rPr lang="uk-UA" smtClean="0"/>
-              <a:t>‹#›</a:t>
             </a:fld>
             <a:endParaRPr lang="uk-UA"/>
           </a:p>
@@ -1320,6 +1316,7 @@
               <a:rPr lang="ru-RU"/>
               <a:t>Образец текста</a:t>
             </a:r>
+            <a:endParaRPr lang="ru-RU"/>
           </a:p>
           <a:p>
             <a:pPr lvl="1"/>
@@ -1327,6 +1324,7 @@
               <a:rPr lang="ru-RU"/>
               <a:t>Второй уровень</a:t>
             </a:r>
+            <a:endParaRPr lang="ru-RU"/>
           </a:p>
           <a:p>
             <a:pPr lvl="2"/>
@@ -1334,6 +1332,7 @@
               <a:rPr lang="ru-RU"/>
               <a:t>Третий уровень</a:t>
             </a:r>
+            <a:endParaRPr lang="ru-RU"/>
           </a:p>
           <a:p>
             <a:pPr lvl="3"/>
@@ -1341,6 +1340,7 @@
               <a:rPr lang="ru-RU"/>
               <a:t>Четвертый уровень</a:t>
             </a:r>
+            <a:endParaRPr lang="ru-RU"/>
           </a:p>
           <a:p>
             <a:pPr lvl="4"/>
@@ -1377,6 +1377,7 @@
               <a:rPr lang="ru-RU"/>
               <a:t>Образец текста</a:t>
             </a:r>
+            <a:endParaRPr lang="ru-RU"/>
           </a:p>
           <a:p>
             <a:pPr lvl="1"/>
@@ -1384,6 +1385,7 @@
               <a:rPr lang="ru-RU"/>
               <a:t>Второй уровень</a:t>
             </a:r>
+            <a:endParaRPr lang="ru-RU"/>
           </a:p>
           <a:p>
             <a:pPr lvl="2"/>
@@ -1391,6 +1393,7 @@
               <a:rPr lang="ru-RU"/>
               <a:t>Третий уровень</a:t>
             </a:r>
+            <a:endParaRPr lang="ru-RU"/>
           </a:p>
           <a:p>
             <a:pPr lvl="3"/>
@@ -1398,6 +1401,7 @@
               <a:rPr lang="ru-RU"/>
               <a:t>Четвертый уровень</a:t>
             </a:r>
+            <a:endParaRPr lang="ru-RU"/>
           </a:p>
           <a:p>
             <a:pPr lvl="4"/>
@@ -1426,7 +1430,6 @@
           <a:p>
             <a:fld id="{F3B1270B-825F-4A6F-BFBD-8E5D97593686}" type="datetimeFigureOut">
               <a:rPr lang="uk-UA" smtClean="0"/>
-              <a:t>03.03.2020</a:t>
             </a:fld>
             <a:endParaRPr lang="uk-UA"/>
           </a:p>
@@ -1468,7 +1471,6 @@
           <a:p>
             <a:fld id="{A205741A-6C99-45B0-8A04-C4D0F9F7160F}" type="slidenum">
               <a:rPr lang="uk-UA" smtClean="0"/>
-              <a:t>‹#›</a:t>
             </a:fld>
             <a:endParaRPr lang="uk-UA"/>
           </a:p>
@@ -1589,6 +1591,7 @@
               <a:rPr lang="ru-RU"/>
               <a:t>Образец текста</a:t>
             </a:r>
+            <a:endParaRPr lang="ru-RU"/>
           </a:p>
         </p:txBody>
       </p:sp>
@@ -1617,6 +1620,7 @@
               <a:rPr lang="ru-RU"/>
               <a:t>Образец текста</a:t>
             </a:r>
+            <a:endParaRPr lang="ru-RU"/>
           </a:p>
           <a:p>
             <a:pPr lvl="1"/>
@@ -1624,6 +1628,7 @@
               <a:rPr lang="ru-RU"/>
               <a:t>Второй уровень</a:t>
             </a:r>
+            <a:endParaRPr lang="ru-RU"/>
           </a:p>
           <a:p>
             <a:pPr lvl="2"/>
@@ -1631,6 +1636,7 @@
               <a:rPr lang="ru-RU"/>
               <a:t>Третий уровень</a:t>
             </a:r>
+            <a:endParaRPr lang="ru-RU"/>
           </a:p>
           <a:p>
             <a:pPr lvl="3"/>
@@ -1638,6 +1644,7 @@
               <a:rPr lang="ru-RU"/>
               <a:t>Четвертый уровень</a:t>
             </a:r>
+            <a:endParaRPr lang="ru-RU"/>
           </a:p>
           <a:p>
             <a:pPr lvl="4"/>
@@ -1711,6 +1718,7 @@
               <a:rPr lang="ru-RU"/>
               <a:t>Образец текста</a:t>
             </a:r>
+            <a:endParaRPr lang="ru-RU"/>
           </a:p>
         </p:txBody>
       </p:sp>
@@ -1739,6 +1747,7 @@
               <a:rPr lang="ru-RU"/>
               <a:t>Образец текста</a:t>
             </a:r>
+            <a:endParaRPr lang="ru-RU"/>
           </a:p>
           <a:p>
             <a:pPr lvl="1"/>
@@ -1746,6 +1755,7 @@
               <a:rPr lang="ru-RU"/>
               <a:t>Второй уровень</a:t>
             </a:r>
+            <a:endParaRPr lang="ru-RU"/>
           </a:p>
           <a:p>
             <a:pPr lvl="2"/>
@@ -1753,6 +1763,7 @@
               <a:rPr lang="ru-RU"/>
               <a:t>Третий уровень</a:t>
             </a:r>
+            <a:endParaRPr lang="ru-RU"/>
           </a:p>
           <a:p>
             <a:pPr lvl="3"/>
@@ -1760,6 +1771,7 @@
               <a:rPr lang="ru-RU"/>
               <a:t>Четвертый уровень</a:t>
             </a:r>
+            <a:endParaRPr lang="ru-RU"/>
           </a:p>
           <a:p>
             <a:pPr lvl="4"/>
@@ -1788,7 +1800,6 @@
           <a:p>
             <a:fld id="{F3B1270B-825F-4A6F-BFBD-8E5D97593686}" type="datetimeFigureOut">
               <a:rPr lang="uk-UA" smtClean="0"/>
-              <a:t>03.03.2020</a:t>
             </a:fld>
             <a:endParaRPr lang="uk-UA"/>
           </a:p>
@@ -1830,7 +1841,6 @@
           <a:p>
             <a:fld id="{A205741A-6C99-45B0-8A04-C4D0F9F7160F}" type="slidenum">
               <a:rPr lang="uk-UA" smtClean="0"/>
-              <a:t>‹#›</a:t>
             </a:fld>
             <a:endParaRPr lang="uk-UA"/>
           </a:p>
@@ -1901,7 +1911,6 @@
           <a:p>
             <a:fld id="{F3B1270B-825F-4A6F-BFBD-8E5D97593686}" type="datetimeFigureOut">
               <a:rPr lang="uk-UA" smtClean="0"/>
-              <a:t>03.03.2020</a:t>
             </a:fld>
             <a:endParaRPr lang="uk-UA"/>
           </a:p>
@@ -1943,7 +1952,6 @@
           <a:p>
             <a:fld id="{A205741A-6C99-45B0-8A04-C4D0F9F7160F}" type="slidenum">
               <a:rPr lang="uk-UA" smtClean="0"/>
-              <a:t>‹#›</a:t>
             </a:fld>
             <a:endParaRPr lang="uk-UA"/>
           </a:p>
@@ -1991,7 +1999,6 @@
           <a:p>
             <a:fld id="{F3B1270B-825F-4A6F-BFBD-8E5D97593686}" type="datetimeFigureOut">
               <a:rPr lang="uk-UA" smtClean="0"/>
-              <a:t>03.03.2020</a:t>
             </a:fld>
             <a:endParaRPr lang="uk-UA"/>
           </a:p>
@@ -2033,7 +2040,6 @@
           <a:p>
             <a:fld id="{A205741A-6C99-45B0-8A04-C4D0F9F7160F}" type="slidenum">
               <a:rPr lang="uk-UA" smtClean="0"/>
-              <a:t>‹#›</a:t>
             </a:fld>
             <a:endParaRPr lang="uk-UA"/>
           </a:p>
@@ -2149,6 +2155,7 @@
               <a:rPr lang="ru-RU"/>
               <a:t>Образец текста</a:t>
             </a:r>
+            <a:endParaRPr lang="ru-RU"/>
           </a:p>
           <a:p>
             <a:pPr lvl="1"/>
@@ -2156,6 +2163,7 @@
               <a:rPr lang="ru-RU"/>
               <a:t>Второй уровень</a:t>
             </a:r>
+            <a:endParaRPr lang="ru-RU"/>
           </a:p>
           <a:p>
             <a:pPr lvl="2"/>
@@ -2163,6 +2171,7 @@
               <a:rPr lang="ru-RU"/>
               <a:t>Третий уровень</a:t>
             </a:r>
+            <a:endParaRPr lang="ru-RU"/>
           </a:p>
           <a:p>
             <a:pPr lvl="3"/>
@@ -2170,6 +2179,7 @@
               <a:rPr lang="ru-RU"/>
               <a:t>Четвертый уровень</a:t>
             </a:r>
+            <a:endParaRPr lang="ru-RU"/>
           </a:p>
           <a:p>
             <a:pPr lvl="4"/>
@@ -2243,6 +2253,7 @@
               <a:rPr lang="ru-RU"/>
               <a:t>Образец текста</a:t>
             </a:r>
+            <a:endParaRPr lang="ru-RU"/>
           </a:p>
         </p:txBody>
       </p:sp>
@@ -2263,7 +2274,6 @@
           <a:p>
             <a:fld id="{F3B1270B-825F-4A6F-BFBD-8E5D97593686}" type="datetimeFigureOut">
               <a:rPr lang="uk-UA" smtClean="0"/>
-              <a:t>03.03.2020</a:t>
             </a:fld>
             <a:endParaRPr lang="uk-UA"/>
           </a:p>
@@ -2305,7 +2315,6 @@
           <a:p>
             <a:fld id="{A205741A-6C99-45B0-8A04-C4D0F9F7160F}" type="slidenum">
               <a:rPr lang="uk-UA" smtClean="0"/>
-              <a:t>‹#›</a:t>
             </a:fld>
             <a:endParaRPr lang="uk-UA"/>
           </a:p>
@@ -2379,6 +2388,7 @@
               <a:rPr lang="ru-RU"/>
               <a:t>Образец текста</a:t>
             </a:r>
+            <a:endParaRPr lang="ru-RU"/>
           </a:p>
           <a:p>
             <a:pPr lvl="1"/>
@@ -2386,6 +2396,7 @@
               <a:rPr lang="ru-RU"/>
               <a:t>Второй уровень</a:t>
             </a:r>
+            <a:endParaRPr lang="ru-RU"/>
           </a:p>
           <a:p>
             <a:pPr lvl="2"/>
@@ -2393,6 +2404,7 @@
               <a:rPr lang="ru-RU"/>
               <a:t>Третий уровень</a:t>
             </a:r>
+            <a:endParaRPr lang="ru-RU"/>
           </a:p>
           <a:p>
             <a:pPr lvl="3"/>
@@ -2400,6 +2412,7 @@
               <a:rPr lang="ru-RU"/>
               <a:t>Четвертый уровень</a:t>
             </a:r>
+            <a:endParaRPr lang="ru-RU"/>
           </a:p>
           <a:p>
             <a:pPr lvl="4"/>
@@ -2428,7 +2441,6 @@
           <a:p>
             <a:fld id="{F3B1270B-825F-4A6F-BFBD-8E5D97593686}" type="datetimeFigureOut">
               <a:rPr lang="uk-UA" smtClean="0"/>
-              <a:t>03.03.2020</a:t>
             </a:fld>
             <a:endParaRPr lang="uk-UA"/>
           </a:p>
@@ -2470,7 +2482,6 @@
           <a:p>
             <a:fld id="{A205741A-6C99-45B0-8A04-C4D0F9F7160F}" type="slidenum">
               <a:rPr lang="uk-UA" smtClean="0"/>
-              <a:t>‹#›</a:t>
             </a:fld>
             <a:endParaRPr lang="uk-UA"/>
           </a:p>
@@ -2656,6 +2667,7 @@
               <a:rPr lang="ru-RU"/>
               <a:t>Образец текста</a:t>
             </a:r>
+            <a:endParaRPr lang="ru-RU"/>
           </a:p>
         </p:txBody>
       </p:sp>
@@ -2676,7 +2688,6 @@
           <a:p>
             <a:fld id="{F3B1270B-825F-4A6F-BFBD-8E5D97593686}" type="datetimeFigureOut">
               <a:rPr lang="uk-UA" smtClean="0"/>
-              <a:t>03.03.2020</a:t>
             </a:fld>
             <a:endParaRPr lang="uk-UA"/>
           </a:p>
@@ -2718,7 +2729,6 @@
           <a:p>
             <a:fld id="{A205741A-6C99-45B0-8A04-C4D0F9F7160F}" type="slidenum">
               <a:rPr lang="uk-UA" smtClean="0"/>
-              <a:t>‹#›</a:t>
             </a:fld>
             <a:endParaRPr lang="uk-UA"/>
           </a:p>
@@ -2792,6 +2802,7 @@
               <a:rPr lang="ru-RU"/>
               <a:t>Образец текста</a:t>
             </a:r>
+            <a:endParaRPr lang="ru-RU"/>
           </a:p>
           <a:p>
             <a:pPr lvl="1"/>
@@ -2799,6 +2810,7 @@
               <a:rPr lang="ru-RU"/>
               <a:t>Второй уровень</a:t>
             </a:r>
+            <a:endParaRPr lang="ru-RU"/>
           </a:p>
           <a:p>
             <a:pPr lvl="2"/>
@@ -2806,6 +2818,7 @@
               <a:rPr lang="ru-RU"/>
               <a:t>Третий уровень</a:t>
             </a:r>
+            <a:endParaRPr lang="ru-RU"/>
           </a:p>
           <a:p>
             <a:pPr lvl="3"/>
@@ -2813,6 +2826,7 @@
               <a:rPr lang="ru-RU"/>
               <a:t>Четвертый уровень</a:t>
             </a:r>
+            <a:endParaRPr lang="ru-RU"/>
           </a:p>
           <a:p>
             <a:pPr lvl="4"/>
@@ -2841,7 +2855,6 @@
           <a:p>
             <a:fld id="{F3B1270B-825F-4A6F-BFBD-8E5D97593686}" type="datetimeFigureOut">
               <a:rPr lang="uk-UA" smtClean="0"/>
-              <a:t>03.03.2020</a:t>
             </a:fld>
             <a:endParaRPr lang="uk-UA"/>
           </a:p>
@@ -2883,7 +2896,6 @@
           <a:p>
             <a:fld id="{A205741A-6C99-45B0-8A04-C4D0F9F7160F}" type="slidenum">
               <a:rPr lang="uk-UA" smtClean="0"/>
-              <a:t>‹#›</a:t>
             </a:fld>
             <a:endParaRPr lang="uk-UA"/>
           </a:p>
@@ -2967,6 +2979,7 @@
               <a:rPr lang="ru-RU"/>
               <a:t>Образец текста</a:t>
             </a:r>
+            <a:endParaRPr lang="ru-RU"/>
           </a:p>
           <a:p>
             <a:pPr lvl="1"/>
@@ -2974,6 +2987,7 @@
               <a:rPr lang="ru-RU"/>
               <a:t>Второй уровень</a:t>
             </a:r>
+            <a:endParaRPr lang="ru-RU"/>
           </a:p>
           <a:p>
             <a:pPr lvl="2"/>
@@ -2981,6 +2995,7 @@
               <a:rPr lang="ru-RU"/>
               <a:t>Третий уровень</a:t>
             </a:r>
+            <a:endParaRPr lang="ru-RU"/>
           </a:p>
           <a:p>
             <a:pPr lvl="3"/>
@@ -2988,6 +3003,7 @@
               <a:rPr lang="ru-RU"/>
               <a:t>Четвертый уровень</a:t>
             </a:r>
+            <a:endParaRPr lang="ru-RU"/>
           </a:p>
           <a:p>
             <a:pPr lvl="4"/>
@@ -3016,7 +3032,6 @@
           <a:p>
             <a:fld id="{F3B1270B-825F-4A6F-BFBD-8E5D97593686}" type="datetimeFigureOut">
               <a:rPr lang="uk-UA" smtClean="0"/>
-              <a:t>03.03.2020</a:t>
             </a:fld>
             <a:endParaRPr lang="uk-UA"/>
           </a:p>
@@ -3058,7 +3073,6 @@
           <a:p>
             <a:fld id="{A205741A-6C99-45B0-8A04-C4D0F9F7160F}" type="slidenum">
               <a:rPr lang="uk-UA" smtClean="0"/>
-              <a:t>‹#›</a:t>
             </a:fld>
             <a:endParaRPr lang="uk-UA"/>
           </a:p>
@@ -3237,6 +3251,7 @@
               <a:rPr lang="ru-RU"/>
               <a:t>Образец текста</a:t>
             </a:r>
+            <a:endParaRPr lang="ru-RU"/>
           </a:p>
         </p:txBody>
       </p:sp>
@@ -3257,7 +3272,6 @@
           <a:p>
             <a:fld id="{F3B1270B-825F-4A6F-BFBD-8E5D97593686}" type="datetimeFigureOut">
               <a:rPr lang="uk-UA" smtClean="0"/>
-              <a:t>03.03.2020</a:t>
             </a:fld>
             <a:endParaRPr lang="uk-UA"/>
           </a:p>
@@ -3299,7 +3313,6 @@
           <a:p>
             <a:fld id="{A205741A-6C99-45B0-8A04-C4D0F9F7160F}" type="slidenum">
               <a:rPr lang="uk-UA" smtClean="0"/>
-              <a:t>‹#›</a:t>
             </a:fld>
             <a:endParaRPr lang="uk-UA"/>
           </a:p>
@@ -3378,6 +3391,7 @@
               <a:rPr lang="ru-RU"/>
               <a:t>Образец текста</a:t>
             </a:r>
+            <a:endParaRPr lang="ru-RU"/>
           </a:p>
           <a:p>
             <a:pPr lvl="1"/>
@@ -3385,6 +3399,7 @@
               <a:rPr lang="ru-RU"/>
               <a:t>Второй уровень</a:t>
             </a:r>
+            <a:endParaRPr lang="ru-RU"/>
           </a:p>
           <a:p>
             <a:pPr lvl="2"/>
@@ -3392,6 +3407,7 @@
               <a:rPr lang="ru-RU"/>
               <a:t>Третий уровень</a:t>
             </a:r>
+            <a:endParaRPr lang="ru-RU"/>
           </a:p>
           <a:p>
             <a:pPr lvl="3"/>
@@ -3399,6 +3415,7 @@
               <a:rPr lang="ru-RU"/>
               <a:t>Четвертый уровень</a:t>
             </a:r>
+            <a:endParaRPr lang="ru-RU"/>
           </a:p>
           <a:p>
             <a:pPr lvl="4"/>
@@ -3435,6 +3452,7 @@
               <a:rPr lang="ru-RU"/>
               <a:t>Образец текста</a:t>
             </a:r>
+            <a:endParaRPr lang="ru-RU"/>
           </a:p>
           <a:p>
             <a:pPr lvl="1"/>
@@ -3442,6 +3460,7 @@
               <a:rPr lang="ru-RU"/>
               <a:t>Второй уровень</a:t>
             </a:r>
+            <a:endParaRPr lang="ru-RU"/>
           </a:p>
           <a:p>
             <a:pPr lvl="2"/>
@@ -3449,6 +3468,7 @@
               <a:rPr lang="ru-RU"/>
               <a:t>Третий уровень</a:t>
             </a:r>
+            <a:endParaRPr lang="ru-RU"/>
           </a:p>
           <a:p>
             <a:pPr lvl="3"/>
@@ -3456,6 +3476,7 @@
               <a:rPr lang="ru-RU"/>
               <a:t>Четвертый уровень</a:t>
             </a:r>
+            <a:endParaRPr lang="ru-RU"/>
           </a:p>
           <a:p>
             <a:pPr lvl="4"/>
@@ -3484,7 +3505,6 @@
           <a:p>
             <a:fld id="{F3B1270B-825F-4A6F-BFBD-8E5D97593686}" type="datetimeFigureOut">
               <a:rPr lang="uk-UA" smtClean="0"/>
-              <a:t>03.03.2020</a:t>
             </a:fld>
             <a:endParaRPr lang="uk-UA"/>
           </a:p>
@@ -3526,7 +3546,6 @@
           <a:p>
             <a:fld id="{A205741A-6C99-45B0-8A04-C4D0F9F7160F}" type="slidenum">
               <a:rPr lang="uk-UA" smtClean="0"/>
-              <a:t>‹#›</a:t>
             </a:fld>
             <a:endParaRPr lang="uk-UA"/>
           </a:p>
@@ -3647,6 +3666,7 @@
               <a:rPr lang="ru-RU"/>
               <a:t>Образец текста</a:t>
             </a:r>
+            <a:endParaRPr lang="ru-RU"/>
           </a:p>
         </p:txBody>
       </p:sp>
@@ -3675,6 +3695,7 @@
               <a:rPr lang="ru-RU"/>
               <a:t>Образец текста</a:t>
             </a:r>
+            <a:endParaRPr lang="ru-RU"/>
           </a:p>
           <a:p>
             <a:pPr lvl="1"/>
@@ -3682,6 +3703,7 @@
               <a:rPr lang="ru-RU"/>
               <a:t>Второй уровень</a:t>
             </a:r>
+            <a:endParaRPr lang="ru-RU"/>
           </a:p>
           <a:p>
             <a:pPr lvl="2"/>
@@ -3689,6 +3711,7 @@
               <a:rPr lang="ru-RU"/>
               <a:t>Третий уровень</a:t>
             </a:r>
+            <a:endParaRPr lang="ru-RU"/>
           </a:p>
           <a:p>
             <a:pPr lvl="3"/>
@@ -3696,6 +3719,7 @@
               <a:rPr lang="ru-RU"/>
               <a:t>Четвертый уровень</a:t>
             </a:r>
+            <a:endParaRPr lang="ru-RU"/>
           </a:p>
           <a:p>
             <a:pPr lvl="4"/>
@@ -3769,6 +3793,7 @@
               <a:rPr lang="ru-RU"/>
               <a:t>Образец текста</a:t>
             </a:r>
+            <a:endParaRPr lang="ru-RU"/>
           </a:p>
         </p:txBody>
       </p:sp>
@@ -3797,6 +3822,7 @@
               <a:rPr lang="ru-RU"/>
               <a:t>Образец текста</a:t>
             </a:r>
+            <a:endParaRPr lang="ru-RU"/>
           </a:p>
           <a:p>
             <a:pPr lvl="1"/>
@@ -3804,6 +3830,7 @@
               <a:rPr lang="ru-RU"/>
               <a:t>Второй уровень</a:t>
             </a:r>
+            <a:endParaRPr lang="ru-RU"/>
           </a:p>
           <a:p>
             <a:pPr lvl="2"/>
@@ -3811,6 +3838,7 @@
               <a:rPr lang="ru-RU"/>
               <a:t>Третий уровень</a:t>
             </a:r>
+            <a:endParaRPr lang="ru-RU"/>
           </a:p>
           <a:p>
             <a:pPr lvl="3"/>
@@ -3818,6 +3846,7 @@
               <a:rPr lang="ru-RU"/>
               <a:t>Четвертый уровень</a:t>
             </a:r>
+            <a:endParaRPr lang="ru-RU"/>
           </a:p>
           <a:p>
             <a:pPr lvl="4"/>
@@ -3846,7 +3875,6 @@
           <a:p>
             <a:fld id="{F3B1270B-825F-4A6F-BFBD-8E5D97593686}" type="datetimeFigureOut">
               <a:rPr lang="uk-UA" smtClean="0"/>
-              <a:t>03.03.2020</a:t>
             </a:fld>
             <a:endParaRPr lang="uk-UA"/>
           </a:p>
@@ -3888,7 +3916,6 @@
           <a:p>
             <a:fld id="{A205741A-6C99-45B0-8A04-C4D0F9F7160F}" type="slidenum">
               <a:rPr lang="uk-UA" smtClean="0"/>
-              <a:t>‹#›</a:t>
             </a:fld>
             <a:endParaRPr lang="uk-UA"/>
           </a:p>
@@ -3959,7 +3986,6 @@
           <a:p>
             <a:fld id="{F3B1270B-825F-4A6F-BFBD-8E5D97593686}" type="datetimeFigureOut">
               <a:rPr lang="uk-UA" smtClean="0"/>
-              <a:t>03.03.2020</a:t>
             </a:fld>
             <a:endParaRPr lang="uk-UA"/>
           </a:p>
@@ -4001,7 +4027,6 @@
           <a:p>
             <a:fld id="{A205741A-6C99-45B0-8A04-C4D0F9F7160F}" type="slidenum">
               <a:rPr lang="uk-UA" smtClean="0"/>
-              <a:t>‹#›</a:t>
             </a:fld>
             <a:endParaRPr lang="uk-UA"/>
           </a:p>
@@ -4049,7 +4074,6 @@
           <a:p>
             <a:fld id="{F3B1270B-825F-4A6F-BFBD-8E5D97593686}" type="datetimeFigureOut">
               <a:rPr lang="uk-UA" smtClean="0"/>
-              <a:t>03.03.2020</a:t>
             </a:fld>
             <a:endParaRPr lang="uk-UA"/>
           </a:p>
@@ -4091,7 +4115,6 @@
           <a:p>
             <a:fld id="{A205741A-6C99-45B0-8A04-C4D0F9F7160F}" type="slidenum">
               <a:rPr lang="uk-UA" smtClean="0"/>
-              <a:t>‹#›</a:t>
             </a:fld>
             <a:endParaRPr lang="uk-UA"/>
           </a:p>
@@ -4207,6 +4230,7 @@
               <a:rPr lang="ru-RU"/>
               <a:t>Образец текста</a:t>
             </a:r>
+            <a:endParaRPr lang="ru-RU"/>
           </a:p>
           <a:p>
             <a:pPr lvl="1"/>
@@ -4214,6 +4238,7 @@
               <a:rPr lang="ru-RU"/>
               <a:t>Второй уровень</a:t>
             </a:r>
+            <a:endParaRPr lang="ru-RU"/>
           </a:p>
           <a:p>
             <a:pPr lvl="2"/>
@@ -4221,6 +4246,7 @@
               <a:rPr lang="ru-RU"/>
               <a:t>Третий уровень</a:t>
             </a:r>
+            <a:endParaRPr lang="ru-RU"/>
           </a:p>
           <a:p>
             <a:pPr lvl="3"/>
@@ -4228,6 +4254,7 @@
               <a:rPr lang="ru-RU"/>
               <a:t>Четвертый уровень</a:t>
             </a:r>
+            <a:endParaRPr lang="ru-RU"/>
           </a:p>
           <a:p>
             <a:pPr lvl="4"/>
@@ -4301,6 +4328,7 @@
               <a:rPr lang="ru-RU"/>
               <a:t>Образец текста</a:t>
             </a:r>
+            <a:endParaRPr lang="ru-RU"/>
           </a:p>
         </p:txBody>
       </p:sp>
@@ -4321,7 +4349,6 @@
           <a:p>
             <a:fld id="{F3B1270B-825F-4A6F-BFBD-8E5D97593686}" type="datetimeFigureOut">
               <a:rPr lang="uk-UA" smtClean="0"/>
-              <a:t>03.03.2020</a:t>
             </a:fld>
             <a:endParaRPr lang="uk-UA"/>
           </a:p>
@@ -4363,7 +4390,6 @@
           <a:p>
             <a:fld id="{A205741A-6C99-45B0-8A04-C4D0F9F7160F}" type="slidenum">
               <a:rPr lang="uk-UA" smtClean="0"/>
-              <a:t>‹#›</a:t>
             </a:fld>
             <a:endParaRPr lang="uk-UA"/>
           </a:p>
@@ -4549,6 +4575,7 @@
               <a:rPr lang="ru-RU"/>
               <a:t>Образец текста</a:t>
             </a:r>
+            <a:endParaRPr lang="ru-RU"/>
           </a:p>
         </p:txBody>
       </p:sp>
@@ -4569,7 +4596,6 @@
           <a:p>
             <a:fld id="{F3B1270B-825F-4A6F-BFBD-8E5D97593686}" type="datetimeFigureOut">
               <a:rPr lang="uk-UA" smtClean="0"/>
-              <a:t>03.03.2020</a:t>
             </a:fld>
             <a:endParaRPr lang="uk-UA"/>
           </a:p>
@@ -4611,7 +4637,6 @@
           <a:p>
             <a:fld id="{A205741A-6C99-45B0-8A04-C4D0F9F7160F}" type="slidenum">
               <a:rPr lang="uk-UA" smtClean="0"/>
-              <a:t>‹#›</a:t>
             </a:fld>
             <a:endParaRPr lang="uk-UA"/>
           </a:p>
@@ -4710,6 +4735,7 @@
               <a:rPr lang="ru-RU"/>
               <a:t>Образец текста</a:t>
             </a:r>
+            <a:endParaRPr lang="ru-RU"/>
           </a:p>
           <a:p>
             <a:pPr lvl="1"/>
@@ -4717,6 +4743,7 @@
               <a:rPr lang="ru-RU"/>
               <a:t>Второй уровень</a:t>
             </a:r>
+            <a:endParaRPr lang="ru-RU"/>
           </a:p>
           <a:p>
             <a:pPr lvl="2"/>
@@ -4724,6 +4751,7 @@
               <a:rPr lang="ru-RU"/>
               <a:t>Третий уровень</a:t>
             </a:r>
+            <a:endParaRPr lang="ru-RU"/>
           </a:p>
           <a:p>
             <a:pPr lvl="3"/>
@@ -4731,6 +4759,7 @@
               <a:rPr lang="ru-RU"/>
               <a:t>Четвертый уровень</a:t>
             </a:r>
+            <a:endParaRPr lang="ru-RU"/>
           </a:p>
           <a:p>
             <a:pPr lvl="4"/>
@@ -4777,7 +4806,6 @@
           <a:p>
             <a:fld id="{F3B1270B-825F-4A6F-BFBD-8E5D97593686}" type="datetimeFigureOut">
               <a:rPr lang="uk-UA" smtClean="0"/>
-              <a:t>03.03.2020</a:t>
             </a:fld>
             <a:endParaRPr lang="uk-UA"/>
           </a:p>
@@ -4855,7 +4883,6 @@
           <a:p>
             <a:fld id="{A205741A-6C99-45B0-8A04-C4D0F9F7160F}" type="slidenum">
               <a:rPr lang="uk-UA" smtClean="0"/>
-              <a:t>‹#›</a:t>
             </a:fld>
             <a:endParaRPr lang="uk-UA"/>
           </a:p>
@@ -5245,6 +5272,7 @@
               <a:rPr lang="ru-RU"/>
               <a:t>Образец текста</a:t>
             </a:r>
+            <a:endParaRPr lang="ru-RU"/>
           </a:p>
           <a:p>
             <a:pPr lvl="1"/>
@@ -5252,6 +5280,7 @@
               <a:rPr lang="ru-RU"/>
               <a:t>Второй уровень</a:t>
             </a:r>
+            <a:endParaRPr lang="ru-RU"/>
           </a:p>
           <a:p>
             <a:pPr lvl="2"/>
@@ -5259,6 +5288,7 @@
               <a:rPr lang="ru-RU"/>
               <a:t>Третий уровень</a:t>
             </a:r>
+            <a:endParaRPr lang="ru-RU"/>
           </a:p>
           <a:p>
             <a:pPr lvl="3"/>
@@ -5266,6 +5296,7 @@
               <a:rPr lang="ru-RU"/>
               <a:t>Четвертый уровень</a:t>
             </a:r>
+            <a:endParaRPr lang="ru-RU"/>
           </a:p>
           <a:p>
             <a:pPr lvl="4"/>
@@ -5312,7 +5343,6 @@
           <a:p>
             <a:fld id="{F3B1270B-825F-4A6F-BFBD-8E5D97593686}" type="datetimeFigureOut">
               <a:rPr lang="uk-UA" smtClean="0"/>
-              <a:t>03.03.2020</a:t>
             </a:fld>
             <a:endParaRPr lang="uk-UA"/>
           </a:p>
@@ -5390,7 +5420,6 @@
           <a:p>
             <a:fld id="{A205741A-6C99-45B0-8A04-C4D0F9F7160F}" type="slidenum">
               <a:rPr lang="uk-UA" smtClean="0"/>
-              <a:t>‹#›</a:t>
             </a:fld>
             <a:endParaRPr lang="uk-UA"/>
           </a:p>
@@ -5792,6 +5821,7 @@
               <a:rPr lang="uk-UA" dirty="0"/>
               <a:t>Мальований Денис Олегович</a:t>
             </a:r>
+            <a:endParaRPr lang="uk-UA" dirty="0"/>
           </a:p>
         </p:txBody>
       </p:sp>
@@ -5800,13 +5830,13 @@
   <p:clrMapOvr>
     <a:masterClrMapping/>
   </p:clrMapOvr>
-  <mc:AlternateContent xmlns:mc="http://schemas.openxmlformats.org/markup-compatibility/2006" xmlns:p14="http://schemas.microsoft.com/office/powerpoint/2010/main">
-    <mc:Choice Requires="p14">
+  <mc:AlternateContent xmlns:mc="http://schemas.openxmlformats.org/markup-compatibility/2006">
+    <mc:Choice xmlns:p14="http://schemas.microsoft.com/office/powerpoint/2010/main" Requires="p14">
       <p:transition spd="slow" p14:dur="1500">
         <p:split orient="vert"/>
       </p:transition>
     </mc:Choice>
-    <mc:Fallback xmlns="">
+    <mc:Fallback>
       <p:transition spd="slow">
         <p:split orient="vert"/>
       </p:transition>
@@ -5821,7 +5851,7 @@
     <p:bg>
       <p:bgPr>
         <a:blipFill>
-          <a:blip r:embed="rId2"/>
+          <a:blip r:embed="rId1"/>
           <a:tile tx="0" ty="0" sx="100000" sy="100000" flip="none" algn="tl"/>
         </a:blipFill>
         <a:effectLst/>
@@ -5916,6 +5946,7 @@
               <a:rPr lang="uk-UA" dirty="0"/>
               <a:t>.</a:t>
             </a:r>
+            <a:endParaRPr lang="uk-UA" dirty="0"/>
           </a:p>
         </p:txBody>
       </p:sp>
@@ -5949,30 +5980,26 @@
       </p:grpSpPr>
       <p:pic>
         <p:nvPicPr>
-          <p:cNvPr id="5" name="Picture 4"/>
+          <p:cNvPr id="2" name="Picture 1"/>
           <p:cNvPicPr>
             <a:picLocks noChangeAspect="1"/>
           </p:cNvPicPr>
           <p:nvPr/>
         </p:nvPicPr>
         <p:blipFill>
-          <a:blip r:embed="rId2"/>
+          <a:blip r:embed="rId1"/>
           <a:stretch>
             <a:fillRect/>
           </a:stretch>
         </p:blipFill>
         <p:spPr>
           <a:xfrm>
-            <a:off x="0" y="508819"/>
-            <a:ext cx="12196916" cy="5840361"/>
+            <a:off x="31115" y="1253490"/>
+            <a:ext cx="12129770" cy="4351020"/>
           </a:xfrm>
           <a:prstGeom prst="rect">
             <a:avLst/>
           </a:prstGeom>
-          <a:noFill/>
-          <a:ln>
-            <a:noFill/>
-          </a:ln>
         </p:spPr>
       </p:pic>
     </p:spTree>
@@ -5992,7 +6019,7 @@
     <p:bg>
       <p:bgPr>
         <a:blipFill>
-          <a:blip r:embed="rId2"/>
+          <a:blip r:embed="rId1"/>
           <a:tile tx="0" ty="0" sx="100000" sy="100000" flip="none" algn="tl"/>
         </a:blipFill>
         <a:effectLst/>
@@ -6047,6 +6074,7 @@
               <a:rPr lang="uk-UA" dirty="0"/>
               <a:t>-файлах ієрархічно. Тобто між тегами одного небесного тіла розташовується інформація про його супутники.</a:t>
             </a:r>
+            <a:endParaRPr lang="uk-UA" dirty="0"/>
           </a:p>
         </p:txBody>
       </p:sp>
@@ -6085,7 +6113,7 @@
           <p:nvPr/>
         </p:nvPicPr>
         <p:blipFill>
-          <a:blip r:embed="rId2">
+          <a:blip r:embed="rId1">
             <a:extLst>
               <a:ext uri="{28A0092B-C50C-407E-A947-70E740481C1C}">
                 <a14:useLocalDpi xmlns:a14="http://schemas.microsoft.com/office/drawing/2010/main" val="0"/>
@@ -6118,7 +6146,7 @@
           <p:nvPr/>
         </p:nvPicPr>
         <p:blipFill>
-          <a:blip r:embed="rId3">
+          <a:blip r:embed="rId2">
             <a:extLst>
               <a:ext uri="{28A0092B-C50C-407E-A947-70E740481C1C}">
                 <a14:useLocalDpi xmlns:a14="http://schemas.microsoft.com/office/drawing/2010/main" val="0"/>
@@ -6151,7 +6179,7 @@
           <p:nvPr/>
         </p:nvPicPr>
         <p:blipFill>
-          <a:blip r:embed="rId4">
+          <a:blip r:embed="rId3">
             <a:extLst>
               <a:ext uri="{28A0092B-C50C-407E-A947-70E740481C1C}">
                 <a14:useLocalDpi xmlns:a14="http://schemas.microsoft.com/office/drawing/2010/main" val="0"/>
@@ -6194,7 +6222,7 @@
     <p:bg>
       <p:bgPr>
         <a:blipFill>
-          <a:blip r:embed="rId2"/>
+          <a:blip r:embed="rId1"/>
           <a:tile tx="0" ty="0" sx="100000" sy="100000" flip="none" algn="tl"/>
         </a:blipFill>
         <a:effectLst/>
@@ -6249,6 +6277,7 @@
               <a:rPr lang="uk-UA" dirty="0"/>
               <a:t>для гри або редагування, а також титрів. Ви можете обрати режим поодинокої або багатокористувацької гри.</a:t>
             </a:r>
+            <a:endParaRPr lang="uk-UA" dirty="0"/>
           </a:p>
         </p:txBody>
       </p:sp>
@@ -6282,20 +6311,14 @@
       </p:grpSpPr>
       <p:pic>
         <p:nvPicPr>
-          <p:cNvPr id="2" name="Рисунок 1">
-            <a:extLst>
-              <a:ext uri="{FF2B5EF4-FFF2-40B4-BE49-F238E27FC236}">
-                <a16:creationId xmlns:a16="http://schemas.microsoft.com/office/drawing/2014/main" id="{9B4C3133-D895-4404-A850-5B411FD2454B}"/>
-              </a:ext>
-            </a:extLst>
-          </p:cNvPr>
+          <p:cNvPr id="2" name="Рисунок 1"/>
           <p:cNvPicPr>
             <a:picLocks noChangeAspect="1"/>
           </p:cNvPicPr>
           <p:nvPr/>
         </p:nvPicPr>
         <p:blipFill>
-          <a:blip r:embed="rId2"/>
+          <a:blip r:embed="rId1"/>
           <a:stretch>
             <a:fillRect/>
           </a:stretch>
@@ -6345,7 +6368,7 @@
           <p:nvPr/>
         </p:nvPicPr>
         <p:blipFill>
-          <a:blip r:embed="rId2">
+          <a:blip r:embed="rId1">
             <a:extLst>
               <a:ext uri="{28A0092B-C50C-407E-A947-70E740481C1C}">
                 <a14:useLocalDpi xmlns:a14="http://schemas.microsoft.com/office/drawing/2010/main" val="0"/>
@@ -6406,7 +6429,7 @@
           <p:nvPr/>
         </p:nvPicPr>
         <p:blipFill>
-          <a:blip r:embed="rId2">
+          <a:blip r:embed="rId1">
             <a:extLst>
               <a:ext uri="{28A0092B-C50C-407E-A947-70E740481C1C}">
                 <a14:useLocalDpi xmlns:a14="http://schemas.microsoft.com/office/drawing/2010/main" val="0"/>
@@ -6462,20 +6485,14 @@
       </p:grpSpPr>
       <p:pic>
         <p:nvPicPr>
-          <p:cNvPr id="2" name="Рисунок 1">
-            <a:extLst>
-              <a:ext uri="{FF2B5EF4-FFF2-40B4-BE49-F238E27FC236}">
-                <a16:creationId xmlns:a16="http://schemas.microsoft.com/office/drawing/2014/main" id="{811D4669-B89F-4C10-AA42-A13E0E6170D5}"/>
-              </a:ext>
-            </a:extLst>
-          </p:cNvPr>
+          <p:cNvPr id="2" name="Рисунок 1"/>
           <p:cNvPicPr>
             <a:picLocks noChangeAspect="1"/>
           </p:cNvPicPr>
           <p:nvPr/>
         </p:nvPicPr>
         <p:blipFill>
-          <a:blip r:embed="rId2"/>
+          <a:blip r:embed="rId1"/>
           <a:stretch>
             <a:fillRect/>
           </a:stretch>
@@ -6491,11 +6508,6 @@
         </p:spPr>
       </p:pic>
     </p:spTree>
-    <p:extLst>
-      <p:ext uri="{BB962C8B-B14F-4D97-AF65-F5344CB8AC3E}">
-        <p14:creationId xmlns:p14="http://schemas.microsoft.com/office/powerpoint/2010/main" val="3665701942"/>
-      </p:ext>
-    </p:extLst>
   </p:cSld>
   <p:clrMapOvr>
     <a:masterClrMapping/>
@@ -6530,7 +6542,7 @@
           <p:nvPr/>
         </p:nvPicPr>
         <p:blipFill>
-          <a:blip r:embed="rId2">
+          <a:blip r:embed="rId1">
             <a:extLst>
               <a:ext uri="{28A0092B-C50C-407E-A947-70E740481C1C}">
                 <a14:useLocalDpi xmlns:a14="http://schemas.microsoft.com/office/drawing/2010/main" val="0"/>
@@ -6573,7 +6585,7 @@
     <p:bg>
       <p:bgPr>
         <a:blipFill>
-          <a:blip r:embed="rId2"/>
+          <a:blip r:embed="rId1"/>
           <a:tile tx="0" ty="0" sx="100000" sy="100000" flip="none" algn="tl"/>
         </a:blipFill>
         <a:effectLst/>
@@ -6854,20 +6866,14 @@
       </p:grpSpPr>
       <p:pic>
         <p:nvPicPr>
-          <p:cNvPr id="2" name="Рисунок 1">
-            <a:extLst>
-              <a:ext uri="{FF2B5EF4-FFF2-40B4-BE49-F238E27FC236}">
-                <a16:creationId xmlns:a16="http://schemas.microsoft.com/office/drawing/2014/main" id="{F2F477EE-D58C-473A-9B97-CD0282A4B769}"/>
-              </a:ext>
-            </a:extLst>
-          </p:cNvPr>
+          <p:cNvPr id="2" name="Рисунок 1"/>
           <p:cNvPicPr>
             <a:picLocks noChangeAspect="1"/>
           </p:cNvPicPr>
           <p:nvPr/>
         </p:nvPicPr>
         <p:blipFill>
-          <a:blip r:embed="rId2"/>
+          <a:blip r:embed="rId1"/>
           <a:stretch>
             <a:fillRect/>
           </a:stretch>
@@ -6883,11 +6889,6 @@
         </p:spPr>
       </p:pic>
     </p:spTree>
-    <p:extLst>
-      <p:ext uri="{BB962C8B-B14F-4D97-AF65-F5344CB8AC3E}">
-        <p14:creationId xmlns:p14="http://schemas.microsoft.com/office/powerpoint/2010/main" val="1031322645"/>
-      </p:ext>
-    </p:extLst>
   </p:cSld>
   <p:clrMapOvr>
     <a:masterClrMapping/>
@@ -6904,7 +6905,7 @@
     <p:bg>
       <p:bgPr>
         <a:blipFill>
-          <a:blip r:embed="rId2"/>
+          <a:blip r:embed="rId1"/>
           <a:tile tx="0" ty="0" sx="100000" sy="100000" flip="none" algn="tl"/>
         </a:blipFill>
         <a:effectLst/>
@@ -6963,6 +6964,7 @@
               <a:rPr lang="uk-UA" dirty="0"/>
               <a:t>.</a:t>
             </a:r>
+            <a:endParaRPr lang="uk-UA" dirty="0"/>
           </a:p>
         </p:txBody>
       </p:sp>
@@ -6983,7 +6985,7 @@
     <p:bg>
       <p:bgPr>
         <a:blipFill>
-          <a:blip r:embed="rId2"/>
+          <a:blip r:embed="rId1"/>
           <a:tile tx="0" ty="0" sx="100000" sy="100000" flip="none" algn="tl"/>
         </a:blipFill>
         <a:effectLst/>
@@ -7030,6 +7032,7 @@
               <a:rPr lang="uk-UA" dirty="0"/>
               <a:t>Використовуючи розроблену програму люди навчаються, експериментують, набувають знань у сфері астрономії й фізики. Крім того, ПЗ можна використовувати для науково точної симуляції зоряних систем.</a:t>
             </a:r>
+            <a:endParaRPr lang="uk-UA" dirty="0"/>
           </a:p>
         </p:txBody>
       </p:sp>
@@ -7108,6 +7111,9 @@
               </a:rPr>
               <a:t>Дякую за увагу!</a:t>
             </a:r>
+            <a:endParaRPr lang="uk-UA" sz="7200" b="1" dirty="0">
+              <a:latin typeface="+mn-lt"/>
+            </a:endParaRPr>
           </a:p>
         </p:txBody>
       </p:sp>
@@ -7150,7 +7156,7 @@
             </a:r>
             <a:r>
               <a:rPr lang="en-US" sz="3200" dirty="0">
-                <a:hlinkClick r:id="rId2"/>
+                <a:hlinkClick r:id="rId1"/>
               </a:rPr>
               <a:t>https://gitlab.com/maldenol/spacepioneers/</a:t>
             </a:r>
@@ -7174,13 +7180,13 @@
   <p:clrMapOvr>
     <a:masterClrMapping/>
   </p:clrMapOvr>
-  <mc:AlternateContent xmlns:mc="http://schemas.openxmlformats.org/markup-compatibility/2006" xmlns:p14="http://schemas.microsoft.com/office/powerpoint/2010/main">
-    <mc:Choice Requires="p14">
+  <mc:AlternateContent xmlns:mc="http://schemas.openxmlformats.org/markup-compatibility/2006">
+    <mc:Choice xmlns:p14="http://schemas.microsoft.com/office/powerpoint/2010/main" Requires="p14">
       <p:transition spd="slow">
         <p14:flash/>
       </p:transition>
     </mc:Choice>
-    <mc:Fallback xmlns="">
+    <mc:Fallback>
       <p:transition spd="slow">
         <p:fade/>
       </p:transition>
@@ -7195,7 +7201,7 @@
     <p:bg>
       <p:bgPr>
         <a:blipFill>
-          <a:blip r:embed="rId2"/>
+          <a:blip r:embed="rId1"/>
           <a:tile tx="0" ty="0" sx="100000" sy="100000" flip="none" algn="tl"/>
         </a:blipFill>
         <a:effectLst/>
@@ -7307,6 +7313,7 @@
               <a:rPr lang="uk-UA" dirty="0"/>
               <a:t>.</a:t>
             </a:r>
+            <a:endParaRPr lang="uk-UA" dirty="0"/>
           </a:p>
         </p:txBody>
       </p:sp>
@@ -7327,7 +7334,7 @@
     <p:bg>
       <p:bgPr>
         <a:blipFill>
-          <a:blip r:embed="rId2"/>
+          <a:blip r:embed="rId1"/>
           <a:tile tx="0" ty="0" sx="100000" sy="100000" flip="none" algn="tl"/>
         </a:blipFill>
         <a:effectLst/>
@@ -7406,6 +7413,7 @@
               <a:rPr lang="uk-UA" dirty="0"/>
               <a:t>. Вона надає багато можливостей при роботі з графікою, а багата документація й різноманіття функцій робить процес розробки значно легшим.</a:t>
             </a:r>
+            <a:endParaRPr lang="uk-UA" dirty="0"/>
           </a:p>
         </p:txBody>
       </p:sp>
@@ -7426,7 +7434,7 @@
     <p:bg>
       <p:bgPr>
         <a:blipFill>
-          <a:blip r:embed="rId2"/>
+          <a:blip r:embed="rId1"/>
           <a:tile tx="0" ty="0" sx="100000" sy="100000" flip="none" algn="tl"/>
         </a:blipFill>
         <a:effectLst/>
@@ -7501,6 +7509,7 @@
               <a:rPr lang="uk-UA" dirty="0"/>
               <a:t>яті, має в рази більшу швидкодію, а також графічні покращення.</a:t>
             </a:r>
+            <a:endParaRPr lang="uk-UA" dirty="0"/>
           </a:p>
         </p:txBody>
       </p:sp>
@@ -7521,7 +7530,7 @@
     <p:bg>
       <p:bgPr>
         <a:blipFill>
-          <a:blip r:embed="rId2"/>
+          <a:blip r:embed="rId1"/>
           <a:tile tx="0" ty="0" sx="100000" sy="100000" flip="none" algn="tl"/>
         </a:blipFill>
         <a:effectLst/>
@@ -7576,6 +7585,7 @@
               <a:rPr lang="uk-UA" dirty="0"/>
               <a:t> взаємодію компонентів зоряних систем. Тобто всі розрахунки між будь-якими космічними тілами відбуваються у кожен такт виконання за законами всесвітнього тяжіння та Ньютона.</a:t>
             </a:r>
+            <a:endParaRPr lang="uk-UA" dirty="0"/>
           </a:p>
         </p:txBody>
       </p:sp>
@@ -7596,7 +7606,7 @@
     <p:bg>
       <p:bgPr>
         <a:blipFill>
-          <a:blip r:embed="rId2"/>
+          <a:blip r:embed="rId1"/>
           <a:tile tx="0" ty="0" sx="100000" sy="100000" flip="none" algn="tl"/>
         </a:blipFill>
         <a:effectLst/>
@@ -7665,7 +7675,15 @@
             </a:r>
             <a:r>
               <a:rPr lang="uk-UA" dirty="0"/>
-              <a:t>, </a:t>
+              <a:t>,</a:t>
+            </a:r>
+            <a:r>
+              <a:rPr lang="uk-UA" b="1" dirty="0"/>
+              <a:t> </a:t>
+            </a:r>
+            <a:r>
+              <a:rPr lang="en-US" altLang="uk-UA" b="1" dirty="0"/>
+              <a:t>ButtonServer, </a:t>
             </a:r>
             <a:r>
               <a:rPr lang="uk-UA" b="1" dirty="0" err="1"/>
@@ -7723,6 +7741,7 @@
               <a:rPr lang="uk-UA" dirty="0"/>
               <a:t>.</a:t>
             </a:r>
+            <a:endParaRPr lang="uk-UA" dirty="0"/>
           </a:p>
         </p:txBody>
       </p:sp>
@@ -7743,7 +7762,7 @@
     <p:bg>
       <p:bgPr>
         <a:blipFill>
-          <a:blip r:embed="rId2"/>
+          <a:blip r:embed="rId1"/>
           <a:tile tx="0" ty="0" sx="100000" sy="100000" flip="none" algn="tl"/>
         </a:blipFill>
         <a:effectLst/>
@@ -7814,6 +7833,7 @@
               <a:rPr lang="uk-UA" dirty="0"/>
               <a:t>– модель небесного тіла.</a:t>
             </a:r>
+            <a:endParaRPr lang="uk-UA" dirty="0"/>
           </a:p>
         </p:txBody>
       </p:sp>
@@ -7834,7 +7854,7 @@
     <p:bg>
       <p:bgPr>
         <a:blipFill>
-          <a:blip r:embed="rId2"/>
+          <a:blip r:embed="rId1"/>
           <a:tile tx="0" ty="0" sx="100000" sy="100000" flip="none" algn="tl"/>
         </a:blipFill>
         <a:effectLst/>
@@ -7955,18 +7975,48 @@
             </a:r>
             <a:r>
               <a:rPr lang="en-US" altLang="uk-UA" dirty="0"/>
-              <a:t>, а </a:t>
-            </a:r>
-            <a:r>
-              <a:rPr lang="en-US" altLang="uk-UA" b="1" dirty="0"/>
+              <a:t>, </a:t>
+            </a:r>
+            <a:r>
+              <a:rPr lang="en-US" altLang="en-US" dirty="0"/>
+              <a:t>а </a:t>
+            </a:r>
+            <a:r>
+              <a:rPr lang="en-US" altLang="en-US" b="1" dirty="0"/>
+              <a:t>ButtonServer</a:t>
+            </a:r>
+            <a:r>
+              <a:rPr lang="uk-UA" dirty="0">
+                <a:sym typeface="+mn-ea"/>
+              </a:rPr>
+              <a:t> </a:t>
+            </a:r>
+            <a:r>
+              <a:rPr lang="en-US" altLang="en-US" dirty="0"/>
+              <a:t>обслуговує ці кнопки. </a:t>
+            </a:r>
+            <a:r>
+              <a:rPr dirty="0"/>
+              <a:t>Клас </a:t>
+            </a:r>
+            <a:r>
+              <a:rPr b="1" dirty="0"/>
+              <a:t>Camera</a:t>
+            </a:r>
+            <a:r>
+              <a:rPr dirty="0"/>
+              <a:t> реалізує камеру, а </a:t>
+            </a:r>
+            <a:r>
+              <a:rPr b="1" dirty="0"/>
               <a:t>SoundtrackThread</a:t>
             </a:r>
             <a:r>
-              <a:rPr lang="en-US" altLang="uk-UA" dirty="0"/>
+              <a:rPr dirty="0"/>
               <a:t> та </a:t>
             </a:r>
             <a:r>
-              <a:rPr lang="en-US" altLang="uk-UA" b="1" dirty="0"/>
+              <a:rPr b="1" dirty="0"/>
               <a:t>TextureLoaderThread</a:t>
             </a:r>
             <a:r>
@@ -7993,6 +8043,7 @@
               <a:rPr lang="uk-UA" dirty="0"/>
               <a:t>.</a:t>
             </a:r>
+            <a:endParaRPr lang="uk-UA" dirty="0"/>
           </a:p>
         </p:txBody>
       </p:sp>
@@ -8258,8 +8309,6 @@
       </a:bgFillStyleLst>
     </a:fmtScheme>
   </a:themeElements>
-  <a:objectDefaults/>
-  <a:extraClrSchemeLst/>
   <a:extLst>
     <a:ext uri="{05A4C25C-085E-4340-85A3-A5531E510DB2}">
       <thm15:themeFamily xmlns:thm15="http://schemas.microsoft.com/office/thememl/2012/main" name="Office Theme" id="{62F939B6-93AF-4DB8-9C6B-D6C7DFDC589F}" vid="{4A3C46E8-61CC-4603-A589-7422A47A8E4A}"/>
@@ -8519,8 +8568,6 @@
       </a:bgFillStyleLst>
     </a:fmtScheme>
   </a:themeElements>
-  <a:objectDefaults/>
-  <a:extraClrSchemeLst/>
   <a:extLst>
     <a:ext uri="{05A4C25C-085E-4340-85A3-A5531E510DB2}">
       <thm15:themeFamily xmlns:thm15="http://schemas.microsoft.com/office/thememl/2012/main" name="Office Theme" id="{62F939B6-93AF-4DB8-9C6B-D6C7DFDC589F}" vid="{4A3C46E8-61CC-4603-A589-7422A47A8E4A}"/>

</xml_diff>

<commit_message>
Added .xmi and .ai files, updated .docx and .pptx files
</commit_message>
<xml_diff>
--- a/documentation/МАНУ2020.pptx
+++ b/documentation/МАНУ2020.pptx
@@ -3,32 +3,32 @@
 <p:presentation xmlns:a="http://schemas.openxmlformats.org/drawingml/2006/main" xmlns:r="http://schemas.openxmlformats.org/officeDocument/2006/relationships" xmlns:p="http://schemas.openxmlformats.org/presentationml/2006/main">
   <p:sldMasterIdLst>
     <p:sldMasterId id="2147483648" r:id="rId1"/>
-    <p:sldMasterId id="2147483660" r:id="rId3"/>
+    <p:sldMasterId id="2147483660" r:id="rId2"/>
   </p:sldMasterIdLst>
   <p:sldIdLst>
-    <p:sldId id="256" r:id="rId4"/>
-    <p:sldId id="257" r:id="rId5"/>
-    <p:sldId id="261" r:id="rId6"/>
-    <p:sldId id="262" r:id="rId7"/>
-    <p:sldId id="263" r:id="rId8"/>
-    <p:sldId id="275" r:id="rId9"/>
-    <p:sldId id="264" r:id="rId10"/>
-    <p:sldId id="279" r:id="rId11"/>
-    <p:sldId id="280" r:id="rId12"/>
-    <p:sldId id="281" r:id="rId13"/>
-    <p:sldId id="259" r:id="rId14"/>
-    <p:sldId id="266" r:id="rId15"/>
-    <p:sldId id="267" r:id="rId16"/>
-    <p:sldId id="270" r:id="rId17"/>
-    <p:sldId id="271" r:id="rId18"/>
-    <p:sldId id="273" r:id="rId19"/>
-    <p:sldId id="272" r:id="rId20"/>
-    <p:sldId id="283" r:id="rId21"/>
-    <p:sldId id="274" r:id="rId22"/>
-    <p:sldId id="282" r:id="rId23"/>
-    <p:sldId id="268" r:id="rId24"/>
-    <p:sldId id="269" r:id="rId25"/>
-    <p:sldId id="258" r:id="rId26"/>
+    <p:sldId id="256" r:id="rId3"/>
+    <p:sldId id="257" r:id="rId4"/>
+    <p:sldId id="261" r:id="rId5"/>
+    <p:sldId id="262" r:id="rId6"/>
+    <p:sldId id="263" r:id="rId7"/>
+    <p:sldId id="275" r:id="rId8"/>
+    <p:sldId id="264" r:id="rId9"/>
+    <p:sldId id="279" r:id="rId10"/>
+    <p:sldId id="280" r:id="rId11"/>
+    <p:sldId id="281" r:id="rId12"/>
+    <p:sldId id="259" r:id="rId13"/>
+    <p:sldId id="266" r:id="rId14"/>
+    <p:sldId id="267" r:id="rId15"/>
+    <p:sldId id="270" r:id="rId16"/>
+    <p:sldId id="271" r:id="rId17"/>
+    <p:sldId id="273" r:id="rId18"/>
+    <p:sldId id="272" r:id="rId19"/>
+    <p:sldId id="283" r:id="rId20"/>
+    <p:sldId id="274" r:id="rId21"/>
+    <p:sldId id="282" r:id="rId22"/>
+    <p:sldId id="268" r:id="rId23"/>
+    <p:sldId id="269" r:id="rId24"/>
+    <p:sldId id="258" r:id="rId25"/>
   </p:sldIdLst>
   <p:sldSz cx="12192000" cy="6858000"/>
   <p:notesSz cx="6858000" cy="9144000"/>
@@ -127,6 +127,11 @@
       </a:defRPr>
     </a:lvl9pPr>
   </p:defaultTextStyle>
+  <p:extLst>
+    <p:ext uri="{EFAFB233-063F-42B5-8137-9DF3F51BA10A}">
+      <p15:sldGuideLst xmlns:p15="http://schemas.microsoft.com/office/powerpoint/2012/main"/>
+    </p:ext>
+  </p:extLst>
 </p:presentation>
 </file>
 
@@ -261,6 +266,7 @@
           <a:p>
             <a:fld id="{F3B1270B-825F-4A6F-BFBD-8E5D97593686}" type="datetimeFigureOut">
               <a:rPr lang="uk-UA" smtClean="0"/>
+              <a:t>26.10.2020</a:t>
             </a:fld>
             <a:endParaRPr lang="uk-UA"/>
           </a:p>
@@ -302,6 +308,7 @@
           <a:p>
             <a:fld id="{A205741A-6C99-45B0-8A04-C4D0F9F7160F}" type="slidenum">
               <a:rPr lang="uk-UA" smtClean="0"/>
+              <a:t>‹#›</a:t>
             </a:fld>
             <a:endParaRPr lang="uk-UA"/>
           </a:p>
@@ -375,7 +382,6 @@
               <a:rPr lang="ru-RU"/>
               <a:t>Образец текста</a:t>
             </a:r>
-            <a:endParaRPr lang="ru-RU"/>
           </a:p>
           <a:p>
             <a:pPr lvl="1"/>
@@ -383,7 +389,6 @@
               <a:rPr lang="ru-RU"/>
               <a:t>Второй уровень</a:t>
             </a:r>
-            <a:endParaRPr lang="ru-RU"/>
           </a:p>
           <a:p>
             <a:pPr lvl="2"/>
@@ -391,7 +396,6 @@
               <a:rPr lang="ru-RU"/>
               <a:t>Третий уровень</a:t>
             </a:r>
-            <a:endParaRPr lang="ru-RU"/>
           </a:p>
           <a:p>
             <a:pPr lvl="3"/>
@@ -399,7 +403,6 @@
               <a:rPr lang="ru-RU"/>
               <a:t>Четвертый уровень</a:t>
             </a:r>
-            <a:endParaRPr lang="ru-RU"/>
           </a:p>
           <a:p>
             <a:pPr lvl="4"/>
@@ -428,6 +431,7 @@
           <a:p>
             <a:fld id="{F3B1270B-825F-4A6F-BFBD-8E5D97593686}" type="datetimeFigureOut">
               <a:rPr lang="uk-UA" smtClean="0"/>
+              <a:t>26.10.2020</a:t>
             </a:fld>
             <a:endParaRPr lang="uk-UA"/>
           </a:p>
@@ -469,6 +473,7 @@
           <a:p>
             <a:fld id="{A205741A-6C99-45B0-8A04-C4D0F9F7160F}" type="slidenum">
               <a:rPr lang="uk-UA" smtClean="0"/>
+              <a:t>‹#›</a:t>
             </a:fld>
             <a:endParaRPr lang="uk-UA"/>
           </a:p>
@@ -552,7 +557,6 @@
               <a:rPr lang="ru-RU"/>
               <a:t>Образец текста</a:t>
             </a:r>
-            <a:endParaRPr lang="ru-RU"/>
           </a:p>
           <a:p>
             <a:pPr lvl="1"/>
@@ -560,7 +564,6 @@
               <a:rPr lang="ru-RU"/>
               <a:t>Второй уровень</a:t>
             </a:r>
-            <a:endParaRPr lang="ru-RU"/>
           </a:p>
           <a:p>
             <a:pPr lvl="2"/>
@@ -568,7 +571,6 @@
               <a:rPr lang="ru-RU"/>
               <a:t>Третий уровень</a:t>
             </a:r>
-            <a:endParaRPr lang="ru-RU"/>
           </a:p>
           <a:p>
             <a:pPr lvl="3"/>
@@ -576,7 +578,6 @@
               <a:rPr lang="ru-RU"/>
               <a:t>Четвертый уровень</a:t>
             </a:r>
-            <a:endParaRPr lang="ru-RU"/>
           </a:p>
           <a:p>
             <a:pPr lvl="4"/>
@@ -605,6 +606,7 @@
           <a:p>
             <a:fld id="{F3B1270B-825F-4A6F-BFBD-8E5D97593686}" type="datetimeFigureOut">
               <a:rPr lang="uk-UA" smtClean="0"/>
+              <a:t>26.10.2020</a:t>
             </a:fld>
             <a:endParaRPr lang="uk-UA"/>
           </a:p>
@@ -646,6 +648,7 @@
           <a:p>
             <a:fld id="{A205741A-6C99-45B0-8A04-C4D0F9F7160F}" type="slidenum">
               <a:rPr lang="uk-UA" smtClean="0"/>
+              <a:t>‹#›</a:t>
             </a:fld>
             <a:endParaRPr lang="uk-UA"/>
           </a:p>
@@ -790,6 +793,7 @@
           <a:p>
             <a:fld id="{F3B1270B-825F-4A6F-BFBD-8E5D97593686}" type="datetimeFigureOut">
               <a:rPr lang="uk-UA" smtClean="0"/>
+              <a:t>26.10.2020</a:t>
             </a:fld>
             <a:endParaRPr lang="uk-UA"/>
           </a:p>
@@ -831,6 +835,7 @@
           <a:p>
             <a:fld id="{A205741A-6C99-45B0-8A04-C4D0F9F7160F}" type="slidenum">
               <a:rPr lang="uk-UA" smtClean="0"/>
+              <a:t>‹#›</a:t>
             </a:fld>
             <a:endParaRPr lang="uk-UA"/>
           </a:p>
@@ -904,7 +909,6 @@
               <a:rPr lang="ru-RU"/>
               <a:t>Образец текста</a:t>
             </a:r>
-            <a:endParaRPr lang="ru-RU"/>
           </a:p>
           <a:p>
             <a:pPr lvl="1"/>
@@ -912,7 +916,6 @@
               <a:rPr lang="ru-RU"/>
               <a:t>Второй уровень</a:t>
             </a:r>
-            <a:endParaRPr lang="ru-RU"/>
           </a:p>
           <a:p>
             <a:pPr lvl="2"/>
@@ -920,7 +923,6 @@
               <a:rPr lang="ru-RU"/>
               <a:t>Третий уровень</a:t>
             </a:r>
-            <a:endParaRPr lang="ru-RU"/>
           </a:p>
           <a:p>
             <a:pPr lvl="3"/>
@@ -928,7 +930,6 @@
               <a:rPr lang="ru-RU"/>
               <a:t>Четвертый уровень</a:t>
             </a:r>
-            <a:endParaRPr lang="ru-RU"/>
           </a:p>
           <a:p>
             <a:pPr lvl="4"/>
@@ -957,6 +958,7 @@
           <a:p>
             <a:fld id="{F3B1270B-825F-4A6F-BFBD-8E5D97593686}" type="datetimeFigureOut">
               <a:rPr lang="uk-UA" smtClean="0"/>
+              <a:t>26.10.2020</a:t>
             </a:fld>
             <a:endParaRPr lang="uk-UA"/>
           </a:p>
@@ -998,6 +1000,7 @@
           <a:p>
             <a:fld id="{A205741A-6C99-45B0-8A04-C4D0F9F7160F}" type="slidenum">
               <a:rPr lang="uk-UA" smtClean="0"/>
+              <a:t>‹#›</a:t>
             </a:fld>
             <a:endParaRPr lang="uk-UA"/>
           </a:p>
@@ -1176,7 +1179,6 @@
               <a:rPr lang="ru-RU"/>
               <a:t>Образец текста</a:t>
             </a:r>
-            <a:endParaRPr lang="ru-RU"/>
           </a:p>
         </p:txBody>
       </p:sp>
@@ -1197,6 +1199,7 @@
           <a:p>
             <a:fld id="{F3B1270B-825F-4A6F-BFBD-8E5D97593686}" type="datetimeFigureOut">
               <a:rPr lang="uk-UA" smtClean="0"/>
+              <a:t>26.10.2020</a:t>
             </a:fld>
             <a:endParaRPr lang="uk-UA"/>
           </a:p>
@@ -1238,6 +1241,7 @@
           <a:p>
             <a:fld id="{A205741A-6C99-45B0-8A04-C4D0F9F7160F}" type="slidenum">
               <a:rPr lang="uk-UA" smtClean="0"/>
+              <a:t>‹#›</a:t>
             </a:fld>
             <a:endParaRPr lang="uk-UA"/>
           </a:p>
@@ -1316,7 +1320,6 @@
               <a:rPr lang="ru-RU"/>
               <a:t>Образец текста</a:t>
             </a:r>
-            <a:endParaRPr lang="ru-RU"/>
           </a:p>
           <a:p>
             <a:pPr lvl="1"/>
@@ -1324,7 +1327,6 @@
               <a:rPr lang="ru-RU"/>
               <a:t>Второй уровень</a:t>
             </a:r>
-            <a:endParaRPr lang="ru-RU"/>
           </a:p>
           <a:p>
             <a:pPr lvl="2"/>
@@ -1332,7 +1334,6 @@
               <a:rPr lang="ru-RU"/>
               <a:t>Третий уровень</a:t>
             </a:r>
-            <a:endParaRPr lang="ru-RU"/>
           </a:p>
           <a:p>
             <a:pPr lvl="3"/>
@@ -1340,7 +1341,6 @@
               <a:rPr lang="ru-RU"/>
               <a:t>Четвертый уровень</a:t>
             </a:r>
-            <a:endParaRPr lang="ru-RU"/>
           </a:p>
           <a:p>
             <a:pPr lvl="4"/>
@@ -1377,7 +1377,6 @@
               <a:rPr lang="ru-RU"/>
               <a:t>Образец текста</a:t>
             </a:r>
-            <a:endParaRPr lang="ru-RU"/>
           </a:p>
           <a:p>
             <a:pPr lvl="1"/>
@@ -1385,7 +1384,6 @@
               <a:rPr lang="ru-RU"/>
               <a:t>Второй уровень</a:t>
             </a:r>
-            <a:endParaRPr lang="ru-RU"/>
           </a:p>
           <a:p>
             <a:pPr lvl="2"/>
@@ -1393,7 +1391,6 @@
               <a:rPr lang="ru-RU"/>
               <a:t>Третий уровень</a:t>
             </a:r>
-            <a:endParaRPr lang="ru-RU"/>
           </a:p>
           <a:p>
             <a:pPr lvl="3"/>
@@ -1401,7 +1398,6 @@
               <a:rPr lang="ru-RU"/>
               <a:t>Четвертый уровень</a:t>
             </a:r>
-            <a:endParaRPr lang="ru-RU"/>
           </a:p>
           <a:p>
             <a:pPr lvl="4"/>
@@ -1430,6 +1426,7 @@
           <a:p>
             <a:fld id="{F3B1270B-825F-4A6F-BFBD-8E5D97593686}" type="datetimeFigureOut">
               <a:rPr lang="uk-UA" smtClean="0"/>
+              <a:t>26.10.2020</a:t>
             </a:fld>
             <a:endParaRPr lang="uk-UA"/>
           </a:p>
@@ -1471,6 +1468,7 @@
           <a:p>
             <a:fld id="{A205741A-6C99-45B0-8A04-C4D0F9F7160F}" type="slidenum">
               <a:rPr lang="uk-UA" smtClean="0"/>
+              <a:t>‹#›</a:t>
             </a:fld>
             <a:endParaRPr lang="uk-UA"/>
           </a:p>
@@ -1591,7 +1589,6 @@
               <a:rPr lang="ru-RU"/>
               <a:t>Образец текста</a:t>
             </a:r>
-            <a:endParaRPr lang="ru-RU"/>
           </a:p>
         </p:txBody>
       </p:sp>
@@ -1620,7 +1617,6 @@
               <a:rPr lang="ru-RU"/>
               <a:t>Образец текста</a:t>
             </a:r>
-            <a:endParaRPr lang="ru-RU"/>
           </a:p>
           <a:p>
             <a:pPr lvl="1"/>
@@ -1628,7 +1624,6 @@
               <a:rPr lang="ru-RU"/>
               <a:t>Второй уровень</a:t>
             </a:r>
-            <a:endParaRPr lang="ru-RU"/>
           </a:p>
           <a:p>
             <a:pPr lvl="2"/>
@@ -1636,7 +1631,6 @@
               <a:rPr lang="ru-RU"/>
               <a:t>Третий уровень</a:t>
             </a:r>
-            <a:endParaRPr lang="ru-RU"/>
           </a:p>
           <a:p>
             <a:pPr lvl="3"/>
@@ -1644,7 +1638,6 @@
               <a:rPr lang="ru-RU"/>
               <a:t>Четвертый уровень</a:t>
             </a:r>
-            <a:endParaRPr lang="ru-RU"/>
           </a:p>
           <a:p>
             <a:pPr lvl="4"/>
@@ -1718,7 +1711,6 @@
               <a:rPr lang="ru-RU"/>
               <a:t>Образец текста</a:t>
             </a:r>
-            <a:endParaRPr lang="ru-RU"/>
           </a:p>
         </p:txBody>
       </p:sp>
@@ -1747,7 +1739,6 @@
               <a:rPr lang="ru-RU"/>
               <a:t>Образец текста</a:t>
             </a:r>
-            <a:endParaRPr lang="ru-RU"/>
           </a:p>
           <a:p>
             <a:pPr lvl="1"/>
@@ -1755,7 +1746,6 @@
               <a:rPr lang="ru-RU"/>
               <a:t>Второй уровень</a:t>
             </a:r>
-            <a:endParaRPr lang="ru-RU"/>
           </a:p>
           <a:p>
             <a:pPr lvl="2"/>
@@ -1763,7 +1753,6 @@
               <a:rPr lang="ru-RU"/>
               <a:t>Третий уровень</a:t>
             </a:r>
-            <a:endParaRPr lang="ru-RU"/>
           </a:p>
           <a:p>
             <a:pPr lvl="3"/>
@@ -1771,7 +1760,6 @@
               <a:rPr lang="ru-RU"/>
               <a:t>Четвертый уровень</a:t>
             </a:r>
-            <a:endParaRPr lang="ru-RU"/>
           </a:p>
           <a:p>
             <a:pPr lvl="4"/>
@@ -1800,6 +1788,7 @@
           <a:p>
             <a:fld id="{F3B1270B-825F-4A6F-BFBD-8E5D97593686}" type="datetimeFigureOut">
               <a:rPr lang="uk-UA" smtClean="0"/>
+              <a:t>26.10.2020</a:t>
             </a:fld>
             <a:endParaRPr lang="uk-UA"/>
           </a:p>
@@ -1841,6 +1830,7 @@
           <a:p>
             <a:fld id="{A205741A-6C99-45B0-8A04-C4D0F9F7160F}" type="slidenum">
               <a:rPr lang="uk-UA" smtClean="0"/>
+              <a:t>‹#›</a:t>
             </a:fld>
             <a:endParaRPr lang="uk-UA"/>
           </a:p>
@@ -1911,6 +1901,7 @@
           <a:p>
             <a:fld id="{F3B1270B-825F-4A6F-BFBD-8E5D97593686}" type="datetimeFigureOut">
               <a:rPr lang="uk-UA" smtClean="0"/>
+              <a:t>26.10.2020</a:t>
             </a:fld>
             <a:endParaRPr lang="uk-UA"/>
           </a:p>
@@ -1952,6 +1943,7 @@
           <a:p>
             <a:fld id="{A205741A-6C99-45B0-8A04-C4D0F9F7160F}" type="slidenum">
               <a:rPr lang="uk-UA" smtClean="0"/>
+              <a:t>‹#›</a:t>
             </a:fld>
             <a:endParaRPr lang="uk-UA"/>
           </a:p>
@@ -1999,6 +1991,7 @@
           <a:p>
             <a:fld id="{F3B1270B-825F-4A6F-BFBD-8E5D97593686}" type="datetimeFigureOut">
               <a:rPr lang="uk-UA" smtClean="0"/>
+              <a:t>26.10.2020</a:t>
             </a:fld>
             <a:endParaRPr lang="uk-UA"/>
           </a:p>
@@ -2040,6 +2033,7 @@
           <a:p>
             <a:fld id="{A205741A-6C99-45B0-8A04-C4D0F9F7160F}" type="slidenum">
               <a:rPr lang="uk-UA" smtClean="0"/>
+              <a:t>‹#›</a:t>
             </a:fld>
             <a:endParaRPr lang="uk-UA"/>
           </a:p>
@@ -2155,7 +2149,6 @@
               <a:rPr lang="ru-RU"/>
               <a:t>Образец текста</a:t>
             </a:r>
-            <a:endParaRPr lang="ru-RU"/>
           </a:p>
           <a:p>
             <a:pPr lvl="1"/>
@@ -2163,7 +2156,6 @@
               <a:rPr lang="ru-RU"/>
               <a:t>Второй уровень</a:t>
             </a:r>
-            <a:endParaRPr lang="ru-RU"/>
           </a:p>
           <a:p>
             <a:pPr lvl="2"/>
@@ -2171,7 +2163,6 @@
               <a:rPr lang="ru-RU"/>
               <a:t>Третий уровень</a:t>
             </a:r>
-            <a:endParaRPr lang="ru-RU"/>
           </a:p>
           <a:p>
             <a:pPr lvl="3"/>
@@ -2179,7 +2170,6 @@
               <a:rPr lang="ru-RU"/>
               <a:t>Четвертый уровень</a:t>
             </a:r>
-            <a:endParaRPr lang="ru-RU"/>
           </a:p>
           <a:p>
             <a:pPr lvl="4"/>
@@ -2253,7 +2243,6 @@
               <a:rPr lang="ru-RU"/>
               <a:t>Образец текста</a:t>
             </a:r>
-            <a:endParaRPr lang="ru-RU"/>
           </a:p>
         </p:txBody>
       </p:sp>
@@ -2274,6 +2263,7 @@
           <a:p>
             <a:fld id="{F3B1270B-825F-4A6F-BFBD-8E5D97593686}" type="datetimeFigureOut">
               <a:rPr lang="uk-UA" smtClean="0"/>
+              <a:t>26.10.2020</a:t>
             </a:fld>
             <a:endParaRPr lang="uk-UA"/>
           </a:p>
@@ -2315,6 +2305,7 @@
           <a:p>
             <a:fld id="{A205741A-6C99-45B0-8A04-C4D0F9F7160F}" type="slidenum">
               <a:rPr lang="uk-UA" smtClean="0"/>
+              <a:t>‹#›</a:t>
             </a:fld>
             <a:endParaRPr lang="uk-UA"/>
           </a:p>
@@ -2388,7 +2379,6 @@
               <a:rPr lang="ru-RU"/>
               <a:t>Образец текста</a:t>
             </a:r>
-            <a:endParaRPr lang="ru-RU"/>
           </a:p>
           <a:p>
             <a:pPr lvl="1"/>
@@ -2396,7 +2386,6 @@
               <a:rPr lang="ru-RU"/>
               <a:t>Второй уровень</a:t>
             </a:r>
-            <a:endParaRPr lang="ru-RU"/>
           </a:p>
           <a:p>
             <a:pPr lvl="2"/>
@@ -2404,7 +2393,6 @@
               <a:rPr lang="ru-RU"/>
               <a:t>Третий уровень</a:t>
             </a:r>
-            <a:endParaRPr lang="ru-RU"/>
           </a:p>
           <a:p>
             <a:pPr lvl="3"/>
@@ -2412,7 +2400,6 @@
               <a:rPr lang="ru-RU"/>
               <a:t>Четвертый уровень</a:t>
             </a:r>
-            <a:endParaRPr lang="ru-RU"/>
           </a:p>
           <a:p>
             <a:pPr lvl="4"/>
@@ -2441,6 +2428,7 @@
           <a:p>
             <a:fld id="{F3B1270B-825F-4A6F-BFBD-8E5D97593686}" type="datetimeFigureOut">
               <a:rPr lang="uk-UA" smtClean="0"/>
+              <a:t>26.10.2020</a:t>
             </a:fld>
             <a:endParaRPr lang="uk-UA"/>
           </a:p>
@@ -2482,6 +2470,7 @@
           <a:p>
             <a:fld id="{A205741A-6C99-45B0-8A04-C4D0F9F7160F}" type="slidenum">
               <a:rPr lang="uk-UA" smtClean="0"/>
+              <a:t>‹#›</a:t>
             </a:fld>
             <a:endParaRPr lang="uk-UA"/>
           </a:p>
@@ -2667,7 +2656,6 @@
               <a:rPr lang="ru-RU"/>
               <a:t>Образец текста</a:t>
             </a:r>
-            <a:endParaRPr lang="ru-RU"/>
           </a:p>
         </p:txBody>
       </p:sp>
@@ -2688,6 +2676,7 @@
           <a:p>
             <a:fld id="{F3B1270B-825F-4A6F-BFBD-8E5D97593686}" type="datetimeFigureOut">
               <a:rPr lang="uk-UA" smtClean="0"/>
+              <a:t>26.10.2020</a:t>
             </a:fld>
             <a:endParaRPr lang="uk-UA"/>
           </a:p>
@@ -2729,6 +2718,7 @@
           <a:p>
             <a:fld id="{A205741A-6C99-45B0-8A04-C4D0F9F7160F}" type="slidenum">
               <a:rPr lang="uk-UA" smtClean="0"/>
+              <a:t>‹#›</a:t>
             </a:fld>
             <a:endParaRPr lang="uk-UA"/>
           </a:p>
@@ -2802,7 +2792,6 @@
               <a:rPr lang="ru-RU"/>
               <a:t>Образец текста</a:t>
             </a:r>
-            <a:endParaRPr lang="ru-RU"/>
           </a:p>
           <a:p>
             <a:pPr lvl="1"/>
@@ -2810,7 +2799,6 @@
               <a:rPr lang="ru-RU"/>
               <a:t>Второй уровень</a:t>
             </a:r>
-            <a:endParaRPr lang="ru-RU"/>
           </a:p>
           <a:p>
             <a:pPr lvl="2"/>
@@ -2818,7 +2806,6 @@
               <a:rPr lang="ru-RU"/>
               <a:t>Третий уровень</a:t>
             </a:r>
-            <a:endParaRPr lang="ru-RU"/>
           </a:p>
           <a:p>
             <a:pPr lvl="3"/>
@@ -2826,7 +2813,6 @@
               <a:rPr lang="ru-RU"/>
               <a:t>Четвертый уровень</a:t>
             </a:r>
-            <a:endParaRPr lang="ru-RU"/>
           </a:p>
           <a:p>
             <a:pPr lvl="4"/>
@@ -2855,6 +2841,7 @@
           <a:p>
             <a:fld id="{F3B1270B-825F-4A6F-BFBD-8E5D97593686}" type="datetimeFigureOut">
               <a:rPr lang="uk-UA" smtClean="0"/>
+              <a:t>26.10.2020</a:t>
             </a:fld>
             <a:endParaRPr lang="uk-UA"/>
           </a:p>
@@ -2896,6 +2883,7 @@
           <a:p>
             <a:fld id="{A205741A-6C99-45B0-8A04-C4D0F9F7160F}" type="slidenum">
               <a:rPr lang="uk-UA" smtClean="0"/>
+              <a:t>‹#›</a:t>
             </a:fld>
             <a:endParaRPr lang="uk-UA"/>
           </a:p>
@@ -2979,7 +2967,6 @@
               <a:rPr lang="ru-RU"/>
               <a:t>Образец текста</a:t>
             </a:r>
-            <a:endParaRPr lang="ru-RU"/>
           </a:p>
           <a:p>
             <a:pPr lvl="1"/>
@@ -2987,7 +2974,6 @@
               <a:rPr lang="ru-RU"/>
               <a:t>Второй уровень</a:t>
             </a:r>
-            <a:endParaRPr lang="ru-RU"/>
           </a:p>
           <a:p>
             <a:pPr lvl="2"/>
@@ -2995,7 +2981,6 @@
               <a:rPr lang="ru-RU"/>
               <a:t>Третий уровень</a:t>
             </a:r>
-            <a:endParaRPr lang="ru-RU"/>
           </a:p>
           <a:p>
             <a:pPr lvl="3"/>
@@ -3003,7 +2988,6 @@
               <a:rPr lang="ru-RU"/>
               <a:t>Четвертый уровень</a:t>
             </a:r>
-            <a:endParaRPr lang="ru-RU"/>
           </a:p>
           <a:p>
             <a:pPr lvl="4"/>
@@ -3032,6 +3016,7 @@
           <a:p>
             <a:fld id="{F3B1270B-825F-4A6F-BFBD-8E5D97593686}" type="datetimeFigureOut">
               <a:rPr lang="uk-UA" smtClean="0"/>
+              <a:t>26.10.2020</a:t>
             </a:fld>
             <a:endParaRPr lang="uk-UA"/>
           </a:p>
@@ -3073,6 +3058,7 @@
           <a:p>
             <a:fld id="{A205741A-6C99-45B0-8A04-C4D0F9F7160F}" type="slidenum">
               <a:rPr lang="uk-UA" smtClean="0"/>
+              <a:t>‹#›</a:t>
             </a:fld>
             <a:endParaRPr lang="uk-UA"/>
           </a:p>
@@ -3251,7 +3237,6 @@
               <a:rPr lang="ru-RU"/>
               <a:t>Образец текста</a:t>
             </a:r>
-            <a:endParaRPr lang="ru-RU"/>
           </a:p>
         </p:txBody>
       </p:sp>
@@ -3272,6 +3257,7 @@
           <a:p>
             <a:fld id="{F3B1270B-825F-4A6F-BFBD-8E5D97593686}" type="datetimeFigureOut">
               <a:rPr lang="uk-UA" smtClean="0"/>
+              <a:t>26.10.2020</a:t>
             </a:fld>
             <a:endParaRPr lang="uk-UA"/>
           </a:p>
@@ -3313,6 +3299,7 @@
           <a:p>
             <a:fld id="{A205741A-6C99-45B0-8A04-C4D0F9F7160F}" type="slidenum">
               <a:rPr lang="uk-UA" smtClean="0"/>
+              <a:t>‹#›</a:t>
             </a:fld>
             <a:endParaRPr lang="uk-UA"/>
           </a:p>
@@ -3391,7 +3378,6 @@
               <a:rPr lang="ru-RU"/>
               <a:t>Образец текста</a:t>
             </a:r>
-            <a:endParaRPr lang="ru-RU"/>
           </a:p>
           <a:p>
             <a:pPr lvl="1"/>
@@ -3399,7 +3385,6 @@
               <a:rPr lang="ru-RU"/>
               <a:t>Второй уровень</a:t>
             </a:r>
-            <a:endParaRPr lang="ru-RU"/>
           </a:p>
           <a:p>
             <a:pPr lvl="2"/>
@@ -3407,7 +3392,6 @@
               <a:rPr lang="ru-RU"/>
               <a:t>Третий уровень</a:t>
             </a:r>
-            <a:endParaRPr lang="ru-RU"/>
           </a:p>
           <a:p>
             <a:pPr lvl="3"/>
@@ -3415,7 +3399,6 @@
               <a:rPr lang="ru-RU"/>
               <a:t>Четвертый уровень</a:t>
             </a:r>
-            <a:endParaRPr lang="ru-RU"/>
           </a:p>
           <a:p>
             <a:pPr lvl="4"/>
@@ -3452,7 +3435,6 @@
               <a:rPr lang="ru-RU"/>
               <a:t>Образец текста</a:t>
             </a:r>
-            <a:endParaRPr lang="ru-RU"/>
           </a:p>
           <a:p>
             <a:pPr lvl="1"/>
@@ -3460,7 +3442,6 @@
               <a:rPr lang="ru-RU"/>
               <a:t>Второй уровень</a:t>
             </a:r>
-            <a:endParaRPr lang="ru-RU"/>
           </a:p>
           <a:p>
             <a:pPr lvl="2"/>
@@ -3468,7 +3449,6 @@
               <a:rPr lang="ru-RU"/>
               <a:t>Третий уровень</a:t>
             </a:r>
-            <a:endParaRPr lang="ru-RU"/>
           </a:p>
           <a:p>
             <a:pPr lvl="3"/>
@@ -3476,7 +3456,6 @@
               <a:rPr lang="ru-RU"/>
               <a:t>Четвертый уровень</a:t>
             </a:r>
-            <a:endParaRPr lang="ru-RU"/>
           </a:p>
           <a:p>
             <a:pPr lvl="4"/>
@@ -3505,6 +3484,7 @@
           <a:p>
             <a:fld id="{F3B1270B-825F-4A6F-BFBD-8E5D97593686}" type="datetimeFigureOut">
               <a:rPr lang="uk-UA" smtClean="0"/>
+              <a:t>26.10.2020</a:t>
             </a:fld>
             <a:endParaRPr lang="uk-UA"/>
           </a:p>
@@ -3546,6 +3526,7 @@
           <a:p>
             <a:fld id="{A205741A-6C99-45B0-8A04-C4D0F9F7160F}" type="slidenum">
               <a:rPr lang="uk-UA" smtClean="0"/>
+              <a:t>‹#›</a:t>
             </a:fld>
             <a:endParaRPr lang="uk-UA"/>
           </a:p>
@@ -3666,7 +3647,6 @@
               <a:rPr lang="ru-RU"/>
               <a:t>Образец текста</a:t>
             </a:r>
-            <a:endParaRPr lang="ru-RU"/>
           </a:p>
         </p:txBody>
       </p:sp>
@@ -3695,7 +3675,6 @@
               <a:rPr lang="ru-RU"/>
               <a:t>Образец текста</a:t>
             </a:r>
-            <a:endParaRPr lang="ru-RU"/>
           </a:p>
           <a:p>
             <a:pPr lvl="1"/>
@@ -3703,7 +3682,6 @@
               <a:rPr lang="ru-RU"/>
               <a:t>Второй уровень</a:t>
             </a:r>
-            <a:endParaRPr lang="ru-RU"/>
           </a:p>
           <a:p>
             <a:pPr lvl="2"/>
@@ -3711,7 +3689,6 @@
               <a:rPr lang="ru-RU"/>
               <a:t>Третий уровень</a:t>
             </a:r>
-            <a:endParaRPr lang="ru-RU"/>
           </a:p>
           <a:p>
             <a:pPr lvl="3"/>
@@ -3719,7 +3696,6 @@
               <a:rPr lang="ru-RU"/>
               <a:t>Четвертый уровень</a:t>
             </a:r>
-            <a:endParaRPr lang="ru-RU"/>
           </a:p>
           <a:p>
             <a:pPr lvl="4"/>
@@ -3793,7 +3769,6 @@
               <a:rPr lang="ru-RU"/>
               <a:t>Образец текста</a:t>
             </a:r>
-            <a:endParaRPr lang="ru-RU"/>
           </a:p>
         </p:txBody>
       </p:sp>
@@ -3822,7 +3797,6 @@
               <a:rPr lang="ru-RU"/>
               <a:t>Образец текста</a:t>
             </a:r>
-            <a:endParaRPr lang="ru-RU"/>
           </a:p>
           <a:p>
             <a:pPr lvl="1"/>
@@ -3830,7 +3804,6 @@
               <a:rPr lang="ru-RU"/>
               <a:t>Второй уровень</a:t>
             </a:r>
-            <a:endParaRPr lang="ru-RU"/>
           </a:p>
           <a:p>
             <a:pPr lvl="2"/>
@@ -3838,7 +3811,6 @@
               <a:rPr lang="ru-RU"/>
               <a:t>Третий уровень</a:t>
             </a:r>
-            <a:endParaRPr lang="ru-RU"/>
           </a:p>
           <a:p>
             <a:pPr lvl="3"/>
@@ -3846,7 +3818,6 @@
               <a:rPr lang="ru-RU"/>
               <a:t>Четвертый уровень</a:t>
             </a:r>
-            <a:endParaRPr lang="ru-RU"/>
           </a:p>
           <a:p>
             <a:pPr lvl="4"/>
@@ -3875,6 +3846,7 @@
           <a:p>
             <a:fld id="{F3B1270B-825F-4A6F-BFBD-8E5D97593686}" type="datetimeFigureOut">
               <a:rPr lang="uk-UA" smtClean="0"/>
+              <a:t>26.10.2020</a:t>
             </a:fld>
             <a:endParaRPr lang="uk-UA"/>
           </a:p>
@@ -3916,6 +3888,7 @@
           <a:p>
             <a:fld id="{A205741A-6C99-45B0-8A04-C4D0F9F7160F}" type="slidenum">
               <a:rPr lang="uk-UA" smtClean="0"/>
+              <a:t>‹#›</a:t>
             </a:fld>
             <a:endParaRPr lang="uk-UA"/>
           </a:p>
@@ -3986,6 +3959,7 @@
           <a:p>
             <a:fld id="{F3B1270B-825F-4A6F-BFBD-8E5D97593686}" type="datetimeFigureOut">
               <a:rPr lang="uk-UA" smtClean="0"/>
+              <a:t>26.10.2020</a:t>
             </a:fld>
             <a:endParaRPr lang="uk-UA"/>
           </a:p>
@@ -4027,6 +4001,7 @@
           <a:p>
             <a:fld id="{A205741A-6C99-45B0-8A04-C4D0F9F7160F}" type="slidenum">
               <a:rPr lang="uk-UA" smtClean="0"/>
+              <a:t>‹#›</a:t>
             </a:fld>
             <a:endParaRPr lang="uk-UA"/>
           </a:p>
@@ -4074,6 +4049,7 @@
           <a:p>
             <a:fld id="{F3B1270B-825F-4A6F-BFBD-8E5D97593686}" type="datetimeFigureOut">
               <a:rPr lang="uk-UA" smtClean="0"/>
+              <a:t>26.10.2020</a:t>
             </a:fld>
             <a:endParaRPr lang="uk-UA"/>
           </a:p>
@@ -4115,6 +4091,7 @@
           <a:p>
             <a:fld id="{A205741A-6C99-45B0-8A04-C4D0F9F7160F}" type="slidenum">
               <a:rPr lang="uk-UA" smtClean="0"/>
+              <a:t>‹#›</a:t>
             </a:fld>
             <a:endParaRPr lang="uk-UA"/>
           </a:p>
@@ -4230,7 +4207,6 @@
               <a:rPr lang="ru-RU"/>
               <a:t>Образец текста</a:t>
             </a:r>
-            <a:endParaRPr lang="ru-RU"/>
           </a:p>
           <a:p>
             <a:pPr lvl="1"/>
@@ -4238,7 +4214,6 @@
               <a:rPr lang="ru-RU"/>
               <a:t>Второй уровень</a:t>
             </a:r>
-            <a:endParaRPr lang="ru-RU"/>
           </a:p>
           <a:p>
             <a:pPr lvl="2"/>
@@ -4246,7 +4221,6 @@
               <a:rPr lang="ru-RU"/>
               <a:t>Третий уровень</a:t>
             </a:r>
-            <a:endParaRPr lang="ru-RU"/>
           </a:p>
           <a:p>
             <a:pPr lvl="3"/>
@@ -4254,7 +4228,6 @@
               <a:rPr lang="ru-RU"/>
               <a:t>Четвертый уровень</a:t>
             </a:r>
-            <a:endParaRPr lang="ru-RU"/>
           </a:p>
           <a:p>
             <a:pPr lvl="4"/>
@@ -4328,7 +4301,6 @@
               <a:rPr lang="ru-RU"/>
               <a:t>Образец текста</a:t>
             </a:r>
-            <a:endParaRPr lang="ru-RU"/>
           </a:p>
         </p:txBody>
       </p:sp>
@@ -4349,6 +4321,7 @@
           <a:p>
             <a:fld id="{F3B1270B-825F-4A6F-BFBD-8E5D97593686}" type="datetimeFigureOut">
               <a:rPr lang="uk-UA" smtClean="0"/>
+              <a:t>26.10.2020</a:t>
             </a:fld>
             <a:endParaRPr lang="uk-UA"/>
           </a:p>
@@ -4390,6 +4363,7 @@
           <a:p>
             <a:fld id="{A205741A-6C99-45B0-8A04-C4D0F9F7160F}" type="slidenum">
               <a:rPr lang="uk-UA" smtClean="0"/>
+              <a:t>‹#›</a:t>
             </a:fld>
             <a:endParaRPr lang="uk-UA"/>
           </a:p>
@@ -4575,7 +4549,6 @@
               <a:rPr lang="ru-RU"/>
               <a:t>Образец текста</a:t>
             </a:r>
-            <a:endParaRPr lang="ru-RU"/>
           </a:p>
         </p:txBody>
       </p:sp>
@@ -4596,6 +4569,7 @@
           <a:p>
             <a:fld id="{F3B1270B-825F-4A6F-BFBD-8E5D97593686}" type="datetimeFigureOut">
               <a:rPr lang="uk-UA" smtClean="0"/>
+              <a:t>26.10.2020</a:t>
             </a:fld>
             <a:endParaRPr lang="uk-UA"/>
           </a:p>
@@ -4637,6 +4611,7 @@
           <a:p>
             <a:fld id="{A205741A-6C99-45B0-8A04-C4D0F9F7160F}" type="slidenum">
               <a:rPr lang="uk-UA" smtClean="0"/>
+              <a:t>‹#›</a:t>
             </a:fld>
             <a:endParaRPr lang="uk-UA"/>
           </a:p>
@@ -4735,7 +4710,6 @@
               <a:rPr lang="ru-RU"/>
               <a:t>Образец текста</a:t>
             </a:r>
-            <a:endParaRPr lang="ru-RU"/>
           </a:p>
           <a:p>
             <a:pPr lvl="1"/>
@@ -4743,7 +4717,6 @@
               <a:rPr lang="ru-RU"/>
               <a:t>Второй уровень</a:t>
             </a:r>
-            <a:endParaRPr lang="ru-RU"/>
           </a:p>
           <a:p>
             <a:pPr lvl="2"/>
@@ -4751,7 +4724,6 @@
               <a:rPr lang="ru-RU"/>
               <a:t>Третий уровень</a:t>
             </a:r>
-            <a:endParaRPr lang="ru-RU"/>
           </a:p>
           <a:p>
             <a:pPr lvl="3"/>
@@ -4759,7 +4731,6 @@
               <a:rPr lang="ru-RU"/>
               <a:t>Четвертый уровень</a:t>
             </a:r>
-            <a:endParaRPr lang="ru-RU"/>
           </a:p>
           <a:p>
             <a:pPr lvl="4"/>
@@ -4806,6 +4777,7 @@
           <a:p>
             <a:fld id="{F3B1270B-825F-4A6F-BFBD-8E5D97593686}" type="datetimeFigureOut">
               <a:rPr lang="uk-UA" smtClean="0"/>
+              <a:t>26.10.2020</a:t>
             </a:fld>
             <a:endParaRPr lang="uk-UA"/>
           </a:p>
@@ -4883,6 +4855,7 @@
           <a:p>
             <a:fld id="{A205741A-6C99-45B0-8A04-C4D0F9F7160F}" type="slidenum">
               <a:rPr lang="uk-UA" smtClean="0"/>
+              <a:t>‹#›</a:t>
             </a:fld>
             <a:endParaRPr lang="uk-UA"/>
           </a:p>
@@ -5272,7 +5245,6 @@
               <a:rPr lang="ru-RU"/>
               <a:t>Образец текста</a:t>
             </a:r>
-            <a:endParaRPr lang="ru-RU"/>
           </a:p>
           <a:p>
             <a:pPr lvl="1"/>
@@ -5280,7 +5252,6 @@
               <a:rPr lang="ru-RU"/>
               <a:t>Второй уровень</a:t>
             </a:r>
-            <a:endParaRPr lang="ru-RU"/>
           </a:p>
           <a:p>
             <a:pPr lvl="2"/>
@@ -5288,7 +5259,6 @@
               <a:rPr lang="ru-RU"/>
               <a:t>Третий уровень</a:t>
             </a:r>
-            <a:endParaRPr lang="ru-RU"/>
           </a:p>
           <a:p>
             <a:pPr lvl="3"/>
@@ -5296,7 +5266,6 @@
               <a:rPr lang="ru-RU"/>
               <a:t>Четвертый уровень</a:t>
             </a:r>
-            <a:endParaRPr lang="ru-RU"/>
           </a:p>
           <a:p>
             <a:pPr lvl="4"/>
@@ -5343,6 +5312,7 @@
           <a:p>
             <a:fld id="{F3B1270B-825F-4A6F-BFBD-8E5D97593686}" type="datetimeFigureOut">
               <a:rPr lang="uk-UA" smtClean="0"/>
+              <a:t>26.10.2020</a:t>
             </a:fld>
             <a:endParaRPr lang="uk-UA"/>
           </a:p>
@@ -5420,6 +5390,7 @@
           <a:p>
             <a:fld id="{A205741A-6C99-45B0-8A04-C4D0F9F7160F}" type="slidenum">
               <a:rPr lang="uk-UA" smtClean="0"/>
+              <a:t>‹#›</a:t>
             </a:fld>
             <a:endParaRPr lang="uk-UA"/>
           </a:p>
@@ -5821,7 +5792,6 @@
               <a:rPr lang="uk-UA" dirty="0"/>
               <a:t>Мальований Денис Олегович</a:t>
             </a:r>
-            <a:endParaRPr lang="uk-UA" dirty="0"/>
           </a:p>
         </p:txBody>
       </p:sp>
@@ -5830,13 +5800,13 @@
   <p:clrMapOvr>
     <a:masterClrMapping/>
   </p:clrMapOvr>
-  <mc:AlternateContent xmlns:mc="http://schemas.openxmlformats.org/markup-compatibility/2006">
-    <mc:Choice xmlns:p14="http://schemas.microsoft.com/office/powerpoint/2010/main" Requires="p14">
+  <mc:AlternateContent xmlns:mc="http://schemas.openxmlformats.org/markup-compatibility/2006" xmlns:p14="http://schemas.microsoft.com/office/powerpoint/2010/main">
+    <mc:Choice Requires="p14">
       <p:transition spd="slow" p14:dur="1500">
         <p:split orient="vert"/>
       </p:transition>
     </mc:Choice>
-    <mc:Fallback>
+    <mc:Fallback xmlns="">
       <p:transition spd="slow">
         <p:split orient="vert"/>
       </p:transition>
@@ -5851,7 +5821,7 @@
     <p:bg>
       <p:bgPr>
         <a:blipFill>
-          <a:blip r:embed="rId1"/>
+          <a:blip r:embed="rId2"/>
           <a:tile tx="0" ty="0" sx="100000" sy="100000" flip="none" algn="tl"/>
         </a:blipFill>
         <a:effectLst/>
@@ -5946,7 +5916,6 @@
               <a:rPr lang="uk-UA" dirty="0"/>
               <a:t>.</a:t>
             </a:r>
-            <a:endParaRPr lang="uk-UA" dirty="0"/>
           </a:p>
         </p:txBody>
       </p:sp>
@@ -5987,7 +5956,7 @@
           <p:nvPr/>
         </p:nvPicPr>
         <p:blipFill>
-          <a:blip r:embed="rId1"/>
+          <a:blip r:embed="rId2"/>
           <a:stretch>
             <a:fillRect/>
           </a:stretch>
@@ -6019,7 +5988,7 @@
     <p:bg>
       <p:bgPr>
         <a:blipFill>
-          <a:blip r:embed="rId1"/>
+          <a:blip r:embed="rId2"/>
           <a:tile tx="0" ty="0" sx="100000" sy="100000" flip="none" algn="tl"/>
         </a:blipFill>
         <a:effectLst/>
@@ -6074,7 +6043,6 @@
               <a:rPr lang="uk-UA" dirty="0"/>
               <a:t>-файлах ієрархічно. Тобто між тегами одного небесного тіла розташовується інформація про його супутники.</a:t>
             </a:r>
-            <a:endParaRPr lang="uk-UA" dirty="0"/>
           </a:p>
         </p:txBody>
       </p:sp>
@@ -6113,7 +6081,7 @@
           <p:nvPr/>
         </p:nvPicPr>
         <p:blipFill>
-          <a:blip r:embed="rId1">
+          <a:blip r:embed="rId2">
             <a:extLst>
               <a:ext uri="{28A0092B-C50C-407E-A947-70E740481C1C}">
                 <a14:useLocalDpi xmlns:a14="http://schemas.microsoft.com/office/drawing/2010/main" val="0"/>
@@ -6146,7 +6114,7 @@
           <p:nvPr/>
         </p:nvPicPr>
         <p:blipFill>
-          <a:blip r:embed="rId2">
+          <a:blip r:embed="rId3">
             <a:extLst>
               <a:ext uri="{28A0092B-C50C-407E-A947-70E740481C1C}">
                 <a14:useLocalDpi xmlns:a14="http://schemas.microsoft.com/office/drawing/2010/main" val="0"/>
@@ -6179,7 +6147,7 @@
           <p:nvPr/>
         </p:nvPicPr>
         <p:blipFill>
-          <a:blip r:embed="rId3">
+          <a:blip r:embed="rId4">
             <a:extLst>
               <a:ext uri="{28A0092B-C50C-407E-A947-70E740481C1C}">
                 <a14:useLocalDpi xmlns:a14="http://schemas.microsoft.com/office/drawing/2010/main" val="0"/>
@@ -6222,7 +6190,7 @@
     <p:bg>
       <p:bgPr>
         <a:blipFill>
-          <a:blip r:embed="rId1"/>
+          <a:blip r:embed="rId2"/>
           <a:tile tx="0" ty="0" sx="100000" sy="100000" flip="none" algn="tl"/>
         </a:blipFill>
         <a:effectLst/>
@@ -6277,7 +6245,6 @@
               <a:rPr lang="uk-UA" dirty="0"/>
               <a:t>для гри або редагування, а також титрів. Ви можете обрати режим поодинокої або багатокористувацької гри.</a:t>
             </a:r>
-            <a:endParaRPr lang="uk-UA" dirty="0"/>
           </a:p>
         </p:txBody>
       </p:sp>
@@ -6318,7 +6285,7 @@
           <p:nvPr/>
         </p:nvPicPr>
         <p:blipFill>
-          <a:blip r:embed="rId1"/>
+          <a:blip r:embed="rId2"/>
           <a:stretch>
             <a:fillRect/>
           </a:stretch>
@@ -6368,7 +6335,7 @@
           <p:nvPr/>
         </p:nvPicPr>
         <p:blipFill>
-          <a:blip r:embed="rId1">
+          <a:blip r:embed="rId2">
             <a:extLst>
               <a:ext uri="{28A0092B-C50C-407E-A947-70E740481C1C}">
                 <a14:useLocalDpi xmlns:a14="http://schemas.microsoft.com/office/drawing/2010/main" val="0"/>
@@ -6429,7 +6396,7 @@
           <p:nvPr/>
         </p:nvPicPr>
         <p:blipFill>
-          <a:blip r:embed="rId1">
+          <a:blip r:embed="rId2">
             <a:extLst>
               <a:ext uri="{28A0092B-C50C-407E-A947-70E740481C1C}">
                 <a14:useLocalDpi xmlns:a14="http://schemas.microsoft.com/office/drawing/2010/main" val="0"/>
@@ -6492,7 +6459,7 @@
           <p:nvPr/>
         </p:nvPicPr>
         <p:blipFill>
-          <a:blip r:embed="rId1"/>
+          <a:blip r:embed="rId2"/>
           <a:stretch>
             <a:fillRect/>
           </a:stretch>
@@ -6542,7 +6509,7 @@
           <p:nvPr/>
         </p:nvPicPr>
         <p:blipFill>
-          <a:blip r:embed="rId1">
+          <a:blip r:embed="rId2">
             <a:extLst>
               <a:ext uri="{28A0092B-C50C-407E-A947-70E740481C1C}">
                 <a14:useLocalDpi xmlns:a14="http://schemas.microsoft.com/office/drawing/2010/main" val="0"/>
@@ -6585,7 +6552,7 @@
     <p:bg>
       <p:bgPr>
         <a:blipFill>
-          <a:blip r:embed="rId1"/>
+          <a:blip r:embed="rId2"/>
           <a:tile tx="0" ty="0" sx="100000" sy="100000" flip="none" algn="tl"/>
         </a:blipFill>
         <a:effectLst/>
@@ -6873,7 +6840,7 @@
           <p:nvPr/>
         </p:nvPicPr>
         <p:blipFill>
-          <a:blip r:embed="rId1"/>
+          <a:blip r:embed="rId2"/>
           <a:stretch>
             <a:fillRect/>
           </a:stretch>
@@ -6905,7 +6872,7 @@
     <p:bg>
       <p:bgPr>
         <a:blipFill>
-          <a:blip r:embed="rId1"/>
+          <a:blip r:embed="rId2"/>
           <a:tile tx="0" ty="0" sx="100000" sy="100000" flip="none" algn="tl"/>
         </a:blipFill>
         <a:effectLst/>
@@ -6964,7 +6931,6 @@
               <a:rPr lang="uk-UA" dirty="0"/>
               <a:t>.</a:t>
             </a:r>
-            <a:endParaRPr lang="uk-UA" dirty="0"/>
           </a:p>
         </p:txBody>
       </p:sp>
@@ -6985,7 +6951,7 @@
     <p:bg>
       <p:bgPr>
         <a:blipFill>
-          <a:blip r:embed="rId1"/>
+          <a:blip r:embed="rId2"/>
           <a:tile tx="0" ty="0" sx="100000" sy="100000" flip="none" algn="tl"/>
         </a:blipFill>
         <a:effectLst/>
@@ -7032,7 +6998,6 @@
               <a:rPr lang="uk-UA" dirty="0"/>
               <a:t>Використовуючи розроблену програму люди навчаються, експериментують, набувають знань у сфері астрономії й фізики. Крім того, ПЗ можна використовувати для науково точної симуляції зоряних систем.</a:t>
             </a:r>
-            <a:endParaRPr lang="uk-UA" dirty="0"/>
           </a:p>
         </p:txBody>
       </p:sp>
@@ -7111,9 +7076,6 @@
               </a:rPr>
               <a:t>Дякую за увагу!</a:t>
             </a:r>
-            <a:endParaRPr lang="uk-UA" sz="7200" b="1" dirty="0">
-              <a:latin typeface="+mn-lt"/>
-            </a:endParaRPr>
           </a:p>
         </p:txBody>
       </p:sp>
@@ -7156,7 +7118,7 @@
             </a:r>
             <a:r>
               <a:rPr lang="en-US" sz="3200" dirty="0">
-                <a:hlinkClick r:id="rId1"/>
+                <a:hlinkClick r:id="rId2"/>
               </a:rPr>
               <a:t>https://gitlab.com/maldenol/spacepioneers/</a:t>
             </a:r>
@@ -7180,13 +7142,13 @@
   <p:clrMapOvr>
     <a:masterClrMapping/>
   </p:clrMapOvr>
-  <mc:AlternateContent xmlns:mc="http://schemas.openxmlformats.org/markup-compatibility/2006">
-    <mc:Choice xmlns:p14="http://schemas.microsoft.com/office/powerpoint/2010/main" Requires="p14">
+  <mc:AlternateContent xmlns:mc="http://schemas.openxmlformats.org/markup-compatibility/2006" xmlns:p14="http://schemas.microsoft.com/office/powerpoint/2010/main">
+    <mc:Choice Requires="p14">
       <p:transition spd="slow">
         <p14:flash/>
       </p:transition>
     </mc:Choice>
-    <mc:Fallback>
+    <mc:Fallback xmlns="">
       <p:transition spd="slow">
         <p:fade/>
       </p:transition>
@@ -7201,7 +7163,7 @@
     <p:bg>
       <p:bgPr>
         <a:blipFill>
-          <a:blip r:embed="rId1"/>
+          <a:blip r:embed="rId2"/>
           <a:tile tx="0" ty="0" sx="100000" sy="100000" flip="none" algn="tl"/>
         </a:blipFill>
         <a:effectLst/>
@@ -7313,7 +7275,6 @@
               <a:rPr lang="uk-UA" dirty="0"/>
               <a:t>.</a:t>
             </a:r>
-            <a:endParaRPr lang="uk-UA" dirty="0"/>
           </a:p>
         </p:txBody>
       </p:sp>
@@ -7334,7 +7295,7 @@
     <p:bg>
       <p:bgPr>
         <a:blipFill>
-          <a:blip r:embed="rId1"/>
+          <a:blip r:embed="rId2"/>
           <a:tile tx="0" ty="0" sx="100000" sy="100000" flip="none" algn="tl"/>
         </a:blipFill>
         <a:effectLst/>
@@ -7413,7 +7374,6 @@
               <a:rPr lang="uk-UA" dirty="0"/>
               <a:t>. Вона надає багато можливостей при роботі з графікою, а багата документація й різноманіття функцій робить процес розробки значно легшим.</a:t>
             </a:r>
-            <a:endParaRPr lang="uk-UA" dirty="0"/>
           </a:p>
         </p:txBody>
       </p:sp>
@@ -7434,7 +7394,7 @@
     <p:bg>
       <p:bgPr>
         <a:blipFill>
-          <a:blip r:embed="rId1"/>
+          <a:blip r:embed="rId2"/>
           <a:tile tx="0" ty="0" sx="100000" sy="100000" flip="none" algn="tl"/>
         </a:blipFill>
         <a:effectLst/>
@@ -7509,7 +7469,66 @@
               <a:rPr lang="uk-UA" dirty="0"/>
               <a:t>яті, має в рази більшу швидкодію, а також графічні покращення.</a:t>
             </a:r>
-            <a:endParaRPr lang="uk-UA" dirty="0"/>
+            <a:r>
+              <a:rPr lang="en-US" dirty="0"/>
+              <a:t> </a:t>
+            </a:r>
+            <a:r>
+              <a:rPr lang="ru-RU" dirty="0" err="1"/>
+              <a:t>Крім</a:t>
+            </a:r>
+            <a:r>
+              <a:rPr lang="ru-RU" dirty="0"/>
+              <a:t> того, </a:t>
+            </a:r>
+            <a:r>
+              <a:rPr lang="ru-RU" dirty="0" err="1"/>
+              <a:t>архітектура</a:t>
+            </a:r>
+            <a:r>
+              <a:rPr lang="ru-RU" dirty="0"/>
+              <a:t> коду </a:t>
+            </a:r>
+            <a:r>
+              <a:rPr lang="ru-RU" dirty="0" err="1"/>
+              <a:t>має</a:t>
+            </a:r>
+            <a:r>
+              <a:rPr lang="ru-RU" dirty="0"/>
+              <a:t> </a:t>
+            </a:r>
+            <a:r>
+              <a:rPr lang="ru-RU" dirty="0" err="1"/>
+              <a:t>кращий</a:t>
+            </a:r>
+            <a:r>
+              <a:rPr lang="ru-RU" dirty="0"/>
+              <a:t> </a:t>
+            </a:r>
+            <a:r>
+              <a:rPr lang="ru-RU" dirty="0" err="1"/>
+              <a:t>вигляд</a:t>
+            </a:r>
+            <a:r>
+              <a:rPr lang="ru-RU" dirty="0"/>
+              <a:t>, </a:t>
+            </a:r>
+            <a:r>
+              <a:rPr lang="ru-RU" dirty="0" err="1"/>
+              <a:t>оскільки</a:t>
+            </a:r>
+            <a:r>
+              <a:rPr lang="ru-RU" dirty="0"/>
+              <a:t> </a:t>
+            </a:r>
+            <a:r>
+              <a:rPr lang="en-US" dirty="0"/>
+              <a:t>Processing </a:t>
+            </a:r>
+            <a:r>
+              <a:rPr lang="uk-UA" dirty="0"/>
+              <a:t>багато в чому обмежує розробника.</a:t>
+            </a:r>
           </a:p>
         </p:txBody>
       </p:sp>
@@ -7530,7 +7549,7 @@
     <p:bg>
       <p:bgPr>
         <a:blipFill>
-          <a:blip r:embed="rId1"/>
+          <a:blip r:embed="rId2"/>
           <a:tile tx="0" ty="0" sx="100000" sy="100000" flip="none" algn="tl"/>
         </a:blipFill>
         <a:effectLst/>
@@ -7585,7 +7604,6 @@
               <a:rPr lang="uk-UA" dirty="0"/>
               <a:t> взаємодію компонентів зоряних систем. Тобто всі розрахунки між будь-якими космічними тілами відбуваються у кожен такт виконання за законами всесвітнього тяжіння та Ньютона.</a:t>
             </a:r>
-            <a:endParaRPr lang="uk-UA" dirty="0"/>
           </a:p>
         </p:txBody>
       </p:sp>
@@ -7606,7 +7624,7 @@
     <p:bg>
       <p:bgPr>
         <a:blipFill>
-          <a:blip r:embed="rId1"/>
+          <a:blip r:embed="rId2"/>
           <a:tile tx="0" ty="0" sx="100000" sy="100000" flip="none" algn="tl"/>
         </a:blipFill>
         <a:effectLst/>
@@ -7670,20 +7688,68 @@
               <a:t>, </a:t>
             </a:r>
             <a:r>
+              <a:rPr lang="en-US" b="1" dirty="0"/>
+              <a:t>Telescope</a:t>
+            </a:r>
+            <a:r>
+              <a:rPr lang="uk-UA" dirty="0"/>
+              <a:t>, </a:t>
+            </a:r>
+            <a:r>
+              <a:rPr lang="uk-UA" b="1" dirty="0"/>
+              <a:t> </a:t>
+            </a:r>
+            <a:r>
+              <a:rPr lang="uk-UA" b="1" dirty="0" err="1"/>
+              <a:t>ButtonServer</a:t>
+            </a:r>
+            <a:r>
+              <a:rPr lang="uk-UA" b="1" dirty="0"/>
+              <a:t> </a:t>
+            </a:r>
+            <a:r>
+              <a:rPr lang="uk-UA" dirty="0"/>
+              <a:t>(</a:t>
+            </a:r>
+            <a:r>
               <a:rPr lang="uk-UA" b="1" dirty="0" err="1"/>
               <a:t>Button</a:t>
             </a:r>
             <a:r>
               <a:rPr lang="uk-UA" dirty="0"/>
-              <a:t>,</a:t>
+              <a:t> всередині),</a:t>
             </a:r>
             <a:r>
               <a:rPr lang="uk-UA" b="1" dirty="0"/>
               <a:t> </a:t>
             </a:r>
             <a:r>
-              <a:rPr lang="en-US" altLang="uk-UA" b="1" dirty="0"/>
-              <a:t>ButtonServer, </a:t>
+              <a:rPr lang="en-US" b="1" dirty="0" err="1"/>
+              <a:t>KeyServer</a:t>
+            </a:r>
+            <a:r>
+              <a:rPr lang="en-US" b="1" dirty="0"/>
+              <a:t> </a:t>
+            </a:r>
+            <a:r>
+              <a:rPr lang="uk-UA" dirty="0"/>
+              <a:t>(</a:t>
+            </a:r>
+            <a:r>
+              <a:rPr lang="en-US" b="1" dirty="0"/>
+              <a:t>Key</a:t>
+            </a:r>
+            <a:r>
+              <a:rPr lang="en-US" dirty="0"/>
+              <a:t> </a:t>
+            </a:r>
+            <a:r>
+              <a:rPr lang="uk-UA" dirty="0"/>
+              <a:t>всередині),</a:t>
+            </a:r>
+            <a:r>
+              <a:rPr lang="uk-UA" b="1" dirty="0"/>
+              <a:t> </a:t>
             </a:r>
             <a:r>
               <a:rPr lang="uk-UA" b="1" dirty="0" err="1"/>
@@ -7741,7 +7807,6 @@
               <a:rPr lang="uk-UA" dirty="0"/>
               <a:t>.</a:t>
             </a:r>
-            <a:endParaRPr lang="uk-UA" dirty="0"/>
           </a:p>
         </p:txBody>
       </p:sp>
@@ -7762,7 +7827,7 @@
     <p:bg>
       <p:bgPr>
         <a:blipFill>
-          <a:blip r:embed="rId1"/>
+          <a:blip r:embed="rId2"/>
           <a:tile tx="0" ty="0" sx="100000" sy="100000" flip="none" algn="tl"/>
         </a:blipFill>
         <a:effectLst/>
@@ -7833,7 +7898,6 @@
               <a:rPr lang="uk-UA" dirty="0"/>
               <a:t>– модель небесного тіла.</a:t>
             </a:r>
-            <a:endParaRPr lang="uk-UA" dirty="0"/>
           </a:p>
         </p:txBody>
       </p:sp>
@@ -7854,7 +7918,7 @@
     <p:bg>
       <p:bgPr>
         <a:blipFill>
-          <a:blip r:embed="rId1"/>
+          <a:blip r:embed="rId2"/>
           <a:tile tx="0" ty="0" sx="100000" sy="100000" flip="none" algn="tl"/>
         </a:blipFill>
         <a:effectLst/>
@@ -7996,8 +8060,44 @@
               <a:t>обслуговує ці кнопки. </a:t>
             </a:r>
             <a:r>
+              <a:rPr lang="uk-UA" dirty="0"/>
+              <a:t>Аналогічно </a:t>
+            </a:r>
+            <a:r>
+              <a:rPr lang="en-US" b="1" dirty="0"/>
+              <a:t>Key</a:t>
+            </a:r>
+            <a:r>
+              <a:rPr lang="en-US" dirty="0"/>
+              <a:t> (</a:t>
+            </a:r>
+            <a:r>
+              <a:rPr lang="uk-UA" dirty="0"/>
+              <a:t>клавіша</a:t>
+            </a:r>
+            <a:r>
+              <a:rPr lang="en-US" dirty="0"/>
+              <a:t>) </a:t>
+            </a:r>
+            <a:r>
+              <a:rPr lang="uk-UA" dirty="0"/>
+              <a:t>та </a:t>
+            </a:r>
+            <a:r>
+              <a:rPr lang="en-US" b="1" dirty="0" err="1"/>
+              <a:t>KeyServer</a:t>
+            </a:r>
+            <a:r>
+              <a:rPr lang="uk-UA" dirty="0"/>
+              <a:t>. </a:t>
+            </a:r>
+            <a:r>
+              <a:rPr dirty="0" err="1"/>
+              <a:t>Клас</a:t>
+            </a:r>
+            <a:r>
               <a:rPr dirty="0"/>
-              <a:t>Клас </a:t>
+              <a:t> </a:t>
             </a:r>
             <a:r>
               <a:rPr b="1" dirty="0"/>
@@ -8005,7 +8105,23 @@
             </a:r>
             <a:r>
               <a:rPr dirty="0"/>
-              <a:t> реалізує камеру, а </a:t>
+              <a:t> реалізує камеру, </a:t>
+            </a:r>
+            <a:r>
+              <a:rPr lang="en-US" b="1" dirty="0"/>
+              <a:t>Telescope</a:t>
+            </a:r>
+            <a:r>
+              <a:rPr lang="en-US" dirty="0"/>
+              <a:t> </a:t>
+            </a:r>
+            <a:r>
+              <a:rPr lang="uk-UA" dirty="0"/>
+              <a:t>– телескоп, </a:t>
+            </a:r>
+            <a:r>
+              <a:rPr dirty="0"/>
+              <a:t>а </a:t>
             </a:r>
             <a:r>
               <a:rPr b="1" dirty="0"/>
@@ -8043,7 +8159,6 @@
               <a:rPr lang="uk-UA" dirty="0"/>
               <a:t>.</a:t>
             </a:r>
-            <a:endParaRPr lang="uk-UA" dirty="0"/>
           </a:p>
         </p:txBody>
       </p:sp>
@@ -8309,6 +8424,8 @@
       </a:bgFillStyleLst>
     </a:fmtScheme>
   </a:themeElements>
+  <a:objectDefaults/>
+  <a:extraClrSchemeLst/>
   <a:extLst>
     <a:ext uri="{05A4C25C-085E-4340-85A3-A5531E510DB2}">
       <thm15:themeFamily xmlns:thm15="http://schemas.microsoft.com/office/thememl/2012/main" name="Office Theme" id="{62F939B6-93AF-4DB8-9C6B-D6C7DFDC589F}" vid="{4A3C46E8-61CC-4603-A589-7422A47A8E4A}"/>
@@ -8568,6 +8685,8 @@
       </a:bgFillStyleLst>
     </a:fmtScheme>
   </a:themeElements>
+  <a:objectDefaults/>
+  <a:extraClrSchemeLst/>
   <a:extLst>
     <a:ext uri="{05A4C25C-085E-4340-85A3-A5531E510DB2}">
       <thm15:themeFamily xmlns:thm15="http://schemas.microsoft.com/office/thememl/2012/main" name="Office Theme" id="{62F939B6-93AF-4DB8-9C6B-D6C7DFDC589F}" vid="{4A3C46E8-61CC-4603-A589-7422A47A8E4A}"/>

</xml_diff>